<commit_message>
Hint: 加入登出功能到使用者空間，新增錯誤紀錄內容 LogAPI 新增控制器方法 RegistrantController - LogOut ShopApplication 修改檢視 Account - Space.cshtml
</commit_message>
<xml_diff>
--- a/C#_ASP.NET_常見錯誤.pptx
+++ b/C#_ASP.NET_常見錯誤.pptx
@@ -20,6 +20,8 @@
     <p:sldId id="265" r:id="rId15"/>
     <p:sldId id="266" r:id="rId16"/>
     <p:sldId id="267" r:id="rId17"/>
+    <p:sldId id="268" r:id="rId18"/>
+    <p:sldId id="269" r:id="rId19"/>
   </p:sldIdLst>
   <p:sldSz cy="5143500" cx="9144000"/>
   <p:notesSz cx="6858000" cy="9144000"/>
@@ -1049,6 +1051,204 @@
       <p:sp>
         <p:nvSpPr>
           <p:cNvPr id="133" name="Google Shape;133;g2e7cae4ade5_0_12:notes"/>
+          <p:cNvSpPr txBox="1"/>
+          <p:nvPr>
+            <p:ph idx="1" type="body"/>
+          </p:nvPr>
+        </p:nvSpPr>
+        <p:spPr>
+          <a:xfrm>
+            <a:off x="685800" y="4343400"/>
+            <a:ext cx="5486400" cy="4114800"/>
+          </a:xfrm>
+          <a:prstGeom prst="rect">
+            <a:avLst/>
+          </a:prstGeom>
+        </p:spPr>
+        <p:txBody>
+          <a:bodyPr anchorCtr="0" anchor="t" bIns="91425" lIns="91425" spcFirstLastPara="1" rIns="91425" wrap="square" tIns="91425">
+            <a:noAutofit/>
+          </a:bodyPr>
+          <a:lstStyle/>
+          <a:p>
+            <a:pPr indent="0" lvl="0" marL="0" rtl="0" algn="l">
+              <a:spcBef>
+                <a:spcPts val="0"/>
+              </a:spcBef>
+              <a:spcAft>
+                <a:spcPts val="0"/>
+              </a:spcAft>
+              <a:buNone/>
+            </a:pPr>
+            <a:r>
+              <a:t/>
+            </a:r>
+            <a:endParaRPr/>
+          </a:p>
+        </p:txBody>
+      </p:sp>
+    </p:spTree>
+  </p:cSld>
+  <p:clrMapOvr>
+    <a:masterClrMapping/>
+  </p:clrMapOvr>
+</p:notes>
+</file>
+
+<file path=ppt/notesSlides/notesSlide13.xml><?xml version="1.0" encoding="utf-8"?>
+<p:notes xmlns:a="http://schemas.openxmlformats.org/drawingml/2006/main" xmlns:r="http://schemas.openxmlformats.org/officeDocument/2006/relationships" xmlns:mc="http://schemas.openxmlformats.org/markup-compatibility/2006" xmlns:mv="urn:schemas-microsoft-com:mac:vml" xmlns:p="http://schemas.openxmlformats.org/presentationml/2006/main" xmlns:c="http://schemas.openxmlformats.org/drawingml/2006/chart" xmlns:dgm="http://schemas.openxmlformats.org/drawingml/2006/diagram" xmlns:o="urn:schemas-microsoft-com:office:office" xmlns:v="urn:schemas-microsoft-com:vml" xmlns:pvml="urn:schemas-microsoft-com:office:powerpoint" xmlns:com="http://schemas.openxmlformats.org/drawingml/2006/compatibility" xmlns:p14="http://schemas.microsoft.com/office/powerpoint/2010/main" xmlns:p15="http://schemas.microsoft.com/office/powerpoint/2012/main" xmlns:ahyp="http://schemas.microsoft.com/office/drawing/2018/hyperlinkcolor" showMasterPhAnim="0" showMasterSp="0">
+  <p:cSld>
+    <p:spTree>
+      <p:nvGrpSpPr>
+        <p:cNvPr id="143" name="Shape 143"/>
+        <p:cNvGrpSpPr/>
+        <p:nvPr/>
+      </p:nvGrpSpPr>
+      <p:grpSpPr>
+        <a:xfrm>
+          <a:off x="0" y="0"/>
+          <a:ext cx="0" cy="0"/>
+          <a:chOff x="0" y="0"/>
+          <a:chExt cx="0" cy="0"/>
+        </a:xfrm>
+      </p:grpSpPr>
+      <p:sp>
+        <p:nvSpPr>
+          <p:cNvPr id="144" name="Google Shape;144;g276f9bd31a7_0_0:notes"/>
+          <p:cNvSpPr/>
+          <p:nvPr>
+            <p:ph idx="2" type="sldImg"/>
+          </p:nvPr>
+        </p:nvSpPr>
+        <p:spPr>
+          <a:xfrm>
+            <a:off x="381300" y="685800"/>
+            <a:ext cx="6096000" cy="3429000"/>
+          </a:xfrm>
+          <a:custGeom>
+            <a:rect b="b" l="l" r="r" t="t"/>
+            <a:pathLst>
+              <a:path extrusionOk="0" h="120000" w="120000">
+                <a:moveTo>
+                  <a:pt x="0" y="0"/>
+                </a:moveTo>
+                <a:lnTo>
+                  <a:pt x="120000" y="0"/>
+                </a:lnTo>
+                <a:lnTo>
+                  <a:pt x="120000" y="120000"/>
+                </a:lnTo>
+                <a:lnTo>
+                  <a:pt x="0" y="120000"/>
+                </a:lnTo>
+                <a:close/>
+              </a:path>
+            </a:pathLst>
+          </a:custGeom>
+        </p:spPr>
+      </p:sp>
+      <p:sp>
+        <p:nvSpPr>
+          <p:cNvPr id="145" name="Google Shape;145;g276f9bd31a7_0_0:notes"/>
+          <p:cNvSpPr txBox="1"/>
+          <p:nvPr>
+            <p:ph idx="1" type="body"/>
+          </p:nvPr>
+        </p:nvSpPr>
+        <p:spPr>
+          <a:xfrm>
+            <a:off x="685800" y="4343400"/>
+            <a:ext cx="5486400" cy="4114800"/>
+          </a:xfrm>
+          <a:prstGeom prst="rect">
+            <a:avLst/>
+          </a:prstGeom>
+        </p:spPr>
+        <p:txBody>
+          <a:bodyPr anchorCtr="0" anchor="t" bIns="91425" lIns="91425" spcFirstLastPara="1" rIns="91425" wrap="square" tIns="91425">
+            <a:noAutofit/>
+          </a:bodyPr>
+          <a:lstStyle/>
+          <a:p>
+            <a:pPr indent="0" lvl="0" marL="0" rtl="0" algn="l">
+              <a:spcBef>
+                <a:spcPts val="0"/>
+              </a:spcBef>
+              <a:spcAft>
+                <a:spcPts val="0"/>
+              </a:spcAft>
+              <a:buNone/>
+            </a:pPr>
+            <a:r>
+              <a:t/>
+            </a:r>
+            <a:endParaRPr/>
+          </a:p>
+        </p:txBody>
+      </p:sp>
+    </p:spTree>
+  </p:cSld>
+  <p:clrMapOvr>
+    <a:masterClrMapping/>
+  </p:clrMapOvr>
+</p:notes>
+</file>
+
+<file path=ppt/notesSlides/notesSlide14.xml><?xml version="1.0" encoding="utf-8"?>
+<p:notes xmlns:a="http://schemas.openxmlformats.org/drawingml/2006/main" xmlns:r="http://schemas.openxmlformats.org/officeDocument/2006/relationships" xmlns:mc="http://schemas.openxmlformats.org/markup-compatibility/2006" xmlns:mv="urn:schemas-microsoft-com:mac:vml" xmlns:p="http://schemas.openxmlformats.org/presentationml/2006/main" xmlns:c="http://schemas.openxmlformats.org/drawingml/2006/chart" xmlns:dgm="http://schemas.openxmlformats.org/drawingml/2006/diagram" xmlns:o="urn:schemas-microsoft-com:office:office" xmlns:v="urn:schemas-microsoft-com:vml" xmlns:pvml="urn:schemas-microsoft-com:office:powerpoint" xmlns:com="http://schemas.openxmlformats.org/drawingml/2006/compatibility" xmlns:p14="http://schemas.microsoft.com/office/powerpoint/2010/main" xmlns:p15="http://schemas.microsoft.com/office/powerpoint/2012/main" xmlns:ahyp="http://schemas.microsoft.com/office/drawing/2018/hyperlinkcolor" showMasterPhAnim="0" showMasterSp="0">
+  <p:cSld>
+    <p:spTree>
+      <p:nvGrpSpPr>
+        <p:cNvPr id="150" name="Shape 150"/>
+        <p:cNvGrpSpPr/>
+        <p:nvPr/>
+      </p:nvGrpSpPr>
+      <p:grpSpPr>
+        <a:xfrm>
+          <a:off x="0" y="0"/>
+          <a:ext cx="0" cy="0"/>
+          <a:chOff x="0" y="0"/>
+          <a:chExt cx="0" cy="0"/>
+        </a:xfrm>
+      </p:grpSpPr>
+      <p:sp>
+        <p:nvSpPr>
+          <p:cNvPr id="151" name="Google Shape;151;g2ebbb745af3_0_1:notes"/>
+          <p:cNvSpPr/>
+          <p:nvPr>
+            <p:ph idx="2" type="sldImg"/>
+          </p:nvPr>
+        </p:nvSpPr>
+        <p:spPr>
+          <a:xfrm>
+            <a:off x="381300" y="685800"/>
+            <a:ext cx="6096000" cy="3429000"/>
+          </a:xfrm>
+          <a:custGeom>
+            <a:rect b="b" l="l" r="r" t="t"/>
+            <a:pathLst>
+              <a:path extrusionOk="0" h="120000" w="120000">
+                <a:moveTo>
+                  <a:pt x="0" y="0"/>
+                </a:moveTo>
+                <a:lnTo>
+                  <a:pt x="120000" y="0"/>
+                </a:lnTo>
+                <a:lnTo>
+                  <a:pt x="120000" y="120000"/>
+                </a:lnTo>
+                <a:lnTo>
+                  <a:pt x="0" y="120000"/>
+                </a:lnTo>
+                <a:close/>
+              </a:path>
+            </a:pathLst>
+          </a:custGeom>
+        </p:spPr>
+      </p:sp>
+      <p:sp>
+        <p:nvSpPr>
+          <p:cNvPr id="152" name="Google Shape;152;g2ebbb745af3_0_1:notes"/>
           <p:cNvSpPr txBox="1"/>
           <p:nvPr>
             <p:ph idx="1" type="body"/>
@@ -6791,7 +6991,7 @@
                 <a:cs typeface="Times New Roman"/>
                 <a:sym typeface="Times New Roman"/>
               </a:rPr>
-              <a:t>2024/06/27</a:t>
+              <a:t>2024/07/12</a:t>
             </a:r>
             <a:endParaRPr>
               <a:latin typeface="Times New Roman"/>
@@ -7944,6 +8144,597 @@
 </p:sld>
 </file>
 
+<file path=ppt/slides/slide13.xml><?xml version="1.0" encoding="utf-8"?>
+<p:sld xmlns:a="http://schemas.openxmlformats.org/drawingml/2006/main" xmlns:r="http://schemas.openxmlformats.org/officeDocument/2006/relationships" xmlns:mc="http://schemas.openxmlformats.org/markup-compatibility/2006" xmlns:mv="urn:schemas-microsoft-com:mac:vml" xmlns:p="http://schemas.openxmlformats.org/presentationml/2006/main" xmlns:c="http://schemas.openxmlformats.org/drawingml/2006/chart" xmlns:dgm="http://schemas.openxmlformats.org/drawingml/2006/diagram" xmlns:o="urn:schemas-microsoft-com:office:office" xmlns:v="urn:schemas-microsoft-com:vml" xmlns:pvml="urn:schemas-microsoft-com:office:powerpoint" xmlns:com="http://schemas.openxmlformats.org/drawingml/2006/compatibility" xmlns:p14="http://schemas.microsoft.com/office/powerpoint/2010/main" xmlns:p15="http://schemas.microsoft.com/office/powerpoint/2012/main" xmlns:ahyp="http://schemas.microsoft.com/office/drawing/2018/hyperlinkcolor">
+  <p:cSld>
+    <p:spTree>
+      <p:nvGrpSpPr>
+        <p:cNvPr id="146" name="Shape 146"/>
+        <p:cNvGrpSpPr/>
+        <p:nvPr/>
+      </p:nvGrpSpPr>
+      <p:grpSpPr>
+        <a:xfrm>
+          <a:off x="0" y="0"/>
+          <a:ext cx="0" cy="0"/>
+          <a:chOff x="0" y="0"/>
+          <a:chExt cx="0" cy="0"/>
+        </a:xfrm>
+      </p:grpSpPr>
+      <p:sp>
+        <p:nvSpPr>
+          <p:cNvPr id="147" name="Google Shape;147;p25"/>
+          <p:cNvSpPr txBox="1"/>
+          <p:nvPr>
+            <p:ph type="title"/>
+          </p:nvPr>
+        </p:nvSpPr>
+        <p:spPr>
+          <a:xfrm>
+            <a:off x="311700" y="445025"/>
+            <a:ext cx="8520600" cy="572700"/>
+          </a:xfrm>
+          <a:prstGeom prst="rect">
+            <a:avLst/>
+          </a:prstGeom>
+        </p:spPr>
+        <p:txBody>
+          <a:bodyPr anchorCtr="0" anchor="t" bIns="91425" lIns="91425" spcFirstLastPara="1" rIns="91425" wrap="square" tIns="91425">
+            <a:normAutofit fontScale="90000"/>
+          </a:bodyPr>
+          <a:lstStyle/>
+          <a:p>
+            <a:pPr indent="0" lvl="0" marL="0" rtl="0" algn="l">
+              <a:spcBef>
+                <a:spcPts val="0"/>
+              </a:spcBef>
+              <a:spcAft>
+                <a:spcPts val="0"/>
+              </a:spcAft>
+              <a:buNone/>
+            </a:pPr>
+            <a:r>
+              <a:rPr lang="zh-TW">
+                <a:latin typeface="DFKai-SB"/>
+                <a:ea typeface="DFKai-SB"/>
+                <a:cs typeface="DFKai-SB"/>
+                <a:sym typeface="DFKai-SB"/>
+              </a:rPr>
+              <a:t>錯誤</a:t>
+            </a:r>
+            <a:r>
+              <a:rPr lang="zh-TW"/>
+              <a:t> </a:t>
+            </a:r>
+            <a:r>
+              <a:rPr lang="zh-TW">
+                <a:latin typeface="Times New Roman"/>
+                <a:ea typeface="Times New Roman"/>
+                <a:cs typeface="Times New Roman"/>
+                <a:sym typeface="Times New Roman"/>
+              </a:rPr>
+              <a:t>6</a:t>
+            </a:r>
+            <a:endParaRPr>
+              <a:latin typeface="Times New Roman"/>
+              <a:ea typeface="Times New Roman"/>
+              <a:cs typeface="Times New Roman"/>
+              <a:sym typeface="Times New Roman"/>
+            </a:endParaRPr>
+          </a:p>
+        </p:txBody>
+      </p:sp>
+      <p:sp>
+        <p:nvSpPr>
+          <p:cNvPr id="148" name="Google Shape;148;p25"/>
+          <p:cNvSpPr txBox="1"/>
+          <p:nvPr>
+            <p:ph idx="1" type="body"/>
+          </p:nvPr>
+        </p:nvSpPr>
+        <p:spPr>
+          <a:xfrm>
+            <a:off x="311700" y="1152475"/>
+            <a:ext cx="8520600" cy="3896700"/>
+          </a:xfrm>
+          <a:prstGeom prst="rect">
+            <a:avLst/>
+          </a:prstGeom>
+        </p:spPr>
+        <p:txBody>
+          <a:bodyPr anchorCtr="0" anchor="t" bIns="91425" lIns="91425" spcFirstLastPara="1" rIns="91425" wrap="square" tIns="91425">
+            <a:normAutofit lnSpcReduction="10000"/>
+          </a:bodyPr>
+          <a:lstStyle/>
+          <a:p>
+            <a:pPr indent="-342900" lvl="0" marL="457200" rtl="0" algn="l">
+              <a:spcBef>
+                <a:spcPts val="0"/>
+              </a:spcBef>
+              <a:spcAft>
+                <a:spcPts val="0"/>
+              </a:spcAft>
+              <a:buSzPts val="1800"/>
+              <a:buFont typeface="DFKai-SB"/>
+              <a:buChar char="●"/>
+            </a:pPr>
+            <a:r>
+              <a:rPr lang="zh-TW">
+                <a:latin typeface="DFKai-SB"/>
+                <a:ea typeface="DFKai-SB"/>
+                <a:cs typeface="DFKai-SB"/>
+                <a:sym typeface="DFKai-SB"/>
+              </a:rPr>
+              <a:t>錯誤資訊：</a:t>
+            </a:r>
+            <a:endParaRPr>
+              <a:latin typeface="DFKai-SB"/>
+              <a:ea typeface="DFKai-SB"/>
+              <a:cs typeface="DFKai-SB"/>
+              <a:sym typeface="DFKai-SB"/>
+            </a:endParaRPr>
+          </a:p>
+          <a:p>
+            <a:pPr indent="0" lvl="0" marL="457200" rtl="0" algn="l">
+              <a:spcBef>
+                <a:spcPts val="1200"/>
+              </a:spcBef>
+              <a:spcAft>
+                <a:spcPts val="0"/>
+              </a:spcAft>
+              <a:buNone/>
+            </a:pPr>
+            <a:r>
+              <a:t/>
+            </a:r>
+            <a:endParaRPr sz="1300">
+              <a:latin typeface="DFKai-SB"/>
+              <a:ea typeface="DFKai-SB"/>
+              <a:cs typeface="DFKai-SB"/>
+              <a:sym typeface="DFKai-SB"/>
+            </a:endParaRPr>
+          </a:p>
+          <a:p>
+            <a:pPr indent="-342900" lvl="0" marL="457200" rtl="0" algn="l">
+              <a:spcBef>
+                <a:spcPts val="1200"/>
+              </a:spcBef>
+              <a:spcAft>
+                <a:spcPts val="0"/>
+              </a:spcAft>
+              <a:buSzPts val="1800"/>
+              <a:buFont typeface="DFKai-SB"/>
+              <a:buChar char="●"/>
+            </a:pPr>
+            <a:r>
+              <a:rPr lang="zh-TW">
+                <a:latin typeface="DFKai-SB"/>
+                <a:ea typeface="DFKai-SB"/>
+                <a:cs typeface="DFKai-SB"/>
+                <a:sym typeface="DFKai-SB"/>
+              </a:rPr>
+              <a:t>原因：</a:t>
+            </a:r>
+            <a:endParaRPr>
+              <a:latin typeface="DFKai-SB"/>
+              <a:ea typeface="DFKai-SB"/>
+              <a:cs typeface="DFKai-SB"/>
+              <a:sym typeface="DFKai-SB"/>
+            </a:endParaRPr>
+          </a:p>
+          <a:p>
+            <a:pPr indent="0" lvl="0" marL="457200" rtl="0" algn="l">
+              <a:lnSpc>
+                <a:spcPct val="100000"/>
+              </a:lnSpc>
+              <a:spcBef>
+                <a:spcPts val="1200"/>
+              </a:spcBef>
+              <a:spcAft>
+                <a:spcPts val="0"/>
+              </a:spcAft>
+              <a:buNone/>
+            </a:pPr>
+            <a:r>
+              <a:rPr lang="zh-TW" sz="1300">
+                <a:latin typeface="DFKai-SB"/>
+                <a:ea typeface="DFKai-SB"/>
+                <a:cs typeface="DFKai-SB"/>
+                <a:sym typeface="DFKai-SB"/>
+              </a:rPr>
+              <a:t>目前的推測來看，是目標物件不能被序列化或反序列化而造成的，似乎與System.Type有關，可能在繼承特定的介面後，就可以使用</a:t>
+            </a:r>
+            <a:r>
+              <a:rPr lang="zh-TW" sz="1300">
+                <a:latin typeface="DFKai-SB"/>
+                <a:ea typeface="DFKai-SB"/>
+                <a:cs typeface="DFKai-SB"/>
+                <a:sym typeface="DFKai-SB"/>
+              </a:rPr>
+              <a:t>。</a:t>
+            </a:r>
+            <a:endParaRPr sz="1200">
+              <a:latin typeface="DFKai-SB"/>
+              <a:ea typeface="DFKai-SB"/>
+              <a:cs typeface="DFKai-SB"/>
+              <a:sym typeface="DFKai-SB"/>
+            </a:endParaRPr>
+          </a:p>
+          <a:p>
+            <a:pPr indent="-342900" lvl="0" marL="457200" rtl="0" algn="l">
+              <a:spcBef>
+                <a:spcPts val="1200"/>
+              </a:spcBef>
+              <a:spcAft>
+                <a:spcPts val="0"/>
+              </a:spcAft>
+              <a:buSzPts val="1800"/>
+              <a:buFont typeface="DFKai-SB"/>
+              <a:buChar char="●"/>
+            </a:pPr>
+            <a:r>
+              <a:rPr lang="zh-TW">
+                <a:latin typeface="DFKai-SB"/>
+                <a:ea typeface="DFKai-SB"/>
+                <a:cs typeface="DFKai-SB"/>
+                <a:sym typeface="DFKai-SB"/>
+              </a:rPr>
+              <a:t>解決方法：</a:t>
+            </a:r>
+            <a:endParaRPr>
+              <a:latin typeface="DFKai-SB"/>
+              <a:ea typeface="DFKai-SB"/>
+              <a:cs typeface="DFKai-SB"/>
+              <a:sym typeface="DFKai-SB"/>
+            </a:endParaRPr>
+          </a:p>
+          <a:p>
+            <a:pPr indent="0" lvl="0" marL="0" rtl="0" algn="l">
+              <a:spcBef>
+                <a:spcPts val="1200"/>
+              </a:spcBef>
+              <a:spcAft>
+                <a:spcPts val="0"/>
+              </a:spcAft>
+              <a:buNone/>
+            </a:pPr>
+            <a:r>
+              <a:rPr lang="zh-TW" sz="1300">
+                <a:latin typeface="DFKai-SB"/>
+                <a:ea typeface="DFKai-SB"/>
+                <a:cs typeface="DFKai-SB"/>
+                <a:sym typeface="DFKai-SB"/>
+              </a:rPr>
+              <a:t>	</a:t>
+            </a:r>
+            <a:r>
+              <a:rPr lang="zh-TW" sz="1300">
+                <a:latin typeface="DFKai-SB"/>
+                <a:ea typeface="DFKai-SB"/>
+                <a:cs typeface="DFKai-SB"/>
+                <a:sym typeface="DFKai-SB"/>
+              </a:rPr>
+              <a:t>回傳給前端網頁的物件(Response的部分)必須可以被序列化，所以不要將不支援的物件回傳給前端網頁</a:t>
+            </a:r>
+            <a:r>
+              <a:rPr lang="zh-TW" sz="1300">
+                <a:latin typeface="DFKai-SB"/>
+                <a:ea typeface="DFKai-SB"/>
+                <a:cs typeface="DFKai-SB"/>
+                <a:sym typeface="DFKai-SB"/>
+              </a:rPr>
+              <a:t>。</a:t>
+            </a:r>
+            <a:endParaRPr sz="1300">
+              <a:latin typeface="DFKai-SB"/>
+              <a:ea typeface="DFKai-SB"/>
+              <a:cs typeface="DFKai-SB"/>
+              <a:sym typeface="DFKai-SB"/>
+            </a:endParaRPr>
+          </a:p>
+          <a:p>
+            <a:pPr indent="-342900" lvl="0" marL="457200" rtl="0" algn="l">
+              <a:spcBef>
+                <a:spcPts val="1200"/>
+              </a:spcBef>
+              <a:spcAft>
+                <a:spcPts val="0"/>
+              </a:spcAft>
+              <a:buSzPts val="1800"/>
+              <a:buFont typeface="DFKai-SB"/>
+              <a:buChar char="●"/>
+            </a:pPr>
+            <a:r>
+              <a:rPr lang="zh-TW">
+                <a:latin typeface="DFKai-SB"/>
+                <a:ea typeface="DFKai-SB"/>
+                <a:cs typeface="DFKai-SB"/>
+                <a:sym typeface="DFKai-SB"/>
+              </a:rPr>
+              <a:t>備註：</a:t>
+            </a:r>
+            <a:endParaRPr>
+              <a:latin typeface="DFKai-SB"/>
+              <a:ea typeface="DFKai-SB"/>
+              <a:cs typeface="DFKai-SB"/>
+              <a:sym typeface="DFKai-SB"/>
+            </a:endParaRPr>
+          </a:p>
+          <a:p>
+            <a:pPr indent="0" lvl="0" marL="457200" rtl="0" algn="l">
+              <a:spcBef>
+                <a:spcPts val="1200"/>
+              </a:spcBef>
+              <a:spcAft>
+                <a:spcPts val="0"/>
+              </a:spcAft>
+              <a:buNone/>
+            </a:pPr>
+            <a:r>
+              <a:rPr lang="zh-TW" sz="1300">
+                <a:latin typeface="DFKai-SB"/>
+                <a:ea typeface="DFKai-SB"/>
+                <a:cs typeface="DFKai-SB"/>
+                <a:sym typeface="DFKai-SB"/>
+              </a:rPr>
+              <a:t>HttpResponse似乎不能被序列化，但也有可能是因為這個HttpResponse是來自於HttpContext.Response。</a:t>
+            </a:r>
+            <a:endParaRPr sz="1300">
+              <a:latin typeface="DFKai-SB"/>
+              <a:ea typeface="DFKai-SB"/>
+              <a:cs typeface="DFKai-SB"/>
+              <a:sym typeface="DFKai-SB"/>
+            </a:endParaRPr>
+          </a:p>
+          <a:p>
+            <a:pPr indent="0" lvl="0" marL="457200" rtl="0" algn="l">
+              <a:spcBef>
+                <a:spcPts val="1200"/>
+              </a:spcBef>
+              <a:spcAft>
+                <a:spcPts val="1200"/>
+              </a:spcAft>
+              <a:buNone/>
+            </a:pPr>
+            <a:r>
+              <a:t/>
+            </a:r>
+            <a:endParaRPr sz="1300">
+              <a:latin typeface="DFKai-SB"/>
+              <a:ea typeface="DFKai-SB"/>
+              <a:cs typeface="DFKai-SB"/>
+              <a:sym typeface="DFKai-SB"/>
+            </a:endParaRPr>
+          </a:p>
+        </p:txBody>
+      </p:sp>
+      <p:pic>
+        <p:nvPicPr>
+          <p:cNvPr id="149" name="Google Shape;149;p25"/>
+          <p:cNvPicPr preferRelativeResize="0"/>
+          <p:nvPr/>
+        </p:nvPicPr>
+        <p:blipFill>
+          <a:blip r:embed="rId3">
+            <a:alphaModFix/>
+          </a:blip>
+          <a:stretch>
+            <a:fillRect/>
+          </a:stretch>
+        </p:blipFill>
+        <p:spPr>
+          <a:xfrm>
+            <a:off x="1101050" y="1515075"/>
+            <a:ext cx="7258398" cy="572700"/>
+          </a:xfrm>
+          <a:prstGeom prst="rect">
+            <a:avLst/>
+          </a:prstGeom>
+          <a:noFill/>
+          <a:ln>
+            <a:noFill/>
+          </a:ln>
+        </p:spPr>
+      </p:pic>
+    </p:spTree>
+  </p:cSld>
+  <p:clrMapOvr>
+    <a:masterClrMapping/>
+  </p:clrMapOvr>
+</p:sld>
+</file>
+
+<file path=ppt/slides/slide14.xml><?xml version="1.0" encoding="utf-8"?>
+<p:sld xmlns:a="http://schemas.openxmlformats.org/drawingml/2006/main" xmlns:r="http://schemas.openxmlformats.org/officeDocument/2006/relationships" xmlns:mc="http://schemas.openxmlformats.org/markup-compatibility/2006" xmlns:mv="urn:schemas-microsoft-com:mac:vml" xmlns:p="http://schemas.openxmlformats.org/presentationml/2006/main" xmlns:c="http://schemas.openxmlformats.org/drawingml/2006/chart" xmlns:dgm="http://schemas.openxmlformats.org/drawingml/2006/diagram" xmlns:o="urn:schemas-microsoft-com:office:office" xmlns:v="urn:schemas-microsoft-com:vml" xmlns:pvml="urn:schemas-microsoft-com:office:powerpoint" xmlns:com="http://schemas.openxmlformats.org/drawingml/2006/compatibility" xmlns:p14="http://schemas.microsoft.com/office/powerpoint/2010/main" xmlns:p15="http://schemas.microsoft.com/office/powerpoint/2012/main" xmlns:ahyp="http://schemas.microsoft.com/office/drawing/2018/hyperlinkcolor">
+  <p:cSld>
+    <p:bg>
+      <p:bgPr>
+        <a:solidFill>
+          <a:schemeClr val="dk1"/>
+        </a:solidFill>
+      </p:bgPr>
+    </p:bg>
+    <p:spTree>
+      <p:nvGrpSpPr>
+        <p:cNvPr id="153" name="Shape 153"/>
+        <p:cNvGrpSpPr/>
+        <p:nvPr/>
+      </p:nvGrpSpPr>
+      <p:grpSpPr>
+        <a:xfrm>
+          <a:off x="0" y="0"/>
+          <a:ext cx="0" cy="0"/>
+          <a:chOff x="0" y="0"/>
+          <a:chExt cx="0" cy="0"/>
+        </a:xfrm>
+      </p:grpSpPr>
+      <p:pic>
+        <p:nvPicPr>
+          <p:cNvPr id="154" name="Google Shape;154;p26"/>
+          <p:cNvPicPr preferRelativeResize="0"/>
+          <p:nvPr/>
+        </p:nvPicPr>
+        <p:blipFill>
+          <a:blip r:embed="rId3">
+            <a:alphaModFix/>
+          </a:blip>
+          <a:stretch>
+            <a:fillRect/>
+          </a:stretch>
+        </p:blipFill>
+        <p:spPr>
+          <a:xfrm>
+            <a:off x="1752537" y="555925"/>
+            <a:ext cx="5638927" cy="1881022"/>
+          </a:xfrm>
+          <a:prstGeom prst="rect">
+            <a:avLst/>
+          </a:prstGeom>
+          <a:noFill/>
+          <a:ln>
+            <a:noFill/>
+          </a:ln>
+        </p:spPr>
+      </p:pic>
+      <p:pic>
+        <p:nvPicPr>
+          <p:cNvPr id="155" name="Google Shape;155;p26"/>
+          <p:cNvPicPr preferRelativeResize="0"/>
+          <p:nvPr/>
+        </p:nvPicPr>
+        <p:blipFill>
+          <a:blip r:embed="rId4">
+            <a:alphaModFix/>
+          </a:blip>
+          <a:stretch>
+            <a:fillRect/>
+          </a:stretch>
+        </p:blipFill>
+        <p:spPr>
+          <a:xfrm>
+            <a:off x="1766943" y="3040308"/>
+            <a:ext cx="5610120" cy="1867241"/>
+          </a:xfrm>
+          <a:prstGeom prst="rect">
+            <a:avLst/>
+          </a:prstGeom>
+          <a:noFill/>
+          <a:ln>
+            <a:noFill/>
+          </a:ln>
+        </p:spPr>
+      </p:pic>
+      <p:sp>
+        <p:nvSpPr>
+          <p:cNvPr id="156" name="Google Shape;156;p26"/>
+          <p:cNvSpPr/>
+          <p:nvPr/>
+        </p:nvSpPr>
+        <p:spPr>
+          <a:xfrm>
+            <a:off x="4333425" y="2436950"/>
+            <a:ext cx="377400" cy="603300"/>
+          </a:xfrm>
+          <a:prstGeom prst="downArrow">
+            <a:avLst>
+              <a:gd fmla="val 50000" name="adj1"/>
+              <a:gd fmla="val 50000" name="adj2"/>
+            </a:avLst>
+          </a:prstGeom>
+          <a:solidFill>
+            <a:schemeClr val="lt2"/>
+          </a:solidFill>
+          <a:ln cap="flat" cmpd="sng" w="9525">
+            <a:solidFill>
+              <a:schemeClr val="dk2"/>
+            </a:solidFill>
+            <a:prstDash val="solid"/>
+            <a:round/>
+            <a:headEnd len="sm" w="sm" type="none"/>
+            <a:tailEnd len="sm" w="sm" type="none"/>
+          </a:ln>
+        </p:spPr>
+        <p:txBody>
+          <a:bodyPr anchorCtr="0" anchor="ctr" bIns="91425" lIns="91425" spcFirstLastPara="1" rIns="91425" wrap="square" tIns="91425">
+            <a:noAutofit/>
+          </a:bodyPr>
+          <a:lstStyle/>
+          <a:p>
+            <a:pPr indent="0" lvl="0" marL="0" rtl="0" algn="ctr">
+              <a:spcBef>
+                <a:spcPts val="0"/>
+              </a:spcBef>
+              <a:spcAft>
+                <a:spcPts val="0"/>
+              </a:spcAft>
+              <a:buNone/>
+            </a:pPr>
+            <a:r>
+              <a:t/>
+            </a:r>
+            <a:endParaRPr/>
+          </a:p>
+        </p:txBody>
+      </p:sp>
+      <p:sp>
+        <p:nvSpPr>
+          <p:cNvPr id="157" name="Google Shape;157;p26"/>
+          <p:cNvSpPr/>
+          <p:nvPr/>
+        </p:nvSpPr>
+        <p:spPr>
+          <a:xfrm>
+            <a:off x="2500975" y="4514325"/>
+            <a:ext cx="558300" cy="228000"/>
+          </a:xfrm>
+          <a:prstGeom prst="frame">
+            <a:avLst>
+              <a:gd fmla="val 12500" name="adj1"/>
+            </a:avLst>
+          </a:prstGeom>
+          <a:solidFill>
+            <a:schemeClr val="lt2"/>
+          </a:solidFill>
+          <a:ln cap="flat" cmpd="sng" w="9525">
+            <a:solidFill>
+              <a:schemeClr val="dk2"/>
+            </a:solidFill>
+            <a:prstDash val="solid"/>
+            <a:round/>
+            <a:headEnd len="sm" w="sm" type="none"/>
+            <a:tailEnd len="sm" w="sm" type="none"/>
+          </a:ln>
+        </p:spPr>
+        <p:txBody>
+          <a:bodyPr anchorCtr="0" anchor="ctr" bIns="91425" lIns="91425" spcFirstLastPara="1" rIns="91425" wrap="square" tIns="91425">
+            <a:noAutofit/>
+          </a:bodyPr>
+          <a:lstStyle/>
+          <a:p>
+            <a:pPr indent="0" lvl="0" marL="0" rtl="0" algn="ctr">
+              <a:spcBef>
+                <a:spcPts val="0"/>
+              </a:spcBef>
+              <a:spcAft>
+                <a:spcPts val="0"/>
+              </a:spcAft>
+              <a:buNone/>
+            </a:pPr>
+            <a:r>
+              <a:t/>
+            </a:r>
+            <a:endParaRPr/>
+          </a:p>
+        </p:txBody>
+      </p:sp>
+    </p:spTree>
+  </p:cSld>
+  <p:clrMapOvr>
+    <a:masterClrMapping/>
+  </p:clrMapOvr>
+</p:sld>
+</file>
+
 <file path=ppt/slides/slide2.xml><?xml version="1.0" encoding="utf-8"?>
 <p:sld xmlns:a="http://schemas.openxmlformats.org/drawingml/2006/main" xmlns:r="http://schemas.openxmlformats.org/officeDocument/2006/relationships" xmlns:mc="http://schemas.openxmlformats.org/markup-compatibility/2006" xmlns:mv="urn:schemas-microsoft-com:mac:vml" xmlns:p="http://schemas.openxmlformats.org/presentationml/2006/main" xmlns:c="http://schemas.openxmlformats.org/drawingml/2006/chart" xmlns:dgm="http://schemas.openxmlformats.org/drawingml/2006/diagram" xmlns:o="urn:schemas-microsoft-com:office:office" xmlns:v="urn:schemas-microsoft-com:vml" xmlns:pvml="urn:schemas-microsoft-com:office:powerpoint" xmlns:com="http://schemas.openxmlformats.org/drawingml/2006/compatibility" xmlns:p14="http://schemas.microsoft.com/office/powerpoint/2010/main" xmlns:p15="http://schemas.microsoft.com/office/powerpoint/2012/main" xmlns:ahyp="http://schemas.microsoft.com/office/drawing/2018/hyperlinkcolor">
   <p:cSld>
@@ -9869,7 +10660,7 @@
         </p:spPr>
         <p:txBody>
           <a:bodyPr anchorCtr="0" anchor="t" bIns="91425" lIns="91425" spcFirstLastPara="1" rIns="91425" wrap="square" tIns="91425">
-            <a:normAutofit lnSpcReduction="10000"/>
+            <a:normAutofit/>
           </a:bodyPr>
           <a:lstStyle/>
           <a:p>
@@ -9964,28 +10755,7 @@
                 <a:cs typeface="DFKai-SB"/>
                 <a:sym typeface="DFKai-SB"/>
               </a:rPr>
-              <a:t>似乎在</a:t>
-            </a:r>
-            <a:r>
-              <a:rPr lang="zh-TW" sz="1300">
-                <a:solidFill>
-                  <a:srgbClr val="00FF00"/>
-                </a:solidFill>
-                <a:latin typeface="Times New Roman"/>
-                <a:ea typeface="Times New Roman"/>
-                <a:cs typeface="Times New Roman"/>
-                <a:sym typeface="Times New Roman"/>
-              </a:rPr>
-              <a:t>Swagger</a:t>
-            </a:r>
-            <a:r>
-              <a:rPr lang="zh-TW" sz="1300">
-                <a:latin typeface="DFKai-SB"/>
-                <a:ea typeface="DFKai-SB"/>
-                <a:cs typeface="DFKai-SB"/>
-                <a:sym typeface="DFKai-SB"/>
-              </a:rPr>
-              <a:t>的處理上，如果控制器的方法是使用</a:t>
+              <a:t>如果控制器的方法是使用</a:t>
             </a:r>
             <a:r>
               <a:rPr lang="zh-TW" sz="1300">
@@ -10006,7 +10776,7 @@
                 <a:cs typeface="DFKai-SB"/>
                 <a:sym typeface="DFKai-SB"/>
               </a:rPr>
-              <a:t>的參數，在使用</a:t>
+              <a:t>(複雜模型)的參數，在使用</a:t>
             </a:r>
             <a:r>
               <a:rPr lang="zh-TW" sz="1300">
@@ -10183,7 +10953,7 @@
                 <a:cs typeface="DFKai-SB"/>
                 <a:sym typeface="DFKai-SB"/>
               </a:rPr>
-              <a:t>	1. 使用一般的型別做代替，如</a:t>
+              <a:t>	1. 使用簡單的型別做代替，如</a:t>
             </a:r>
             <a:r>
               <a:rPr lang="zh-TW" sz="1300">
@@ -10227,7 +10997,7 @@
                 <a:cs typeface="DFKai-SB"/>
                 <a:sym typeface="DFKai-SB"/>
               </a:rPr>
-              <a:t>	2. 在模型類別的參數前，加上[FromQuery]屬性。</a:t>
+              <a:t>	2. 在模型類別的參數前，加上[FromQuery]屬性。(這會變更模型繫結的來源，原本是[FromBody]。)</a:t>
             </a:r>
             <a:endParaRPr sz="1300">
               <a:latin typeface="DFKai-SB"/>
@@ -10237,60 +11007,17 @@
             </a:endParaRPr>
           </a:p>
           <a:p>
-            <a:pPr indent="-342900" lvl="0" marL="457200" rtl="0" algn="l">
+            <a:pPr indent="0" lvl="0" marL="457200" rtl="0" algn="l">
               <a:spcBef>
                 <a:spcPts val="1200"/>
               </a:spcBef>
               <a:spcAft>
-                <a:spcPts val="0"/>
-              </a:spcAft>
-              <a:buSzPts val="1800"/>
-              <a:buFont typeface="DFKai-SB"/>
-              <a:buChar char="●"/>
+                <a:spcPts val="1200"/>
+              </a:spcAft>
+              <a:buNone/>
             </a:pPr>
             <a:r>
-              <a:rPr lang="zh-TW">
-                <a:latin typeface="DFKai-SB"/>
-                <a:ea typeface="DFKai-SB"/>
-                <a:cs typeface="DFKai-SB"/>
-                <a:sym typeface="DFKai-SB"/>
-              </a:rPr>
-              <a:t>備註：</a:t>
-            </a:r>
-            <a:endParaRPr>
-              <a:latin typeface="DFKai-SB"/>
-              <a:ea typeface="DFKai-SB"/>
-              <a:cs typeface="DFKai-SB"/>
-              <a:sym typeface="DFKai-SB"/>
-            </a:endParaRPr>
-          </a:p>
-          <a:p>
-            <a:pPr indent="0" lvl="0" marL="457200" rtl="0" algn="l">
-              <a:spcBef>
-                <a:spcPts val="1200"/>
-              </a:spcBef>
-              <a:spcAft>
-                <a:spcPts val="1200"/>
-              </a:spcAft>
-              <a:buNone/>
-            </a:pPr>
-            <a:r>
-              <a:rPr lang="zh-TW" sz="1300">
-                <a:latin typeface="DFKai-SB"/>
-                <a:ea typeface="DFKai-SB"/>
-                <a:cs typeface="DFKai-SB"/>
-                <a:sym typeface="DFKai-SB"/>
-              </a:rPr>
-              <a:t>有待確定是否僅對Swagger才有影響</a:t>
-            </a:r>
-            <a:r>
-              <a:rPr lang="zh-TW" sz="1300">
-                <a:latin typeface="DFKai-SB"/>
-                <a:ea typeface="DFKai-SB"/>
-                <a:cs typeface="DFKai-SB"/>
-                <a:sym typeface="DFKai-SB"/>
-              </a:rPr>
-              <a:t>。</a:t>
+              <a:t/>
             </a:r>
             <a:endParaRPr sz="1300">
               <a:latin typeface="DFKai-SB"/>

</xml_diff>

<commit_message>
Hint: 嘗試加入路由屬性作管理 ShopApplication 新增控制器方法 ProductController - ProductInfo ShopApplication 新增檢視 Product - ProductInfo.cshtml ShopApplication 修改檢視 Product - ShowProduct.cshtml README.md 新增內容 C#_ASP.NET_常見錯誤.pptx 更新內容
</commit_message>
<xml_diff>
--- a/C#_ASP.NET_常見錯誤.pptx
+++ b/C#_ASP.NET_常見錯誤.pptx
@@ -22,6 +22,8 @@
     <p:sldId id="267" r:id="rId17"/>
     <p:sldId id="268" r:id="rId18"/>
     <p:sldId id="269" r:id="rId19"/>
+    <p:sldId id="270" r:id="rId20"/>
+    <p:sldId id="271" r:id="rId21"/>
   </p:sldIdLst>
   <p:sldSz cy="5143500" cx="9144000"/>
   <p:notesSz cx="6858000" cy="9144000"/>
@@ -1249,6 +1251,204 @@
       <p:sp>
         <p:nvSpPr>
           <p:cNvPr id="152" name="Google Shape;152;g2ebbb745af3_0_1:notes"/>
+          <p:cNvSpPr txBox="1"/>
+          <p:nvPr>
+            <p:ph idx="1" type="body"/>
+          </p:nvPr>
+        </p:nvSpPr>
+        <p:spPr>
+          <a:xfrm>
+            <a:off x="685800" y="4343400"/>
+            <a:ext cx="5486400" cy="4114800"/>
+          </a:xfrm>
+          <a:prstGeom prst="rect">
+            <a:avLst/>
+          </a:prstGeom>
+        </p:spPr>
+        <p:txBody>
+          <a:bodyPr anchorCtr="0" anchor="t" bIns="91425" lIns="91425" spcFirstLastPara="1" rIns="91425" wrap="square" tIns="91425">
+            <a:noAutofit/>
+          </a:bodyPr>
+          <a:lstStyle/>
+          <a:p>
+            <a:pPr indent="0" lvl="0" marL="0" rtl="0" algn="l">
+              <a:spcBef>
+                <a:spcPts val="0"/>
+              </a:spcBef>
+              <a:spcAft>
+                <a:spcPts val="0"/>
+              </a:spcAft>
+              <a:buNone/>
+            </a:pPr>
+            <a:r>
+              <a:t/>
+            </a:r>
+            <a:endParaRPr/>
+          </a:p>
+        </p:txBody>
+      </p:sp>
+    </p:spTree>
+  </p:cSld>
+  <p:clrMapOvr>
+    <a:masterClrMapping/>
+  </p:clrMapOvr>
+</p:notes>
+</file>
+
+<file path=ppt/notesSlides/notesSlide15.xml><?xml version="1.0" encoding="utf-8"?>
+<p:notes xmlns:a="http://schemas.openxmlformats.org/drawingml/2006/main" xmlns:r="http://schemas.openxmlformats.org/officeDocument/2006/relationships" xmlns:mc="http://schemas.openxmlformats.org/markup-compatibility/2006" xmlns:mv="urn:schemas-microsoft-com:mac:vml" xmlns:p="http://schemas.openxmlformats.org/presentationml/2006/main" xmlns:c="http://schemas.openxmlformats.org/drawingml/2006/chart" xmlns:dgm="http://schemas.openxmlformats.org/drawingml/2006/diagram" xmlns:o="urn:schemas-microsoft-com:office:office" xmlns:v="urn:schemas-microsoft-com:vml" xmlns:pvml="urn:schemas-microsoft-com:office:powerpoint" xmlns:com="http://schemas.openxmlformats.org/drawingml/2006/compatibility" xmlns:p14="http://schemas.microsoft.com/office/powerpoint/2010/main" xmlns:p15="http://schemas.microsoft.com/office/powerpoint/2012/main" xmlns:ahyp="http://schemas.microsoft.com/office/drawing/2018/hyperlinkcolor" showMasterPhAnim="0" showMasterSp="0">
+  <p:cSld>
+    <p:spTree>
+      <p:nvGrpSpPr>
+        <p:cNvPr id="158" name="Shape 158"/>
+        <p:cNvGrpSpPr/>
+        <p:nvPr/>
+      </p:nvGrpSpPr>
+      <p:grpSpPr>
+        <a:xfrm>
+          <a:off x="0" y="0"/>
+          <a:ext cx="0" cy="0"/>
+          <a:chOff x="0" y="0"/>
+          <a:chExt cx="0" cy="0"/>
+        </a:xfrm>
+      </p:grpSpPr>
+      <p:sp>
+        <p:nvSpPr>
+          <p:cNvPr id="159" name="Google Shape;159;g27821c306df_0_0:notes"/>
+          <p:cNvSpPr/>
+          <p:nvPr>
+            <p:ph idx="2" type="sldImg"/>
+          </p:nvPr>
+        </p:nvSpPr>
+        <p:spPr>
+          <a:xfrm>
+            <a:off x="381300" y="685800"/>
+            <a:ext cx="6096000" cy="3429000"/>
+          </a:xfrm>
+          <a:custGeom>
+            <a:rect b="b" l="l" r="r" t="t"/>
+            <a:pathLst>
+              <a:path extrusionOk="0" h="120000" w="120000">
+                <a:moveTo>
+                  <a:pt x="0" y="0"/>
+                </a:moveTo>
+                <a:lnTo>
+                  <a:pt x="120000" y="0"/>
+                </a:lnTo>
+                <a:lnTo>
+                  <a:pt x="120000" y="120000"/>
+                </a:lnTo>
+                <a:lnTo>
+                  <a:pt x="0" y="120000"/>
+                </a:lnTo>
+                <a:close/>
+              </a:path>
+            </a:pathLst>
+          </a:custGeom>
+        </p:spPr>
+      </p:sp>
+      <p:sp>
+        <p:nvSpPr>
+          <p:cNvPr id="160" name="Google Shape;160;g27821c306df_0_0:notes"/>
+          <p:cNvSpPr txBox="1"/>
+          <p:nvPr>
+            <p:ph idx="1" type="body"/>
+          </p:nvPr>
+        </p:nvSpPr>
+        <p:spPr>
+          <a:xfrm>
+            <a:off x="685800" y="4343400"/>
+            <a:ext cx="5486400" cy="4114800"/>
+          </a:xfrm>
+          <a:prstGeom prst="rect">
+            <a:avLst/>
+          </a:prstGeom>
+        </p:spPr>
+        <p:txBody>
+          <a:bodyPr anchorCtr="0" anchor="t" bIns="91425" lIns="91425" spcFirstLastPara="1" rIns="91425" wrap="square" tIns="91425">
+            <a:noAutofit/>
+          </a:bodyPr>
+          <a:lstStyle/>
+          <a:p>
+            <a:pPr indent="0" lvl="0" marL="0" rtl="0" algn="l">
+              <a:spcBef>
+                <a:spcPts val="0"/>
+              </a:spcBef>
+              <a:spcAft>
+                <a:spcPts val="0"/>
+              </a:spcAft>
+              <a:buNone/>
+            </a:pPr>
+            <a:r>
+              <a:t/>
+            </a:r>
+            <a:endParaRPr/>
+          </a:p>
+        </p:txBody>
+      </p:sp>
+    </p:spTree>
+  </p:cSld>
+  <p:clrMapOvr>
+    <a:masterClrMapping/>
+  </p:clrMapOvr>
+</p:notes>
+</file>
+
+<file path=ppt/notesSlides/notesSlide16.xml><?xml version="1.0" encoding="utf-8"?>
+<p:notes xmlns:a="http://schemas.openxmlformats.org/drawingml/2006/main" xmlns:r="http://schemas.openxmlformats.org/officeDocument/2006/relationships" xmlns:mc="http://schemas.openxmlformats.org/markup-compatibility/2006" xmlns:mv="urn:schemas-microsoft-com:mac:vml" xmlns:p="http://schemas.openxmlformats.org/presentationml/2006/main" xmlns:c="http://schemas.openxmlformats.org/drawingml/2006/chart" xmlns:dgm="http://schemas.openxmlformats.org/drawingml/2006/diagram" xmlns:o="urn:schemas-microsoft-com:office:office" xmlns:v="urn:schemas-microsoft-com:vml" xmlns:pvml="urn:schemas-microsoft-com:office:powerpoint" xmlns:com="http://schemas.openxmlformats.org/drawingml/2006/compatibility" xmlns:p14="http://schemas.microsoft.com/office/powerpoint/2010/main" xmlns:p15="http://schemas.microsoft.com/office/powerpoint/2012/main" xmlns:ahyp="http://schemas.microsoft.com/office/drawing/2018/hyperlinkcolor" showMasterPhAnim="0" showMasterSp="0">
+  <p:cSld>
+    <p:spTree>
+      <p:nvGrpSpPr>
+        <p:cNvPr id="167" name="Shape 167"/>
+        <p:cNvGrpSpPr/>
+        <p:nvPr/>
+      </p:nvGrpSpPr>
+      <p:grpSpPr>
+        <a:xfrm>
+          <a:off x="0" y="0"/>
+          <a:ext cx="0" cy="0"/>
+          <a:chOff x="0" y="0"/>
+          <a:chExt cx="0" cy="0"/>
+        </a:xfrm>
+      </p:grpSpPr>
+      <p:sp>
+        <p:nvSpPr>
+          <p:cNvPr id="168" name="Google Shape;168;g27821c306df_0_6:notes"/>
+          <p:cNvSpPr/>
+          <p:nvPr>
+            <p:ph idx="2" type="sldImg"/>
+          </p:nvPr>
+        </p:nvSpPr>
+        <p:spPr>
+          <a:xfrm>
+            <a:off x="381300" y="685800"/>
+            <a:ext cx="6096000" cy="3429000"/>
+          </a:xfrm>
+          <a:custGeom>
+            <a:rect b="b" l="l" r="r" t="t"/>
+            <a:pathLst>
+              <a:path extrusionOk="0" h="120000" w="120000">
+                <a:moveTo>
+                  <a:pt x="0" y="0"/>
+                </a:moveTo>
+                <a:lnTo>
+                  <a:pt x="120000" y="0"/>
+                </a:lnTo>
+                <a:lnTo>
+                  <a:pt x="120000" y="120000"/>
+                </a:lnTo>
+                <a:lnTo>
+                  <a:pt x="0" y="120000"/>
+                </a:lnTo>
+                <a:close/>
+              </a:path>
+            </a:pathLst>
+          </a:custGeom>
+        </p:spPr>
+      </p:sp>
+      <p:sp>
+        <p:nvSpPr>
+          <p:cNvPr id="169" name="Google Shape;169;g27821c306df_0_6:notes"/>
           <p:cNvSpPr txBox="1"/>
           <p:nvPr>
             <p:ph idx="1" type="body"/>
@@ -6991,7 +7191,7 @@
                 <a:cs typeface="Times New Roman"/>
                 <a:sym typeface="Times New Roman"/>
               </a:rPr>
-              <a:t>2024/07/12</a:t>
+              <a:t>2024/07/15</a:t>
             </a:r>
             <a:endParaRPr>
               <a:latin typeface="Times New Roman"/>
@@ -8724,6 +8924,1017 @@
               <a:t/>
             </a:r>
             <a:endParaRPr/>
+          </a:p>
+        </p:txBody>
+      </p:sp>
+    </p:spTree>
+  </p:cSld>
+  <p:clrMapOvr>
+    <a:masterClrMapping/>
+  </p:clrMapOvr>
+</p:sld>
+</file>
+
+<file path=ppt/slides/slide15.xml><?xml version="1.0" encoding="utf-8"?>
+<p:sld xmlns:a="http://schemas.openxmlformats.org/drawingml/2006/main" xmlns:r="http://schemas.openxmlformats.org/officeDocument/2006/relationships" xmlns:mc="http://schemas.openxmlformats.org/markup-compatibility/2006" xmlns:mv="urn:schemas-microsoft-com:mac:vml" xmlns:p="http://schemas.openxmlformats.org/presentationml/2006/main" xmlns:c="http://schemas.openxmlformats.org/drawingml/2006/chart" xmlns:dgm="http://schemas.openxmlformats.org/drawingml/2006/diagram" xmlns:o="urn:schemas-microsoft-com:office:office" xmlns:v="urn:schemas-microsoft-com:vml" xmlns:pvml="urn:schemas-microsoft-com:office:powerpoint" xmlns:com="http://schemas.openxmlformats.org/drawingml/2006/compatibility" xmlns:p14="http://schemas.microsoft.com/office/powerpoint/2010/main" xmlns:p15="http://schemas.microsoft.com/office/powerpoint/2012/main" xmlns:ahyp="http://schemas.microsoft.com/office/drawing/2018/hyperlinkcolor">
+  <p:cSld>
+    <p:spTree>
+      <p:nvGrpSpPr>
+        <p:cNvPr id="161" name="Shape 161"/>
+        <p:cNvGrpSpPr/>
+        <p:nvPr/>
+      </p:nvGrpSpPr>
+      <p:grpSpPr>
+        <a:xfrm>
+          <a:off x="0" y="0"/>
+          <a:ext cx="0" cy="0"/>
+          <a:chOff x="0" y="0"/>
+          <a:chExt cx="0" cy="0"/>
+        </a:xfrm>
+      </p:grpSpPr>
+      <p:sp>
+        <p:nvSpPr>
+          <p:cNvPr id="162" name="Google Shape;162;p27"/>
+          <p:cNvSpPr txBox="1"/>
+          <p:nvPr>
+            <p:ph type="title"/>
+          </p:nvPr>
+        </p:nvSpPr>
+        <p:spPr>
+          <a:xfrm>
+            <a:off x="311700" y="445025"/>
+            <a:ext cx="8520600" cy="572700"/>
+          </a:xfrm>
+          <a:prstGeom prst="rect">
+            <a:avLst/>
+          </a:prstGeom>
+        </p:spPr>
+        <p:txBody>
+          <a:bodyPr anchorCtr="0" anchor="t" bIns="91425" lIns="91425" spcFirstLastPara="1" rIns="91425" wrap="square" tIns="91425">
+            <a:normAutofit fontScale="90000"/>
+          </a:bodyPr>
+          <a:lstStyle/>
+          <a:p>
+            <a:pPr indent="0" lvl="0" marL="0" rtl="0" algn="l">
+              <a:spcBef>
+                <a:spcPts val="0"/>
+              </a:spcBef>
+              <a:spcAft>
+                <a:spcPts val="0"/>
+              </a:spcAft>
+              <a:buNone/>
+            </a:pPr>
+            <a:r>
+              <a:rPr lang="zh-TW">
+                <a:latin typeface="DFKai-SB"/>
+                <a:ea typeface="DFKai-SB"/>
+                <a:cs typeface="DFKai-SB"/>
+                <a:sym typeface="DFKai-SB"/>
+              </a:rPr>
+              <a:t>錯誤</a:t>
+            </a:r>
+            <a:r>
+              <a:rPr lang="zh-TW"/>
+              <a:t> </a:t>
+            </a:r>
+            <a:r>
+              <a:rPr lang="zh-TW">
+                <a:latin typeface="Times New Roman"/>
+                <a:ea typeface="Times New Roman"/>
+                <a:cs typeface="Times New Roman"/>
+                <a:sym typeface="Times New Roman"/>
+              </a:rPr>
+              <a:t>7</a:t>
+            </a:r>
+            <a:endParaRPr>
+              <a:latin typeface="Times New Roman"/>
+              <a:ea typeface="Times New Roman"/>
+              <a:cs typeface="Times New Roman"/>
+              <a:sym typeface="Times New Roman"/>
+            </a:endParaRPr>
+          </a:p>
+        </p:txBody>
+      </p:sp>
+      <p:sp>
+        <p:nvSpPr>
+          <p:cNvPr id="163" name="Google Shape;163;p27"/>
+          <p:cNvSpPr txBox="1"/>
+          <p:nvPr>
+            <p:ph idx="1" type="body"/>
+          </p:nvPr>
+        </p:nvSpPr>
+        <p:spPr>
+          <a:xfrm>
+            <a:off x="311700" y="1152475"/>
+            <a:ext cx="8520600" cy="3896700"/>
+          </a:xfrm>
+          <a:prstGeom prst="rect">
+            <a:avLst/>
+          </a:prstGeom>
+        </p:spPr>
+        <p:txBody>
+          <a:bodyPr anchorCtr="0" anchor="t" bIns="91425" lIns="91425" spcFirstLastPara="1" rIns="91425" wrap="square" tIns="91425">
+            <a:normAutofit/>
+          </a:bodyPr>
+          <a:lstStyle/>
+          <a:p>
+            <a:pPr indent="-342900" lvl="0" marL="457200" rtl="0" algn="l">
+              <a:spcBef>
+                <a:spcPts val="0"/>
+              </a:spcBef>
+              <a:spcAft>
+                <a:spcPts val="0"/>
+              </a:spcAft>
+              <a:buSzPts val="1800"/>
+              <a:buFont typeface="DFKai-SB"/>
+              <a:buChar char="●"/>
+            </a:pPr>
+            <a:r>
+              <a:rPr lang="zh-TW">
+                <a:latin typeface="DFKai-SB"/>
+                <a:ea typeface="DFKai-SB"/>
+                <a:cs typeface="DFKai-SB"/>
+                <a:sym typeface="DFKai-SB"/>
+              </a:rPr>
+              <a:t>錯誤資訊：</a:t>
+            </a:r>
+            <a:endParaRPr>
+              <a:latin typeface="DFKai-SB"/>
+              <a:ea typeface="DFKai-SB"/>
+              <a:cs typeface="DFKai-SB"/>
+              <a:sym typeface="DFKai-SB"/>
+            </a:endParaRPr>
+          </a:p>
+          <a:p>
+            <a:pPr indent="0" lvl="0" marL="457200" rtl="0" algn="l">
+              <a:spcBef>
+                <a:spcPts val="1200"/>
+              </a:spcBef>
+              <a:spcAft>
+                <a:spcPts val="0"/>
+              </a:spcAft>
+              <a:buNone/>
+            </a:pPr>
+            <a:r>
+              <a:rPr lang="zh-TW" sz="1300">
+                <a:latin typeface="DFKai-SB"/>
+                <a:ea typeface="DFKai-SB"/>
+                <a:cs typeface="DFKai-SB"/>
+                <a:sym typeface="DFKai-SB"/>
+              </a:rPr>
+              <a:t>試圖迴避利用查詢字串作為網站連線的依據，則是</a:t>
+            </a:r>
+            <a:r>
+              <a:rPr lang="zh-TW" sz="1300">
+                <a:latin typeface="DFKai-SB"/>
+                <a:ea typeface="DFKai-SB"/>
+                <a:cs typeface="DFKai-SB"/>
+                <a:sym typeface="DFKai-SB"/>
+              </a:rPr>
+              <a:t>想要</a:t>
+            </a:r>
+            <a:r>
+              <a:rPr lang="zh-TW" sz="1300">
+                <a:latin typeface="DFKai-SB"/>
+                <a:ea typeface="DFKai-SB"/>
+                <a:cs typeface="DFKai-SB"/>
+                <a:sym typeface="DFKai-SB"/>
+              </a:rPr>
+              <a:t>透過路由屬性[Route()]修改Action的連線路徑並使用「asp-route-</a:t>
+            </a:r>
+            <a:r>
+              <a:rPr lang="zh-TW" sz="1200">
+                <a:latin typeface="DFKai-SB"/>
+                <a:ea typeface="DFKai-SB"/>
+                <a:cs typeface="DFKai-SB"/>
+                <a:sym typeface="DFKai-SB"/>
+              </a:rPr>
+              <a:t>」</a:t>
+            </a:r>
+            <a:r>
+              <a:rPr lang="zh-TW" sz="1300">
+                <a:latin typeface="DFKai-SB"/>
+                <a:ea typeface="DFKai-SB"/>
+                <a:cs typeface="DFKai-SB"/>
+                <a:sym typeface="DFKai-SB"/>
+              </a:rPr>
+              <a:t>來作為路由導引，但是找不到目標網站</a:t>
+            </a:r>
+            <a:r>
+              <a:rPr lang="zh-TW" sz="1300">
+                <a:latin typeface="DFKai-SB"/>
+                <a:ea typeface="DFKai-SB"/>
+                <a:cs typeface="DFKai-SB"/>
+                <a:sym typeface="DFKai-SB"/>
+              </a:rPr>
+              <a:t>。</a:t>
+            </a:r>
+            <a:endParaRPr sz="1300">
+              <a:latin typeface="DFKai-SB"/>
+              <a:ea typeface="DFKai-SB"/>
+              <a:cs typeface="DFKai-SB"/>
+              <a:sym typeface="DFKai-SB"/>
+            </a:endParaRPr>
+          </a:p>
+          <a:p>
+            <a:pPr indent="-342900" lvl="0" marL="457200" rtl="0" algn="l">
+              <a:spcBef>
+                <a:spcPts val="1200"/>
+              </a:spcBef>
+              <a:spcAft>
+                <a:spcPts val="0"/>
+              </a:spcAft>
+              <a:buSzPts val="1800"/>
+              <a:buFont typeface="DFKai-SB"/>
+              <a:buChar char="●"/>
+            </a:pPr>
+            <a:r>
+              <a:rPr lang="zh-TW">
+                <a:latin typeface="DFKai-SB"/>
+                <a:ea typeface="DFKai-SB"/>
+                <a:cs typeface="DFKai-SB"/>
+                <a:sym typeface="DFKai-SB"/>
+              </a:rPr>
+              <a:t>原因：</a:t>
+            </a:r>
+            <a:endParaRPr>
+              <a:latin typeface="DFKai-SB"/>
+              <a:ea typeface="DFKai-SB"/>
+              <a:cs typeface="DFKai-SB"/>
+              <a:sym typeface="DFKai-SB"/>
+            </a:endParaRPr>
+          </a:p>
+          <a:p>
+            <a:pPr indent="0" lvl="0" marL="457200" rtl="0" algn="l">
+              <a:lnSpc>
+                <a:spcPct val="100000"/>
+              </a:lnSpc>
+              <a:spcBef>
+                <a:spcPts val="1200"/>
+              </a:spcBef>
+              <a:spcAft>
+                <a:spcPts val="0"/>
+              </a:spcAft>
+              <a:buNone/>
+            </a:pPr>
+            <a:r>
+              <a:rPr lang="zh-TW" sz="1300">
+                <a:latin typeface="DFKai-SB"/>
+                <a:ea typeface="DFKai-SB"/>
+                <a:cs typeface="DFKai-SB"/>
+                <a:sym typeface="DFKai-SB"/>
+              </a:rPr>
+              <a:t>欲作為路由引導的參數並未傳到對應的Action，主要是因為路由屬性沒有對應到「asp-route-</a:t>
+            </a:r>
+            <a:r>
+              <a:rPr lang="zh-TW" sz="1200">
+                <a:latin typeface="DFKai-SB"/>
+                <a:ea typeface="DFKai-SB"/>
+                <a:cs typeface="DFKai-SB"/>
+                <a:sym typeface="DFKai-SB"/>
+              </a:rPr>
+              <a:t>」</a:t>
+            </a:r>
+            <a:r>
+              <a:rPr lang="zh-TW" sz="1300">
+                <a:latin typeface="DFKai-SB"/>
+                <a:ea typeface="DFKai-SB"/>
+                <a:cs typeface="DFKai-SB"/>
+                <a:sym typeface="DFKai-SB"/>
+              </a:rPr>
+              <a:t>。</a:t>
+            </a:r>
+            <a:endParaRPr sz="1200">
+              <a:latin typeface="DFKai-SB"/>
+              <a:ea typeface="DFKai-SB"/>
+              <a:cs typeface="DFKai-SB"/>
+              <a:sym typeface="DFKai-SB"/>
+            </a:endParaRPr>
+          </a:p>
+          <a:p>
+            <a:pPr indent="-342900" lvl="0" marL="457200" rtl="0" algn="l">
+              <a:spcBef>
+                <a:spcPts val="1200"/>
+              </a:spcBef>
+              <a:spcAft>
+                <a:spcPts val="0"/>
+              </a:spcAft>
+              <a:buSzPts val="1800"/>
+              <a:buFont typeface="DFKai-SB"/>
+              <a:buChar char="●"/>
+            </a:pPr>
+            <a:r>
+              <a:rPr lang="zh-TW">
+                <a:latin typeface="DFKai-SB"/>
+                <a:ea typeface="DFKai-SB"/>
+                <a:cs typeface="DFKai-SB"/>
+                <a:sym typeface="DFKai-SB"/>
+              </a:rPr>
+              <a:t>解決方法：</a:t>
+            </a:r>
+            <a:endParaRPr>
+              <a:latin typeface="DFKai-SB"/>
+              <a:ea typeface="DFKai-SB"/>
+              <a:cs typeface="DFKai-SB"/>
+              <a:sym typeface="DFKai-SB"/>
+            </a:endParaRPr>
+          </a:p>
+          <a:p>
+            <a:pPr indent="0" lvl="0" marL="0" rtl="0" algn="l">
+              <a:spcBef>
+                <a:spcPts val="1200"/>
+              </a:spcBef>
+              <a:spcAft>
+                <a:spcPts val="0"/>
+              </a:spcAft>
+              <a:buNone/>
+            </a:pPr>
+            <a:r>
+              <a:rPr lang="zh-TW" sz="1300">
+                <a:latin typeface="DFKai-SB"/>
+                <a:ea typeface="DFKai-SB"/>
+                <a:cs typeface="DFKai-SB"/>
+                <a:sym typeface="DFKai-SB"/>
+              </a:rPr>
+              <a:t>	</a:t>
+            </a:r>
+            <a:r>
+              <a:rPr lang="zh-TW" sz="1300">
+                <a:latin typeface="DFKai-SB"/>
+                <a:ea typeface="DFKai-SB"/>
+                <a:cs typeface="DFKai-SB"/>
+                <a:sym typeface="DFKai-SB"/>
+              </a:rPr>
+              <a:t>路由屬性和「asp-route-</a:t>
+            </a:r>
+            <a:r>
+              <a:rPr lang="zh-TW" sz="1200">
+                <a:latin typeface="DFKai-SB"/>
+                <a:ea typeface="DFKai-SB"/>
+                <a:cs typeface="DFKai-SB"/>
+                <a:sym typeface="DFKai-SB"/>
+              </a:rPr>
+              <a:t>」必須使用同一個參數「名稱」</a:t>
+            </a:r>
+            <a:r>
+              <a:rPr lang="zh-TW" sz="1300">
+                <a:latin typeface="DFKai-SB"/>
+                <a:ea typeface="DFKai-SB"/>
+                <a:cs typeface="DFKai-SB"/>
+                <a:sym typeface="DFKai-SB"/>
+              </a:rPr>
+              <a:t>。</a:t>
+            </a:r>
+            <a:endParaRPr sz="1300">
+              <a:latin typeface="DFKai-SB"/>
+              <a:ea typeface="DFKai-SB"/>
+              <a:cs typeface="DFKai-SB"/>
+              <a:sym typeface="DFKai-SB"/>
+            </a:endParaRPr>
+          </a:p>
+          <a:p>
+            <a:pPr indent="-342900" lvl="0" marL="457200" rtl="0" algn="l">
+              <a:spcBef>
+                <a:spcPts val="1200"/>
+              </a:spcBef>
+              <a:spcAft>
+                <a:spcPts val="0"/>
+              </a:spcAft>
+              <a:buSzPts val="1800"/>
+              <a:buFont typeface="DFKai-SB"/>
+              <a:buChar char="●"/>
+            </a:pPr>
+            <a:r>
+              <a:rPr lang="zh-TW">
+                <a:latin typeface="DFKai-SB"/>
+                <a:ea typeface="DFKai-SB"/>
+                <a:cs typeface="DFKai-SB"/>
+                <a:sym typeface="DFKai-SB"/>
+              </a:rPr>
+              <a:t>備註：</a:t>
+            </a:r>
+            <a:endParaRPr>
+              <a:latin typeface="DFKai-SB"/>
+              <a:ea typeface="DFKai-SB"/>
+              <a:cs typeface="DFKai-SB"/>
+              <a:sym typeface="DFKai-SB"/>
+            </a:endParaRPr>
+          </a:p>
+          <a:p>
+            <a:pPr indent="0" lvl="0" marL="457200" rtl="0" algn="l">
+              <a:spcBef>
+                <a:spcPts val="1200"/>
+              </a:spcBef>
+              <a:spcAft>
+                <a:spcPts val="1200"/>
+              </a:spcAft>
+              <a:buNone/>
+            </a:pPr>
+            <a:r>
+              <a:rPr lang="zh-TW" sz="1300">
+                <a:latin typeface="DFKai-SB"/>
+                <a:ea typeface="DFKai-SB"/>
+                <a:cs typeface="DFKai-SB"/>
+                <a:sym typeface="DFKai-SB"/>
+              </a:rPr>
+              <a:t>這個錯誤目前跟app.MapControllerRoute()無關。</a:t>
+            </a:r>
+            <a:endParaRPr sz="1300">
+              <a:latin typeface="DFKai-SB"/>
+              <a:ea typeface="DFKai-SB"/>
+              <a:cs typeface="DFKai-SB"/>
+              <a:sym typeface="DFKai-SB"/>
+            </a:endParaRPr>
+          </a:p>
+        </p:txBody>
+      </p:sp>
+      <p:pic>
+        <p:nvPicPr>
+          <p:cNvPr id="164" name="Google Shape;164;p27"/>
+          <p:cNvPicPr preferRelativeResize="0"/>
+          <p:nvPr/>
+        </p:nvPicPr>
+        <p:blipFill>
+          <a:blip r:embed="rId3">
+            <a:alphaModFix/>
+          </a:blip>
+          <a:stretch>
+            <a:fillRect/>
+          </a:stretch>
+        </p:blipFill>
+        <p:spPr>
+          <a:xfrm>
+            <a:off x="1923575" y="858025"/>
+            <a:ext cx="3037375" cy="213900"/>
+          </a:xfrm>
+          <a:prstGeom prst="rect">
+            <a:avLst/>
+          </a:prstGeom>
+          <a:noFill/>
+          <a:ln>
+            <a:noFill/>
+          </a:ln>
+        </p:spPr>
+      </p:pic>
+      <p:pic>
+        <p:nvPicPr>
+          <p:cNvPr id="165" name="Google Shape;165;p27"/>
+          <p:cNvPicPr preferRelativeResize="0"/>
+          <p:nvPr/>
+        </p:nvPicPr>
+        <p:blipFill>
+          <a:blip r:embed="rId4">
+            <a:alphaModFix/>
+          </a:blip>
+          <a:stretch>
+            <a:fillRect/>
+          </a:stretch>
+        </p:blipFill>
+        <p:spPr>
+          <a:xfrm>
+            <a:off x="6127175" y="858025"/>
+            <a:ext cx="1327980" cy="213900"/>
+          </a:xfrm>
+          <a:prstGeom prst="rect">
+            <a:avLst/>
+          </a:prstGeom>
+          <a:noFill/>
+          <a:ln>
+            <a:noFill/>
+          </a:ln>
+        </p:spPr>
+      </p:pic>
+      <p:sp>
+        <p:nvSpPr>
+          <p:cNvPr id="166" name="Google Shape;166;p27"/>
+          <p:cNvSpPr/>
+          <p:nvPr/>
+        </p:nvSpPr>
+        <p:spPr>
+          <a:xfrm>
+            <a:off x="4960950" y="858025"/>
+            <a:ext cx="1166100" cy="213900"/>
+          </a:xfrm>
+          <a:prstGeom prst="rightArrow">
+            <a:avLst>
+              <a:gd fmla="val 50000" name="adj1"/>
+              <a:gd fmla="val 50000" name="adj2"/>
+            </a:avLst>
+          </a:prstGeom>
+          <a:solidFill>
+            <a:schemeClr val="lt2"/>
+          </a:solidFill>
+          <a:ln cap="flat" cmpd="sng" w="9525">
+            <a:solidFill>
+              <a:schemeClr val="dk2"/>
+            </a:solidFill>
+            <a:prstDash val="solid"/>
+            <a:round/>
+            <a:headEnd len="sm" w="sm" type="none"/>
+            <a:tailEnd len="sm" w="sm" type="none"/>
+          </a:ln>
+        </p:spPr>
+        <p:txBody>
+          <a:bodyPr anchorCtr="0" anchor="ctr" bIns="91425" lIns="91425" spcFirstLastPara="1" rIns="91425" wrap="square" tIns="91425">
+            <a:noAutofit/>
+          </a:bodyPr>
+          <a:lstStyle/>
+          <a:p>
+            <a:pPr indent="0" lvl="0" marL="0" rtl="0" algn="ctr">
+              <a:spcBef>
+                <a:spcPts val="0"/>
+              </a:spcBef>
+              <a:spcAft>
+                <a:spcPts val="0"/>
+              </a:spcAft>
+              <a:buNone/>
+            </a:pPr>
+            <a:r>
+              <a:t/>
+            </a:r>
+            <a:endParaRPr/>
+          </a:p>
+        </p:txBody>
+      </p:sp>
+    </p:spTree>
+  </p:cSld>
+  <p:clrMapOvr>
+    <a:masterClrMapping/>
+  </p:clrMapOvr>
+</p:sld>
+</file>
+
+<file path=ppt/slides/slide16.xml><?xml version="1.0" encoding="utf-8"?>
+<p:sld xmlns:a="http://schemas.openxmlformats.org/drawingml/2006/main" xmlns:r="http://schemas.openxmlformats.org/officeDocument/2006/relationships" xmlns:mc="http://schemas.openxmlformats.org/markup-compatibility/2006" xmlns:mv="urn:schemas-microsoft-com:mac:vml" xmlns:p="http://schemas.openxmlformats.org/presentationml/2006/main" xmlns:c="http://schemas.openxmlformats.org/drawingml/2006/chart" xmlns:dgm="http://schemas.openxmlformats.org/drawingml/2006/diagram" xmlns:o="urn:schemas-microsoft-com:office:office" xmlns:v="urn:schemas-microsoft-com:vml" xmlns:pvml="urn:schemas-microsoft-com:office:powerpoint" xmlns:com="http://schemas.openxmlformats.org/drawingml/2006/compatibility" xmlns:p14="http://schemas.microsoft.com/office/powerpoint/2010/main" xmlns:p15="http://schemas.microsoft.com/office/powerpoint/2012/main" xmlns:ahyp="http://schemas.microsoft.com/office/drawing/2018/hyperlinkcolor">
+  <p:cSld>
+    <p:bg>
+      <p:bgPr>
+        <a:solidFill>
+          <a:schemeClr val="dk1"/>
+        </a:solidFill>
+      </p:bgPr>
+    </p:bg>
+    <p:spTree>
+      <p:nvGrpSpPr>
+        <p:cNvPr id="170" name="Shape 170"/>
+        <p:cNvGrpSpPr/>
+        <p:nvPr/>
+      </p:nvGrpSpPr>
+      <p:grpSpPr>
+        <a:xfrm>
+          <a:off x="0" y="0"/>
+          <a:ext cx="0" cy="0"/>
+          <a:chOff x="0" y="0"/>
+          <a:chExt cx="0" cy="0"/>
+        </a:xfrm>
+      </p:grpSpPr>
+      <p:pic>
+        <p:nvPicPr>
+          <p:cNvPr id="171" name="Google Shape;171;p28"/>
+          <p:cNvPicPr preferRelativeResize="0"/>
+          <p:nvPr/>
+        </p:nvPicPr>
+        <p:blipFill>
+          <a:blip r:embed="rId3">
+            <a:alphaModFix/>
+          </a:blip>
+          <a:stretch>
+            <a:fillRect/>
+          </a:stretch>
+        </p:blipFill>
+        <p:spPr>
+          <a:xfrm>
+            <a:off x="180838" y="3369075"/>
+            <a:ext cx="5715074" cy="1632875"/>
+          </a:xfrm>
+          <a:prstGeom prst="rect">
+            <a:avLst/>
+          </a:prstGeom>
+          <a:noFill/>
+          <a:ln>
+            <a:noFill/>
+          </a:ln>
+        </p:spPr>
+      </p:pic>
+      <p:pic>
+        <p:nvPicPr>
+          <p:cNvPr id="172" name="Google Shape;172;p28"/>
+          <p:cNvPicPr preferRelativeResize="0"/>
+          <p:nvPr/>
+        </p:nvPicPr>
+        <p:blipFill>
+          <a:blip r:embed="rId4">
+            <a:alphaModFix/>
+          </a:blip>
+          <a:stretch>
+            <a:fillRect/>
+          </a:stretch>
+        </p:blipFill>
+        <p:spPr>
+          <a:xfrm>
+            <a:off x="1360950" y="2549950"/>
+            <a:ext cx="7665075" cy="203875"/>
+          </a:xfrm>
+          <a:prstGeom prst="rect">
+            <a:avLst/>
+          </a:prstGeom>
+          <a:noFill/>
+          <a:ln>
+            <a:noFill/>
+          </a:ln>
+        </p:spPr>
+      </p:pic>
+      <p:pic>
+        <p:nvPicPr>
+          <p:cNvPr id="173" name="Google Shape;173;p28"/>
+          <p:cNvPicPr preferRelativeResize="0"/>
+          <p:nvPr/>
+        </p:nvPicPr>
+        <p:blipFill>
+          <a:blip r:embed="rId5">
+            <a:alphaModFix/>
+          </a:blip>
+          <a:stretch>
+            <a:fillRect/>
+          </a:stretch>
+        </p:blipFill>
+        <p:spPr>
+          <a:xfrm>
+            <a:off x="180850" y="299475"/>
+            <a:ext cx="5715049" cy="1635225"/>
+          </a:xfrm>
+          <a:prstGeom prst="rect">
+            <a:avLst/>
+          </a:prstGeom>
+          <a:noFill/>
+          <a:ln>
+            <a:noFill/>
+          </a:ln>
+        </p:spPr>
+      </p:pic>
+      <p:sp>
+        <p:nvSpPr>
+          <p:cNvPr id="174" name="Google Shape;174;p28"/>
+          <p:cNvSpPr/>
+          <p:nvPr/>
+        </p:nvSpPr>
+        <p:spPr>
+          <a:xfrm>
+            <a:off x="298850" y="1934700"/>
+            <a:ext cx="665400" cy="1434300"/>
+          </a:xfrm>
+          <a:prstGeom prst="downArrow">
+            <a:avLst>
+              <a:gd fmla="val 50000" name="adj1"/>
+              <a:gd fmla="val 50000" name="adj2"/>
+            </a:avLst>
+          </a:prstGeom>
+          <a:solidFill>
+            <a:schemeClr val="lt2"/>
+          </a:solidFill>
+          <a:ln cap="flat" cmpd="sng" w="9525">
+            <a:solidFill>
+              <a:schemeClr val="dk2"/>
+            </a:solidFill>
+            <a:prstDash val="solid"/>
+            <a:round/>
+            <a:headEnd len="sm" w="sm" type="none"/>
+            <a:tailEnd len="sm" w="sm" type="none"/>
+          </a:ln>
+        </p:spPr>
+        <p:txBody>
+          <a:bodyPr anchorCtr="0" anchor="ctr" bIns="91425" lIns="91425" spcFirstLastPara="1" rIns="91425" wrap="square" tIns="91425">
+            <a:noAutofit/>
+          </a:bodyPr>
+          <a:lstStyle/>
+          <a:p>
+            <a:pPr indent="0" lvl="0" marL="0" rtl="0" algn="ctr">
+              <a:spcBef>
+                <a:spcPts val="0"/>
+              </a:spcBef>
+              <a:spcAft>
+                <a:spcPts val="0"/>
+              </a:spcAft>
+              <a:buNone/>
+            </a:pPr>
+            <a:r>
+              <a:rPr lang="zh-TW"/>
+              <a:t>修改</a:t>
+            </a:r>
+            <a:endParaRPr/>
+          </a:p>
+        </p:txBody>
+      </p:sp>
+      <p:sp>
+        <p:nvSpPr>
+          <p:cNvPr id="175" name="Google Shape;175;p28"/>
+          <p:cNvSpPr/>
+          <p:nvPr/>
+        </p:nvSpPr>
+        <p:spPr>
+          <a:xfrm>
+            <a:off x="1334375" y="259600"/>
+            <a:ext cx="256200" cy="204000"/>
+          </a:xfrm>
+          <a:prstGeom prst="frame">
+            <a:avLst>
+              <a:gd fmla="val 7501" name="adj1"/>
+            </a:avLst>
+          </a:prstGeom>
+          <a:solidFill>
+            <a:schemeClr val="lt2"/>
+          </a:solidFill>
+          <a:ln cap="flat" cmpd="sng" w="9525">
+            <a:solidFill>
+              <a:schemeClr val="dk2"/>
+            </a:solidFill>
+            <a:prstDash val="solid"/>
+            <a:round/>
+            <a:headEnd len="sm" w="sm" type="none"/>
+            <a:tailEnd len="sm" w="sm" type="none"/>
+          </a:ln>
+        </p:spPr>
+        <p:txBody>
+          <a:bodyPr anchorCtr="0" anchor="ctr" bIns="91425" lIns="91425" spcFirstLastPara="1" rIns="91425" wrap="square" tIns="91425">
+            <a:noAutofit/>
+          </a:bodyPr>
+          <a:lstStyle/>
+          <a:p>
+            <a:pPr indent="0" lvl="0" marL="0" rtl="0" algn="ctr">
+              <a:spcBef>
+                <a:spcPts val="0"/>
+              </a:spcBef>
+              <a:spcAft>
+                <a:spcPts val="0"/>
+              </a:spcAft>
+              <a:buNone/>
+            </a:pPr>
+            <a:r>
+              <a:t/>
+            </a:r>
+            <a:endParaRPr/>
+          </a:p>
+        </p:txBody>
+      </p:sp>
+      <p:sp>
+        <p:nvSpPr>
+          <p:cNvPr id="176" name="Google Shape;176;p28"/>
+          <p:cNvSpPr/>
+          <p:nvPr/>
+        </p:nvSpPr>
+        <p:spPr>
+          <a:xfrm>
+            <a:off x="1334375" y="3330875"/>
+            <a:ext cx="665400" cy="204000"/>
+          </a:xfrm>
+          <a:prstGeom prst="frame">
+            <a:avLst>
+              <a:gd fmla="val 7501" name="adj1"/>
+            </a:avLst>
+          </a:prstGeom>
+          <a:solidFill>
+            <a:schemeClr val="lt2"/>
+          </a:solidFill>
+          <a:ln cap="flat" cmpd="sng" w="9525">
+            <a:solidFill>
+              <a:schemeClr val="dk2"/>
+            </a:solidFill>
+            <a:prstDash val="solid"/>
+            <a:round/>
+            <a:headEnd len="sm" w="sm" type="none"/>
+            <a:tailEnd len="sm" w="sm" type="none"/>
+          </a:ln>
+        </p:spPr>
+        <p:txBody>
+          <a:bodyPr anchorCtr="0" anchor="ctr" bIns="91425" lIns="91425" spcFirstLastPara="1" rIns="91425" wrap="square" tIns="91425">
+            <a:noAutofit/>
+          </a:bodyPr>
+          <a:lstStyle/>
+          <a:p>
+            <a:pPr indent="0" lvl="0" marL="0" rtl="0" algn="ctr">
+              <a:spcBef>
+                <a:spcPts val="0"/>
+              </a:spcBef>
+              <a:spcAft>
+                <a:spcPts val="0"/>
+              </a:spcAft>
+              <a:buNone/>
+            </a:pPr>
+            <a:r>
+              <a:t/>
+            </a:r>
+            <a:endParaRPr/>
+          </a:p>
+        </p:txBody>
+      </p:sp>
+      <p:sp>
+        <p:nvSpPr>
+          <p:cNvPr id="177" name="Google Shape;177;p28"/>
+          <p:cNvSpPr/>
+          <p:nvPr/>
+        </p:nvSpPr>
+        <p:spPr>
+          <a:xfrm>
+            <a:off x="1309275" y="3289375"/>
+            <a:ext cx="737700" cy="307800"/>
+          </a:xfrm>
+          <a:prstGeom prst="frame">
+            <a:avLst>
+              <a:gd fmla="val 7501" name="adj1"/>
+            </a:avLst>
+          </a:prstGeom>
+          <a:solidFill>
+            <a:srgbClr val="FF0000"/>
+          </a:solidFill>
+          <a:ln cap="flat" cmpd="sng" w="9525">
+            <a:solidFill>
+              <a:schemeClr val="dk2"/>
+            </a:solidFill>
+            <a:prstDash val="solid"/>
+            <a:round/>
+            <a:headEnd len="sm" w="sm" type="none"/>
+            <a:tailEnd len="sm" w="sm" type="none"/>
+          </a:ln>
+        </p:spPr>
+        <p:txBody>
+          <a:bodyPr anchorCtr="0" anchor="ctr" bIns="91425" lIns="91425" spcFirstLastPara="1" rIns="91425" wrap="square" tIns="91425">
+            <a:noAutofit/>
+          </a:bodyPr>
+          <a:lstStyle/>
+          <a:p>
+            <a:pPr indent="0" lvl="0" marL="0" rtl="0" algn="ctr">
+              <a:spcBef>
+                <a:spcPts val="0"/>
+              </a:spcBef>
+              <a:spcAft>
+                <a:spcPts val="0"/>
+              </a:spcAft>
+              <a:buNone/>
+            </a:pPr>
+            <a:r>
+              <a:t/>
+            </a:r>
+            <a:endParaRPr/>
+          </a:p>
+        </p:txBody>
+      </p:sp>
+      <p:sp>
+        <p:nvSpPr>
+          <p:cNvPr id="178" name="Google Shape;178;p28"/>
+          <p:cNvSpPr/>
+          <p:nvPr/>
+        </p:nvSpPr>
+        <p:spPr>
+          <a:xfrm>
+            <a:off x="3155575" y="3632700"/>
+            <a:ext cx="574800" cy="204000"/>
+          </a:xfrm>
+          <a:prstGeom prst="frame">
+            <a:avLst>
+              <a:gd fmla="val 7501" name="adj1"/>
+            </a:avLst>
+          </a:prstGeom>
+          <a:solidFill>
+            <a:srgbClr val="FF0000"/>
+          </a:solidFill>
+          <a:ln cap="flat" cmpd="sng" w="9525">
+            <a:solidFill>
+              <a:schemeClr val="dk2"/>
+            </a:solidFill>
+            <a:prstDash val="solid"/>
+            <a:round/>
+            <a:headEnd len="sm" w="sm" type="none"/>
+            <a:tailEnd len="sm" w="sm" type="none"/>
+          </a:ln>
+        </p:spPr>
+        <p:txBody>
+          <a:bodyPr anchorCtr="0" anchor="ctr" bIns="91425" lIns="91425" spcFirstLastPara="1" rIns="91425" wrap="square" tIns="91425">
+            <a:noAutofit/>
+          </a:bodyPr>
+          <a:lstStyle/>
+          <a:p>
+            <a:pPr indent="0" lvl="0" marL="0" rtl="0" algn="ctr">
+              <a:spcBef>
+                <a:spcPts val="0"/>
+              </a:spcBef>
+              <a:spcAft>
+                <a:spcPts val="0"/>
+              </a:spcAft>
+              <a:buNone/>
+            </a:pPr>
+            <a:r>
+              <a:t/>
+            </a:r>
+            <a:endParaRPr/>
+          </a:p>
+        </p:txBody>
+      </p:sp>
+      <p:sp>
+        <p:nvSpPr>
+          <p:cNvPr id="179" name="Google Shape;179;p28"/>
+          <p:cNvSpPr/>
+          <p:nvPr/>
+        </p:nvSpPr>
+        <p:spPr>
+          <a:xfrm>
+            <a:off x="6118150" y="2549900"/>
+            <a:ext cx="768300" cy="204000"/>
+          </a:xfrm>
+          <a:prstGeom prst="frame">
+            <a:avLst>
+              <a:gd fmla="val 7501" name="adj1"/>
+            </a:avLst>
+          </a:prstGeom>
+          <a:solidFill>
+            <a:srgbClr val="FF0000"/>
+          </a:solidFill>
+          <a:ln cap="flat" cmpd="sng" w="9525">
+            <a:solidFill>
+              <a:schemeClr val="dk2"/>
+            </a:solidFill>
+            <a:prstDash val="solid"/>
+            <a:round/>
+            <a:headEnd len="sm" w="sm" type="none"/>
+            <a:tailEnd len="sm" w="sm" type="none"/>
+          </a:ln>
+        </p:spPr>
+        <p:txBody>
+          <a:bodyPr anchorCtr="0" anchor="ctr" bIns="91425" lIns="91425" spcFirstLastPara="1" rIns="91425" wrap="square" tIns="91425">
+            <a:noAutofit/>
+          </a:bodyPr>
+          <a:lstStyle/>
+          <a:p>
+            <a:pPr indent="0" lvl="0" marL="0" rtl="0" algn="ctr">
+              <a:spcBef>
+                <a:spcPts val="0"/>
+              </a:spcBef>
+              <a:spcAft>
+                <a:spcPts val="0"/>
+              </a:spcAft>
+              <a:buNone/>
+            </a:pPr>
+            <a:r>
+              <a:t/>
+            </a:r>
+            <a:endParaRPr/>
+          </a:p>
+        </p:txBody>
+      </p:sp>
+      <p:sp>
+        <p:nvSpPr>
+          <p:cNvPr id="180" name="Google Shape;180;p28"/>
+          <p:cNvSpPr txBox="1"/>
+          <p:nvPr/>
+        </p:nvSpPr>
+        <p:spPr>
+          <a:xfrm>
+            <a:off x="5793725" y="2845938"/>
+            <a:ext cx="3188400" cy="431100"/>
+          </a:xfrm>
+          <a:prstGeom prst="rect">
+            <a:avLst/>
+          </a:prstGeom>
+          <a:noFill/>
+          <a:ln>
+            <a:noFill/>
+          </a:ln>
+        </p:spPr>
+        <p:txBody>
+          <a:bodyPr anchorCtr="0" anchor="t" bIns="91425" lIns="91425" spcFirstLastPara="1" rIns="91425" wrap="square" tIns="91425">
+            <a:spAutoFit/>
+          </a:bodyPr>
+          <a:lstStyle/>
+          <a:p>
+            <a:pPr indent="0" lvl="0" marL="0" rtl="0" algn="l">
+              <a:spcBef>
+                <a:spcPts val="0"/>
+              </a:spcBef>
+              <a:spcAft>
+                <a:spcPts val="0"/>
+              </a:spcAft>
+              <a:buNone/>
+            </a:pPr>
+            <a:r>
+              <a:rPr lang="zh-TW" sz="1600">
+                <a:solidFill>
+                  <a:srgbClr val="FF0000"/>
+                </a:solidFill>
+              </a:rPr>
+              <a:t>紅色方框</a:t>
+            </a:r>
+            <a:r>
+              <a:rPr lang="zh-TW" sz="1600">
+                <a:solidFill>
+                  <a:schemeClr val="lt1"/>
+                </a:solidFill>
+              </a:rPr>
+              <a:t>內的名稱必須完全一樣</a:t>
+            </a:r>
+            <a:endParaRPr sz="1600">
+              <a:solidFill>
+                <a:schemeClr val="lt1"/>
+              </a:solidFill>
+            </a:endParaRPr>
           </a:p>
         </p:txBody>
       </p:sp>

</xml_diff>

<commit_message>
Hint: 加入Swagger做測試並新增想要測試的新方法於APItoLINK.cs ProductSystemAPI 新增Swagger套件 Swashbuckle.AspNetCore ProductSystemAPI 修改launchSettings.json weatherforecast -> swagger ProductSystemAPI 新增服務 Program.cs - AddSwaggerGen ProductSystemAPI 新增靜態方法 APItoLINK.cs - AttachSource ProductSystemAPI 新增資料夾 Library ProductSystemAPI 新增類別 GenerateSomething ProductSystemAPI 新增三筆測試資料 ProductAPI.db - ProductInfo C#_ASP.NET_常見錯誤.pptx新增錯誤資訊
</commit_message>
<xml_diff>
--- a/C#_ASP.NET_常見錯誤.pptx
+++ b/C#_ASP.NET_常見錯誤.pptx
@@ -24,6 +24,8 @@
     <p:sldId id="269" r:id="rId19"/>
     <p:sldId id="270" r:id="rId20"/>
     <p:sldId id="271" r:id="rId21"/>
+    <p:sldId id="272" r:id="rId22"/>
+    <p:sldId id="273" r:id="rId23"/>
   </p:sldIdLst>
   <p:sldSz cy="5143500" cx="9144000"/>
   <p:notesSz cx="6858000" cy="9144000"/>
@@ -1449,6 +1451,204 @@
       <p:sp>
         <p:nvSpPr>
           <p:cNvPr id="169" name="Google Shape;169;g27821c306df_0_6:notes"/>
+          <p:cNvSpPr txBox="1"/>
+          <p:nvPr>
+            <p:ph idx="1" type="body"/>
+          </p:nvPr>
+        </p:nvSpPr>
+        <p:spPr>
+          <a:xfrm>
+            <a:off x="685800" y="4343400"/>
+            <a:ext cx="5486400" cy="4114800"/>
+          </a:xfrm>
+          <a:prstGeom prst="rect">
+            <a:avLst/>
+          </a:prstGeom>
+        </p:spPr>
+        <p:txBody>
+          <a:bodyPr anchorCtr="0" anchor="t" bIns="91425" lIns="91425" spcFirstLastPara="1" rIns="91425" wrap="square" tIns="91425">
+            <a:noAutofit/>
+          </a:bodyPr>
+          <a:lstStyle/>
+          <a:p>
+            <a:pPr indent="0" lvl="0" marL="0" rtl="0" algn="l">
+              <a:spcBef>
+                <a:spcPts val="0"/>
+              </a:spcBef>
+              <a:spcAft>
+                <a:spcPts val="0"/>
+              </a:spcAft>
+              <a:buNone/>
+            </a:pPr>
+            <a:r>
+              <a:t/>
+            </a:r>
+            <a:endParaRPr/>
+          </a:p>
+        </p:txBody>
+      </p:sp>
+    </p:spTree>
+  </p:cSld>
+  <p:clrMapOvr>
+    <a:masterClrMapping/>
+  </p:clrMapOvr>
+</p:notes>
+</file>
+
+<file path=ppt/notesSlides/notesSlide17.xml><?xml version="1.0" encoding="utf-8"?>
+<p:notes xmlns:a="http://schemas.openxmlformats.org/drawingml/2006/main" xmlns:r="http://schemas.openxmlformats.org/officeDocument/2006/relationships" xmlns:mc="http://schemas.openxmlformats.org/markup-compatibility/2006" xmlns:mv="urn:schemas-microsoft-com:mac:vml" xmlns:p="http://schemas.openxmlformats.org/presentationml/2006/main" xmlns:c="http://schemas.openxmlformats.org/drawingml/2006/chart" xmlns:dgm="http://schemas.openxmlformats.org/drawingml/2006/diagram" xmlns:o="urn:schemas-microsoft-com:office:office" xmlns:v="urn:schemas-microsoft-com:vml" xmlns:pvml="urn:schemas-microsoft-com:office:powerpoint" xmlns:com="http://schemas.openxmlformats.org/drawingml/2006/compatibility" xmlns:p14="http://schemas.microsoft.com/office/powerpoint/2010/main" xmlns:p15="http://schemas.microsoft.com/office/powerpoint/2012/main" xmlns:ahyp="http://schemas.microsoft.com/office/drawing/2018/hyperlinkcolor" showMasterPhAnim="0" showMasterSp="0">
+  <p:cSld>
+    <p:spTree>
+      <p:nvGrpSpPr>
+        <p:cNvPr id="181" name="Shape 181"/>
+        <p:cNvGrpSpPr/>
+        <p:nvPr/>
+      </p:nvGrpSpPr>
+      <p:grpSpPr>
+        <a:xfrm>
+          <a:off x="0" y="0"/>
+          <a:ext cx="0" cy="0"/>
+          <a:chOff x="0" y="0"/>
+          <a:chExt cx="0" cy="0"/>
+        </a:xfrm>
+      </p:grpSpPr>
+      <p:sp>
+        <p:nvSpPr>
+          <p:cNvPr id="182" name="Google Shape;182;g2782716803f_0_0:notes"/>
+          <p:cNvSpPr/>
+          <p:nvPr>
+            <p:ph idx="2" type="sldImg"/>
+          </p:nvPr>
+        </p:nvSpPr>
+        <p:spPr>
+          <a:xfrm>
+            <a:off x="381300" y="685800"/>
+            <a:ext cx="6096000" cy="3429000"/>
+          </a:xfrm>
+          <a:custGeom>
+            <a:rect b="b" l="l" r="r" t="t"/>
+            <a:pathLst>
+              <a:path extrusionOk="0" h="120000" w="120000">
+                <a:moveTo>
+                  <a:pt x="0" y="0"/>
+                </a:moveTo>
+                <a:lnTo>
+                  <a:pt x="120000" y="0"/>
+                </a:lnTo>
+                <a:lnTo>
+                  <a:pt x="120000" y="120000"/>
+                </a:lnTo>
+                <a:lnTo>
+                  <a:pt x="0" y="120000"/>
+                </a:lnTo>
+                <a:close/>
+              </a:path>
+            </a:pathLst>
+          </a:custGeom>
+        </p:spPr>
+      </p:sp>
+      <p:sp>
+        <p:nvSpPr>
+          <p:cNvPr id="183" name="Google Shape;183;g2782716803f_0_0:notes"/>
+          <p:cNvSpPr txBox="1"/>
+          <p:nvPr>
+            <p:ph idx="1" type="body"/>
+          </p:nvPr>
+        </p:nvSpPr>
+        <p:spPr>
+          <a:xfrm>
+            <a:off x="685800" y="4343400"/>
+            <a:ext cx="5486400" cy="4114800"/>
+          </a:xfrm>
+          <a:prstGeom prst="rect">
+            <a:avLst/>
+          </a:prstGeom>
+        </p:spPr>
+        <p:txBody>
+          <a:bodyPr anchorCtr="0" anchor="t" bIns="91425" lIns="91425" spcFirstLastPara="1" rIns="91425" wrap="square" tIns="91425">
+            <a:noAutofit/>
+          </a:bodyPr>
+          <a:lstStyle/>
+          <a:p>
+            <a:pPr indent="0" lvl="0" marL="0" rtl="0" algn="l">
+              <a:spcBef>
+                <a:spcPts val="0"/>
+              </a:spcBef>
+              <a:spcAft>
+                <a:spcPts val="0"/>
+              </a:spcAft>
+              <a:buNone/>
+            </a:pPr>
+            <a:r>
+              <a:t/>
+            </a:r>
+            <a:endParaRPr/>
+          </a:p>
+        </p:txBody>
+      </p:sp>
+    </p:spTree>
+  </p:cSld>
+  <p:clrMapOvr>
+    <a:masterClrMapping/>
+  </p:clrMapOvr>
+</p:notes>
+</file>
+
+<file path=ppt/notesSlides/notesSlide18.xml><?xml version="1.0" encoding="utf-8"?>
+<p:notes xmlns:a="http://schemas.openxmlformats.org/drawingml/2006/main" xmlns:r="http://schemas.openxmlformats.org/officeDocument/2006/relationships" xmlns:mc="http://schemas.openxmlformats.org/markup-compatibility/2006" xmlns:mv="urn:schemas-microsoft-com:mac:vml" xmlns:p="http://schemas.openxmlformats.org/presentationml/2006/main" xmlns:c="http://schemas.openxmlformats.org/drawingml/2006/chart" xmlns:dgm="http://schemas.openxmlformats.org/drawingml/2006/diagram" xmlns:o="urn:schemas-microsoft-com:office:office" xmlns:v="urn:schemas-microsoft-com:vml" xmlns:pvml="urn:schemas-microsoft-com:office:powerpoint" xmlns:com="http://schemas.openxmlformats.org/drawingml/2006/compatibility" xmlns:p14="http://schemas.microsoft.com/office/powerpoint/2010/main" xmlns:p15="http://schemas.microsoft.com/office/powerpoint/2012/main" xmlns:ahyp="http://schemas.microsoft.com/office/drawing/2018/hyperlinkcolor" showMasterPhAnim="0" showMasterSp="0">
+  <p:cSld>
+    <p:spTree>
+      <p:nvGrpSpPr>
+        <p:cNvPr id="188" name="Shape 188"/>
+        <p:cNvGrpSpPr/>
+        <p:nvPr/>
+      </p:nvGrpSpPr>
+      <p:grpSpPr>
+        <a:xfrm>
+          <a:off x="0" y="0"/>
+          <a:ext cx="0" cy="0"/>
+          <a:chOff x="0" y="0"/>
+          <a:chExt cx="0" cy="0"/>
+        </a:xfrm>
+      </p:grpSpPr>
+      <p:sp>
+        <p:nvSpPr>
+          <p:cNvPr id="189" name="Google Shape;189;g2782716803f_0_9:notes"/>
+          <p:cNvSpPr/>
+          <p:nvPr>
+            <p:ph idx="2" type="sldImg"/>
+          </p:nvPr>
+        </p:nvSpPr>
+        <p:spPr>
+          <a:xfrm>
+            <a:off x="381300" y="685800"/>
+            <a:ext cx="6096000" cy="3429000"/>
+          </a:xfrm>
+          <a:custGeom>
+            <a:rect b="b" l="l" r="r" t="t"/>
+            <a:pathLst>
+              <a:path extrusionOk="0" h="120000" w="120000">
+                <a:moveTo>
+                  <a:pt x="0" y="0"/>
+                </a:moveTo>
+                <a:lnTo>
+                  <a:pt x="120000" y="0"/>
+                </a:lnTo>
+                <a:lnTo>
+                  <a:pt x="120000" y="120000"/>
+                </a:lnTo>
+                <a:lnTo>
+                  <a:pt x="0" y="120000"/>
+                </a:lnTo>
+                <a:close/>
+              </a:path>
+            </a:pathLst>
+          </a:custGeom>
+        </p:spPr>
+      </p:sp>
+      <p:sp>
+        <p:nvSpPr>
+          <p:cNvPr id="190" name="Google Shape;190;g2782716803f_0_9:notes"/>
           <p:cNvSpPr txBox="1"/>
           <p:nvPr>
             <p:ph idx="1" type="body"/>
@@ -7191,7 +7391,7 @@
                 <a:cs typeface="Times New Roman"/>
                 <a:sym typeface="Times New Roman"/>
               </a:rPr>
-              <a:t>2024/07/15</a:t>
+              <a:t>2024/07/16</a:t>
             </a:r>
             <a:endParaRPr>
               <a:latin typeface="Times New Roman"/>
@@ -9946,6 +10146,670 @@
 </p:sld>
 </file>
 
+<file path=ppt/slides/slide17.xml><?xml version="1.0" encoding="utf-8"?>
+<p:sld xmlns:a="http://schemas.openxmlformats.org/drawingml/2006/main" xmlns:r="http://schemas.openxmlformats.org/officeDocument/2006/relationships" xmlns:mc="http://schemas.openxmlformats.org/markup-compatibility/2006" xmlns:mv="urn:schemas-microsoft-com:mac:vml" xmlns:p="http://schemas.openxmlformats.org/presentationml/2006/main" xmlns:c="http://schemas.openxmlformats.org/drawingml/2006/chart" xmlns:dgm="http://schemas.openxmlformats.org/drawingml/2006/diagram" xmlns:o="urn:schemas-microsoft-com:office:office" xmlns:v="urn:schemas-microsoft-com:vml" xmlns:pvml="urn:schemas-microsoft-com:office:powerpoint" xmlns:com="http://schemas.openxmlformats.org/drawingml/2006/compatibility" xmlns:p14="http://schemas.microsoft.com/office/powerpoint/2010/main" xmlns:p15="http://schemas.microsoft.com/office/powerpoint/2012/main" xmlns:ahyp="http://schemas.microsoft.com/office/drawing/2018/hyperlinkcolor">
+  <p:cSld>
+    <p:spTree>
+      <p:nvGrpSpPr>
+        <p:cNvPr id="184" name="Shape 184"/>
+        <p:cNvGrpSpPr/>
+        <p:nvPr/>
+      </p:nvGrpSpPr>
+      <p:grpSpPr>
+        <a:xfrm>
+          <a:off x="0" y="0"/>
+          <a:ext cx="0" cy="0"/>
+          <a:chOff x="0" y="0"/>
+          <a:chExt cx="0" cy="0"/>
+        </a:xfrm>
+      </p:grpSpPr>
+      <p:sp>
+        <p:nvSpPr>
+          <p:cNvPr id="185" name="Google Shape;185;p29"/>
+          <p:cNvSpPr txBox="1"/>
+          <p:nvPr>
+            <p:ph type="title"/>
+          </p:nvPr>
+        </p:nvSpPr>
+        <p:spPr>
+          <a:xfrm>
+            <a:off x="311700" y="445025"/>
+            <a:ext cx="8520600" cy="572700"/>
+          </a:xfrm>
+          <a:prstGeom prst="rect">
+            <a:avLst/>
+          </a:prstGeom>
+        </p:spPr>
+        <p:txBody>
+          <a:bodyPr anchorCtr="0" anchor="t" bIns="91425" lIns="91425" spcFirstLastPara="1" rIns="91425" wrap="square" tIns="91425">
+            <a:normAutofit fontScale="90000"/>
+          </a:bodyPr>
+          <a:lstStyle/>
+          <a:p>
+            <a:pPr indent="0" lvl="0" marL="0" rtl="0" algn="l">
+              <a:spcBef>
+                <a:spcPts val="0"/>
+              </a:spcBef>
+              <a:spcAft>
+                <a:spcPts val="0"/>
+              </a:spcAft>
+              <a:buNone/>
+            </a:pPr>
+            <a:r>
+              <a:rPr lang="zh-TW">
+                <a:latin typeface="DFKai-SB"/>
+                <a:ea typeface="DFKai-SB"/>
+                <a:cs typeface="DFKai-SB"/>
+                <a:sym typeface="DFKai-SB"/>
+              </a:rPr>
+              <a:t>錯誤</a:t>
+            </a:r>
+            <a:r>
+              <a:rPr lang="zh-TW"/>
+              <a:t> </a:t>
+            </a:r>
+            <a:r>
+              <a:rPr lang="zh-TW">
+                <a:latin typeface="Times New Roman"/>
+                <a:ea typeface="Times New Roman"/>
+                <a:cs typeface="Times New Roman"/>
+                <a:sym typeface="Times New Roman"/>
+              </a:rPr>
+              <a:t>8</a:t>
+            </a:r>
+            <a:endParaRPr>
+              <a:latin typeface="Times New Roman"/>
+              <a:ea typeface="Times New Roman"/>
+              <a:cs typeface="Times New Roman"/>
+              <a:sym typeface="Times New Roman"/>
+            </a:endParaRPr>
+          </a:p>
+        </p:txBody>
+      </p:sp>
+      <p:sp>
+        <p:nvSpPr>
+          <p:cNvPr id="186" name="Google Shape;186;p29"/>
+          <p:cNvSpPr txBox="1"/>
+          <p:nvPr>
+            <p:ph idx="1" type="body"/>
+          </p:nvPr>
+        </p:nvSpPr>
+        <p:spPr>
+          <a:xfrm>
+            <a:off x="311700" y="1152475"/>
+            <a:ext cx="8520600" cy="3896700"/>
+          </a:xfrm>
+          <a:prstGeom prst="rect">
+            <a:avLst/>
+          </a:prstGeom>
+        </p:spPr>
+        <p:txBody>
+          <a:bodyPr anchorCtr="0" anchor="t" bIns="91425" lIns="91425" spcFirstLastPara="1" rIns="91425" wrap="square" tIns="91425">
+            <a:normAutofit lnSpcReduction="10000"/>
+          </a:bodyPr>
+          <a:lstStyle/>
+          <a:p>
+            <a:pPr indent="-342900" lvl="0" marL="457200" rtl="0" algn="l">
+              <a:spcBef>
+                <a:spcPts val="0"/>
+              </a:spcBef>
+              <a:spcAft>
+                <a:spcPts val="0"/>
+              </a:spcAft>
+              <a:buSzPts val="1800"/>
+              <a:buFont typeface="DFKai-SB"/>
+              <a:buChar char="●"/>
+            </a:pPr>
+            <a:r>
+              <a:rPr lang="zh-TW">
+                <a:latin typeface="DFKai-SB"/>
+                <a:ea typeface="DFKai-SB"/>
+                <a:cs typeface="DFKai-SB"/>
+                <a:sym typeface="DFKai-SB"/>
+              </a:rPr>
+              <a:t>錯誤資訊：</a:t>
+            </a:r>
+            <a:endParaRPr>
+              <a:latin typeface="DFKai-SB"/>
+              <a:ea typeface="DFKai-SB"/>
+              <a:cs typeface="DFKai-SB"/>
+              <a:sym typeface="DFKai-SB"/>
+            </a:endParaRPr>
+          </a:p>
+          <a:p>
+            <a:pPr indent="0" lvl="0" marL="457200" rtl="0" algn="l">
+              <a:spcBef>
+                <a:spcPts val="1200"/>
+              </a:spcBef>
+              <a:spcAft>
+                <a:spcPts val="0"/>
+              </a:spcAft>
+              <a:buNone/>
+            </a:pPr>
+            <a:r>
+              <a:t/>
+            </a:r>
+            <a:endParaRPr sz="1300">
+              <a:latin typeface="DFKai-SB"/>
+              <a:ea typeface="DFKai-SB"/>
+              <a:cs typeface="DFKai-SB"/>
+              <a:sym typeface="DFKai-SB"/>
+            </a:endParaRPr>
+          </a:p>
+          <a:p>
+            <a:pPr indent="-342900" lvl="0" marL="457200" rtl="0" algn="l">
+              <a:spcBef>
+                <a:spcPts val="1200"/>
+              </a:spcBef>
+              <a:spcAft>
+                <a:spcPts val="0"/>
+              </a:spcAft>
+              <a:buSzPts val="1800"/>
+              <a:buFont typeface="DFKai-SB"/>
+              <a:buChar char="●"/>
+            </a:pPr>
+            <a:r>
+              <a:rPr lang="zh-TW">
+                <a:latin typeface="DFKai-SB"/>
+                <a:ea typeface="DFKai-SB"/>
+                <a:cs typeface="DFKai-SB"/>
+                <a:sym typeface="DFKai-SB"/>
+              </a:rPr>
+              <a:t>原因：</a:t>
+            </a:r>
+            <a:endParaRPr>
+              <a:latin typeface="DFKai-SB"/>
+              <a:ea typeface="DFKai-SB"/>
+              <a:cs typeface="DFKai-SB"/>
+              <a:sym typeface="DFKai-SB"/>
+            </a:endParaRPr>
+          </a:p>
+          <a:p>
+            <a:pPr indent="0" lvl="0" marL="457200" rtl="0" algn="l">
+              <a:lnSpc>
+                <a:spcPct val="100000"/>
+              </a:lnSpc>
+              <a:spcBef>
+                <a:spcPts val="1200"/>
+              </a:spcBef>
+              <a:spcAft>
+                <a:spcPts val="0"/>
+              </a:spcAft>
+              <a:buNone/>
+            </a:pPr>
+            <a:r>
+              <a:rPr lang="zh-TW" sz="1300">
+                <a:latin typeface="DFKai-SB"/>
+                <a:ea typeface="DFKai-SB"/>
+                <a:cs typeface="DFKai-SB"/>
+                <a:sym typeface="DFKai-SB"/>
+              </a:rPr>
+              <a:t>沒有為Controller中的某個Action指定Http方法。</a:t>
+            </a:r>
+            <a:endParaRPr sz="1200">
+              <a:latin typeface="DFKai-SB"/>
+              <a:ea typeface="DFKai-SB"/>
+              <a:cs typeface="DFKai-SB"/>
+              <a:sym typeface="DFKai-SB"/>
+            </a:endParaRPr>
+          </a:p>
+          <a:p>
+            <a:pPr indent="-342900" lvl="0" marL="457200" rtl="0" algn="l">
+              <a:spcBef>
+                <a:spcPts val="1200"/>
+              </a:spcBef>
+              <a:spcAft>
+                <a:spcPts val="0"/>
+              </a:spcAft>
+              <a:buSzPts val="1800"/>
+              <a:buFont typeface="DFKai-SB"/>
+              <a:buChar char="●"/>
+            </a:pPr>
+            <a:r>
+              <a:rPr lang="zh-TW">
+                <a:latin typeface="DFKai-SB"/>
+                <a:ea typeface="DFKai-SB"/>
+                <a:cs typeface="DFKai-SB"/>
+                <a:sym typeface="DFKai-SB"/>
+              </a:rPr>
+              <a:t>解決方法：</a:t>
+            </a:r>
+            <a:endParaRPr>
+              <a:latin typeface="DFKai-SB"/>
+              <a:ea typeface="DFKai-SB"/>
+              <a:cs typeface="DFKai-SB"/>
+              <a:sym typeface="DFKai-SB"/>
+            </a:endParaRPr>
+          </a:p>
+          <a:p>
+            <a:pPr indent="0" lvl="0" marL="0" rtl="0" algn="l">
+              <a:spcBef>
+                <a:spcPts val="1200"/>
+              </a:spcBef>
+              <a:spcAft>
+                <a:spcPts val="0"/>
+              </a:spcAft>
+              <a:buNone/>
+            </a:pPr>
+            <a:r>
+              <a:rPr lang="zh-TW" sz="1300">
+                <a:latin typeface="DFKai-SB"/>
+                <a:ea typeface="DFKai-SB"/>
+                <a:cs typeface="DFKai-SB"/>
+                <a:sym typeface="DFKai-SB"/>
+              </a:rPr>
+              <a:t>	</a:t>
+            </a:r>
+            <a:r>
+              <a:rPr lang="zh-TW" sz="1300">
+                <a:latin typeface="DFKai-SB"/>
+                <a:ea typeface="DFKai-SB"/>
+                <a:cs typeface="DFKai-SB"/>
+                <a:sym typeface="DFKai-SB"/>
+              </a:rPr>
+              <a:t>為其添加Http屬性即可</a:t>
+            </a:r>
+            <a:r>
+              <a:rPr lang="zh-TW" sz="1300">
+                <a:latin typeface="DFKai-SB"/>
+                <a:ea typeface="DFKai-SB"/>
+                <a:cs typeface="DFKai-SB"/>
+                <a:sym typeface="DFKai-SB"/>
+              </a:rPr>
+              <a:t>。</a:t>
+            </a:r>
+            <a:endParaRPr sz="1300">
+              <a:latin typeface="DFKai-SB"/>
+              <a:ea typeface="DFKai-SB"/>
+              <a:cs typeface="DFKai-SB"/>
+              <a:sym typeface="DFKai-SB"/>
+            </a:endParaRPr>
+          </a:p>
+          <a:p>
+            <a:pPr indent="-342900" lvl="0" marL="457200" rtl="0" algn="l">
+              <a:spcBef>
+                <a:spcPts val="1200"/>
+              </a:spcBef>
+              <a:spcAft>
+                <a:spcPts val="0"/>
+              </a:spcAft>
+              <a:buSzPts val="1800"/>
+              <a:buFont typeface="DFKai-SB"/>
+              <a:buChar char="●"/>
+            </a:pPr>
+            <a:r>
+              <a:rPr lang="zh-TW">
+                <a:latin typeface="DFKai-SB"/>
+                <a:ea typeface="DFKai-SB"/>
+                <a:cs typeface="DFKai-SB"/>
+                <a:sym typeface="DFKai-SB"/>
+              </a:rPr>
+              <a:t>備註：</a:t>
+            </a:r>
+            <a:endParaRPr>
+              <a:latin typeface="DFKai-SB"/>
+              <a:ea typeface="DFKai-SB"/>
+              <a:cs typeface="DFKai-SB"/>
+              <a:sym typeface="DFKai-SB"/>
+            </a:endParaRPr>
+          </a:p>
+          <a:p>
+            <a:pPr indent="0" lvl="0" marL="457200" rtl="0" algn="l">
+              <a:spcBef>
+                <a:spcPts val="1200"/>
+              </a:spcBef>
+              <a:spcAft>
+                <a:spcPts val="0"/>
+              </a:spcAft>
+              <a:buNone/>
+            </a:pPr>
+            <a:r>
+              <a:rPr lang="zh-TW" sz="1300">
+                <a:latin typeface="DFKai-SB"/>
+                <a:ea typeface="DFKai-SB"/>
+                <a:cs typeface="DFKai-SB"/>
+                <a:sym typeface="DFKai-SB"/>
+              </a:rPr>
+              <a:t>這個錯誤是</a:t>
+            </a:r>
+            <a:r>
+              <a:rPr lang="zh-TW" sz="1300">
+                <a:latin typeface="DFKai-SB"/>
+                <a:ea typeface="DFKai-SB"/>
+                <a:cs typeface="DFKai-SB"/>
+                <a:sym typeface="DFKai-SB"/>
+              </a:rPr>
+              <a:t>由於無法產生正確的swagger.json所造成的，而有可能會有多個不同原因產生一樣的錯誤(這邊指的是無法產生正確的swagger.json)</a:t>
+            </a:r>
+            <a:r>
+              <a:rPr lang="zh-TW" sz="1300">
+                <a:latin typeface="DFKai-SB"/>
+                <a:ea typeface="DFKai-SB"/>
+                <a:cs typeface="DFKai-SB"/>
+                <a:sym typeface="DFKai-SB"/>
+              </a:rPr>
+              <a:t>。</a:t>
+            </a:r>
+            <a:endParaRPr sz="1300">
+              <a:latin typeface="DFKai-SB"/>
+              <a:ea typeface="DFKai-SB"/>
+              <a:cs typeface="DFKai-SB"/>
+              <a:sym typeface="DFKai-SB"/>
+            </a:endParaRPr>
+          </a:p>
+          <a:p>
+            <a:pPr indent="0" lvl="0" marL="457200" rtl="0" algn="l">
+              <a:spcBef>
+                <a:spcPts val="1200"/>
+              </a:spcBef>
+              <a:spcAft>
+                <a:spcPts val="1200"/>
+              </a:spcAft>
+              <a:buNone/>
+            </a:pPr>
+            <a:r>
+              <a:rPr lang="zh-TW" sz="1300">
+                <a:latin typeface="DFKai-SB"/>
+                <a:ea typeface="DFKai-SB"/>
+                <a:cs typeface="DFKai-SB"/>
+                <a:sym typeface="DFKai-SB"/>
+              </a:rPr>
+              <a:t>原本以為繼承自ControllerBase的Controller會自動幫未標示Http方法的Action標示[HttpGet]。</a:t>
+            </a:r>
+            <a:endParaRPr sz="1300">
+              <a:latin typeface="DFKai-SB"/>
+              <a:ea typeface="DFKai-SB"/>
+              <a:cs typeface="DFKai-SB"/>
+              <a:sym typeface="DFKai-SB"/>
+            </a:endParaRPr>
+          </a:p>
+        </p:txBody>
+      </p:sp>
+      <p:pic>
+        <p:nvPicPr>
+          <p:cNvPr id="187" name="Google Shape;187;p29"/>
+          <p:cNvPicPr preferRelativeResize="0"/>
+          <p:nvPr/>
+        </p:nvPicPr>
+        <p:blipFill>
+          <a:blip r:embed="rId3">
+            <a:alphaModFix/>
+          </a:blip>
+          <a:stretch>
+            <a:fillRect/>
+          </a:stretch>
+        </p:blipFill>
+        <p:spPr>
+          <a:xfrm>
+            <a:off x="1330118" y="1531000"/>
+            <a:ext cx="6699733" cy="572700"/>
+          </a:xfrm>
+          <a:prstGeom prst="rect">
+            <a:avLst/>
+          </a:prstGeom>
+          <a:noFill/>
+          <a:ln>
+            <a:noFill/>
+          </a:ln>
+        </p:spPr>
+      </p:pic>
+    </p:spTree>
+  </p:cSld>
+  <p:clrMapOvr>
+    <a:masterClrMapping/>
+  </p:clrMapOvr>
+</p:sld>
+</file>
+
+<file path=ppt/slides/slide18.xml><?xml version="1.0" encoding="utf-8"?>
+<p:sld xmlns:a="http://schemas.openxmlformats.org/drawingml/2006/main" xmlns:r="http://schemas.openxmlformats.org/officeDocument/2006/relationships" xmlns:mc="http://schemas.openxmlformats.org/markup-compatibility/2006" xmlns:mv="urn:schemas-microsoft-com:mac:vml" xmlns:p="http://schemas.openxmlformats.org/presentationml/2006/main" xmlns:c="http://schemas.openxmlformats.org/drawingml/2006/chart" xmlns:dgm="http://schemas.openxmlformats.org/drawingml/2006/diagram" xmlns:o="urn:schemas-microsoft-com:office:office" xmlns:v="urn:schemas-microsoft-com:vml" xmlns:pvml="urn:schemas-microsoft-com:office:powerpoint" xmlns:com="http://schemas.openxmlformats.org/drawingml/2006/compatibility" xmlns:p14="http://schemas.microsoft.com/office/powerpoint/2010/main" xmlns:p15="http://schemas.microsoft.com/office/powerpoint/2012/main" xmlns:ahyp="http://schemas.microsoft.com/office/drawing/2018/hyperlinkcolor">
+  <p:cSld>
+    <p:bg>
+      <p:bgPr>
+        <a:solidFill>
+          <a:schemeClr val="dk1"/>
+        </a:solidFill>
+      </p:bgPr>
+    </p:bg>
+    <p:spTree>
+      <p:nvGrpSpPr>
+        <p:cNvPr id="191" name="Shape 191"/>
+        <p:cNvGrpSpPr/>
+        <p:nvPr/>
+      </p:nvGrpSpPr>
+      <p:grpSpPr>
+        <a:xfrm>
+          <a:off x="0" y="0"/>
+          <a:ext cx="0" cy="0"/>
+          <a:chOff x="0" y="0"/>
+          <a:chExt cx="0" cy="0"/>
+        </a:xfrm>
+      </p:grpSpPr>
+      <p:pic>
+        <p:nvPicPr>
+          <p:cNvPr id="192" name="Google Shape;192;p30"/>
+          <p:cNvPicPr preferRelativeResize="0"/>
+          <p:nvPr/>
+        </p:nvPicPr>
+        <p:blipFill>
+          <a:blip r:embed="rId3">
+            <a:alphaModFix/>
+          </a:blip>
+          <a:stretch>
+            <a:fillRect/>
+          </a:stretch>
+        </p:blipFill>
+        <p:spPr>
+          <a:xfrm>
+            <a:off x="404075" y="1568025"/>
+            <a:ext cx="3370975" cy="1141025"/>
+          </a:xfrm>
+          <a:prstGeom prst="rect">
+            <a:avLst/>
+          </a:prstGeom>
+          <a:noFill/>
+          <a:ln>
+            <a:noFill/>
+          </a:ln>
+        </p:spPr>
+      </p:pic>
+      <p:pic>
+        <p:nvPicPr>
+          <p:cNvPr id="193" name="Google Shape;193;p30"/>
+          <p:cNvPicPr preferRelativeResize="0"/>
+          <p:nvPr/>
+        </p:nvPicPr>
+        <p:blipFill>
+          <a:blip r:embed="rId4">
+            <a:alphaModFix/>
+          </a:blip>
+          <a:stretch>
+            <a:fillRect/>
+          </a:stretch>
+        </p:blipFill>
+        <p:spPr>
+          <a:xfrm>
+            <a:off x="404068" y="382750"/>
+            <a:ext cx="6699733" cy="572700"/>
+          </a:xfrm>
+          <a:prstGeom prst="rect">
+            <a:avLst/>
+          </a:prstGeom>
+          <a:noFill/>
+          <a:ln>
+            <a:noFill/>
+          </a:ln>
+        </p:spPr>
+      </p:pic>
+      <p:sp>
+        <p:nvSpPr>
+          <p:cNvPr id="194" name="Google Shape;194;p30"/>
+          <p:cNvSpPr/>
+          <p:nvPr/>
+        </p:nvSpPr>
+        <p:spPr>
+          <a:xfrm>
+            <a:off x="671475" y="955450"/>
+            <a:ext cx="665400" cy="612600"/>
+          </a:xfrm>
+          <a:prstGeom prst="downArrow">
+            <a:avLst>
+              <a:gd fmla="val 50000" name="adj1"/>
+              <a:gd fmla="val 50000" name="adj2"/>
+            </a:avLst>
+          </a:prstGeom>
+          <a:solidFill>
+            <a:schemeClr val="lt2"/>
+          </a:solidFill>
+          <a:ln cap="flat" cmpd="sng" w="9525">
+            <a:solidFill>
+              <a:schemeClr val="dk2"/>
+            </a:solidFill>
+            <a:prstDash val="solid"/>
+            <a:round/>
+            <a:headEnd len="sm" w="sm" type="none"/>
+            <a:tailEnd len="sm" w="sm" type="none"/>
+          </a:ln>
+        </p:spPr>
+        <p:txBody>
+          <a:bodyPr anchorCtr="0" anchor="ctr" bIns="91425" lIns="91425" spcFirstLastPara="1" rIns="91425" wrap="square" tIns="91425">
+            <a:noAutofit/>
+          </a:bodyPr>
+          <a:lstStyle/>
+          <a:p>
+            <a:pPr indent="0" lvl="0" marL="0" rtl="0" algn="ctr">
+              <a:spcBef>
+                <a:spcPts val="0"/>
+              </a:spcBef>
+              <a:spcAft>
+                <a:spcPts val="0"/>
+              </a:spcAft>
+              <a:buNone/>
+            </a:pPr>
+            <a:r>
+              <a:rPr lang="zh-TW"/>
+              <a:t>造成</a:t>
+            </a:r>
+            <a:endParaRPr/>
+          </a:p>
+        </p:txBody>
+      </p:sp>
+      <p:pic>
+        <p:nvPicPr>
+          <p:cNvPr id="195" name="Google Shape;195;p30"/>
+          <p:cNvPicPr preferRelativeResize="0"/>
+          <p:nvPr/>
+        </p:nvPicPr>
+        <p:blipFill>
+          <a:blip r:embed="rId5">
+            <a:alphaModFix/>
+          </a:blip>
+          <a:stretch>
+            <a:fillRect/>
+          </a:stretch>
+        </p:blipFill>
+        <p:spPr>
+          <a:xfrm>
+            <a:off x="860225" y="3483000"/>
+            <a:ext cx="2724150" cy="981075"/>
+          </a:xfrm>
+          <a:prstGeom prst="rect">
+            <a:avLst/>
+          </a:prstGeom>
+          <a:noFill/>
+          <a:ln>
+            <a:noFill/>
+          </a:ln>
+        </p:spPr>
+      </p:pic>
+      <p:pic>
+        <p:nvPicPr>
+          <p:cNvPr id="196" name="Google Shape;196;p30"/>
+          <p:cNvPicPr preferRelativeResize="0"/>
+          <p:nvPr/>
+        </p:nvPicPr>
+        <p:blipFill>
+          <a:blip r:embed="rId6">
+            <a:alphaModFix/>
+          </a:blip>
+          <a:stretch>
+            <a:fillRect/>
+          </a:stretch>
+        </p:blipFill>
+        <p:spPr>
+          <a:xfrm>
+            <a:off x="5319500" y="3211550"/>
+            <a:ext cx="2705100" cy="1524000"/>
+          </a:xfrm>
+          <a:prstGeom prst="rect">
+            <a:avLst/>
+          </a:prstGeom>
+          <a:noFill/>
+          <a:ln>
+            <a:noFill/>
+          </a:ln>
+        </p:spPr>
+      </p:pic>
+      <p:sp>
+        <p:nvSpPr>
+          <p:cNvPr id="197" name="Google Shape;197;p30"/>
+          <p:cNvSpPr/>
+          <p:nvPr/>
+        </p:nvSpPr>
+        <p:spPr>
+          <a:xfrm>
+            <a:off x="3584375" y="3784850"/>
+            <a:ext cx="1735200" cy="377400"/>
+          </a:xfrm>
+          <a:prstGeom prst="rightArrow">
+            <a:avLst>
+              <a:gd fmla="val 50000" name="adj1"/>
+              <a:gd fmla="val 50000" name="adj2"/>
+            </a:avLst>
+          </a:prstGeom>
+          <a:solidFill>
+            <a:schemeClr val="lt2"/>
+          </a:solidFill>
+          <a:ln cap="flat" cmpd="sng" w="9525">
+            <a:solidFill>
+              <a:schemeClr val="dk2"/>
+            </a:solidFill>
+            <a:prstDash val="solid"/>
+            <a:round/>
+            <a:headEnd len="sm" w="sm" type="none"/>
+            <a:tailEnd len="sm" w="sm" type="none"/>
+          </a:ln>
+        </p:spPr>
+        <p:txBody>
+          <a:bodyPr anchorCtr="0" anchor="ctr" bIns="91425" lIns="91425" spcFirstLastPara="1" rIns="91425" wrap="square" tIns="91425">
+            <a:noAutofit/>
+          </a:bodyPr>
+          <a:lstStyle/>
+          <a:p>
+            <a:pPr indent="0" lvl="0" marL="0" rtl="0" algn="ctr">
+              <a:spcBef>
+                <a:spcPts val="0"/>
+              </a:spcBef>
+              <a:spcAft>
+                <a:spcPts val="0"/>
+              </a:spcAft>
+              <a:buNone/>
+            </a:pPr>
+            <a:r>
+              <a:t/>
+            </a:r>
+            <a:endParaRPr/>
+          </a:p>
+        </p:txBody>
+      </p:sp>
+    </p:spTree>
+  </p:cSld>
+  <p:clrMapOvr>
+    <a:masterClrMapping/>
+  </p:clrMapOvr>
+</p:sld>
+</file>
+
 <file path=ppt/slides/slide2.xml><?xml version="1.0" encoding="utf-8"?>
 <p:sld xmlns:a="http://schemas.openxmlformats.org/drawingml/2006/main" xmlns:r="http://schemas.openxmlformats.org/officeDocument/2006/relationships" xmlns:mc="http://schemas.openxmlformats.org/markup-compatibility/2006" xmlns:mv="urn:schemas-microsoft-com:mac:vml" xmlns:p="http://schemas.openxmlformats.org/presentationml/2006/main" xmlns:c="http://schemas.openxmlformats.org/drawingml/2006/chart" xmlns:dgm="http://schemas.openxmlformats.org/drawingml/2006/diagram" xmlns:o="urn:schemas-microsoft-com:office:office" xmlns:v="urn:schemas-microsoft-com:vml" xmlns:pvml="urn:schemas-microsoft-com:office:powerpoint" xmlns:com="http://schemas.openxmlformats.org/drawingml/2006/compatibility" xmlns:p14="http://schemas.microsoft.com/office/powerpoint/2010/main" xmlns:p15="http://schemas.microsoft.com/office/powerpoint/2012/main" xmlns:ahyp="http://schemas.microsoft.com/office/drawing/2018/hyperlinkcolor">
   <p:cSld>
@@ -12546,6 +13410,285 @@
 </file>
 
 <file path=ppt/theme/theme1.xml><?xml version="1.0" encoding="utf-8"?>
+<a:theme xmlns:a="http://schemas.openxmlformats.org/drawingml/2006/main" xmlns:r="http://schemas.openxmlformats.org/officeDocument/2006/relationships" name="Simple Dark">
+  <a:themeElements>
+    <a:clrScheme name="Simple Dark">
+      <a:dk1>
+        <a:srgbClr val="FFFFFF"/>
+      </a:dk1>
+      <a:lt1>
+        <a:srgbClr val="212121"/>
+      </a:lt1>
+      <a:dk2>
+        <a:srgbClr val="303030"/>
+      </a:dk2>
+      <a:lt2>
+        <a:srgbClr val="ADADAD"/>
+      </a:lt2>
+      <a:accent1>
+        <a:srgbClr val="009688"/>
+      </a:accent1>
+      <a:accent2>
+        <a:srgbClr val="EEEEEE"/>
+      </a:accent2>
+      <a:accent3>
+        <a:srgbClr val="78909C"/>
+      </a:accent3>
+      <a:accent4>
+        <a:srgbClr val="FFAB40"/>
+      </a:accent4>
+      <a:accent5>
+        <a:srgbClr val="4DD0E1"/>
+      </a:accent5>
+      <a:accent6>
+        <a:srgbClr val="EEFF41"/>
+      </a:accent6>
+      <a:hlink>
+        <a:srgbClr val="4DD0E1"/>
+      </a:hlink>
+      <a:folHlink>
+        <a:srgbClr val="4DD0E1"/>
+      </a:folHlink>
+    </a:clrScheme>
+    <a:fontScheme name="Office">
+      <a:majorFont>
+        <a:latin typeface="Arial"/>
+        <a:ea typeface=""/>
+        <a:cs typeface=""/>
+        <a:font script="Jpan" typeface="ＭＳ Ｐゴシック"/>
+        <a:font script="Hang" typeface="맑은 고딕"/>
+        <a:font script="Hans" typeface="宋体"/>
+        <a:font script="Hant" typeface="新細明體"/>
+        <a:font script="Arab" typeface="Times New Roman"/>
+        <a:font script="Hebr" typeface="Times New Roman"/>
+        <a:font script="Thai" typeface="Angsana New"/>
+        <a:font script="Ethi" typeface="Nyala"/>
+        <a:font script="Beng" typeface="Vrinda"/>
+        <a:font script="Gujr" typeface="Shruti"/>
+        <a:font script="Khmr" typeface="MoolBoran"/>
+        <a:font script="Knda" typeface="Tunga"/>
+        <a:font script="Guru" typeface="Raavi"/>
+        <a:font script="Cans" typeface="Euphemia"/>
+        <a:font script="Cher" typeface="Plantagenet Cherokee"/>
+        <a:font script="Yiii" typeface="Microsoft Yi Baiti"/>
+        <a:font script="Tibt" typeface="Microsoft Himalaya"/>
+        <a:font script="Thaa" typeface="MV Boli"/>
+        <a:font script="Deva" typeface="Mangal"/>
+        <a:font script="Telu" typeface="Gautami"/>
+        <a:font script="Taml" typeface="Latha"/>
+        <a:font script="Syrc" typeface="Estrangelo Edessa"/>
+        <a:font script="Orya" typeface="Kalinga"/>
+        <a:font script="Mlym" typeface="Kartika"/>
+        <a:font script="Laoo" typeface="DokChampa"/>
+        <a:font script="Sinh" typeface="Iskoola Pota"/>
+        <a:font script="Mong" typeface="Mongolian Baiti"/>
+        <a:font script="Viet" typeface="Times New Roman"/>
+        <a:font script="Uigh" typeface="Microsoft Uighur"/>
+        <a:font script="Geor" typeface="Sylfaen"/>
+      </a:majorFont>
+      <a:minorFont>
+        <a:latin typeface="Arial"/>
+        <a:ea typeface=""/>
+        <a:cs typeface=""/>
+        <a:font script="Jpan" typeface="ＭＳ Ｐゴシック"/>
+        <a:font script="Hang" typeface="맑은 고딕"/>
+        <a:font script="Hans" typeface="宋体"/>
+        <a:font script="Hant" typeface="新細明體"/>
+        <a:font script="Arab" typeface="Arial"/>
+        <a:font script="Hebr" typeface="Arial"/>
+        <a:font script="Thai" typeface="Cordia New"/>
+        <a:font script="Ethi" typeface="Nyala"/>
+        <a:font script="Beng" typeface="Vrinda"/>
+        <a:font script="Gujr" typeface="Shruti"/>
+        <a:font script="Khmr" typeface="DaunPenh"/>
+        <a:font script="Knda" typeface="Tunga"/>
+        <a:font script="Guru" typeface="Raavi"/>
+        <a:font script="Cans" typeface="Euphemia"/>
+        <a:font script="Cher" typeface="Plantagenet Cherokee"/>
+        <a:font script="Yiii" typeface="Microsoft Yi Baiti"/>
+        <a:font script="Tibt" typeface="Microsoft Himalaya"/>
+        <a:font script="Thaa" typeface="MV Boli"/>
+        <a:font script="Deva" typeface="Mangal"/>
+        <a:font script="Telu" typeface="Gautami"/>
+        <a:font script="Taml" typeface="Latha"/>
+        <a:font script="Syrc" typeface="Estrangelo Edessa"/>
+        <a:font script="Orya" typeface="Kalinga"/>
+        <a:font script="Mlym" typeface="Kartika"/>
+        <a:font script="Laoo" typeface="DokChampa"/>
+        <a:font script="Sinh" typeface="Iskoola Pota"/>
+        <a:font script="Mong" typeface="Mongolian Baiti"/>
+        <a:font script="Viet" typeface="Arial"/>
+        <a:font script="Uigh" typeface="Microsoft Uighur"/>
+        <a:font script="Geor" typeface="Sylfaen"/>
+      </a:minorFont>
+    </a:fontScheme>
+    <a:fmtScheme name="Office">
+      <a:fillStyleLst>
+        <a:solidFill>
+          <a:schemeClr val="phClr"/>
+        </a:solidFill>
+        <a:gradFill rotWithShape="1">
+          <a:gsLst>
+            <a:gs pos="0">
+              <a:schemeClr val="phClr">
+                <a:tint val="50000"/>
+                <a:satMod val="300000"/>
+              </a:schemeClr>
+            </a:gs>
+            <a:gs pos="35000">
+              <a:schemeClr val="phClr">
+                <a:tint val="37000"/>
+                <a:satMod val="300000"/>
+              </a:schemeClr>
+            </a:gs>
+            <a:gs pos="100000">
+              <a:schemeClr val="phClr">
+                <a:tint val="15000"/>
+                <a:satMod val="350000"/>
+              </a:schemeClr>
+            </a:gs>
+          </a:gsLst>
+          <a:lin ang="16200000" scaled="1"/>
+        </a:gradFill>
+        <a:gradFill rotWithShape="1">
+          <a:gsLst>
+            <a:gs pos="0">
+              <a:schemeClr val="phClr">
+                <a:tint val="100000"/>
+                <a:shade val="100000"/>
+                <a:satMod val="130000"/>
+              </a:schemeClr>
+            </a:gs>
+            <a:gs pos="100000">
+              <a:schemeClr val="phClr">
+                <a:tint val="50000"/>
+                <a:shade val="100000"/>
+                <a:satMod val="350000"/>
+              </a:schemeClr>
+            </a:gs>
+          </a:gsLst>
+          <a:lin ang="16200000" scaled="0"/>
+        </a:gradFill>
+      </a:fillStyleLst>
+      <a:lnStyleLst>
+        <a:ln w="9525" cap="flat" cmpd="sng" algn="ctr">
+          <a:solidFill>
+            <a:schemeClr val="phClr">
+              <a:shade val="95000"/>
+              <a:satMod val="105000"/>
+            </a:schemeClr>
+          </a:solidFill>
+          <a:prstDash val="solid"/>
+        </a:ln>
+        <a:ln w="25400" cap="flat" cmpd="sng" algn="ctr">
+          <a:solidFill>
+            <a:schemeClr val="phClr"/>
+          </a:solidFill>
+          <a:prstDash val="solid"/>
+        </a:ln>
+        <a:ln w="38100" cap="flat" cmpd="sng" algn="ctr">
+          <a:solidFill>
+            <a:schemeClr val="phClr"/>
+          </a:solidFill>
+          <a:prstDash val="solid"/>
+        </a:ln>
+      </a:lnStyleLst>
+      <a:effectStyleLst>
+        <a:effectStyle>
+          <a:effectLst>
+            <a:outerShdw blurRad="40000" dist="20000" dir="5400000" rotWithShape="0">
+              <a:srgbClr val="000000">
+                <a:alpha val="38000"/>
+              </a:srgbClr>
+            </a:outerShdw>
+          </a:effectLst>
+        </a:effectStyle>
+        <a:effectStyle>
+          <a:effectLst>
+            <a:outerShdw blurRad="40000" dist="23000" dir="5400000" rotWithShape="0">
+              <a:srgbClr val="000000">
+                <a:alpha val="35000"/>
+              </a:srgbClr>
+            </a:outerShdw>
+          </a:effectLst>
+        </a:effectStyle>
+        <a:effectStyle>
+          <a:effectLst>
+            <a:outerShdw blurRad="40000" dist="23000" dir="5400000" rotWithShape="0">
+              <a:srgbClr val="000000">
+                <a:alpha val="35000"/>
+              </a:srgbClr>
+            </a:outerShdw>
+          </a:effectLst>
+          <a:scene3d>
+            <a:camera prst="orthographicFront">
+              <a:rot lat="0" lon="0" rev="0"/>
+            </a:camera>
+            <a:lightRig rig="threePt" dir="t">
+              <a:rot lat="0" lon="0" rev="1200000"/>
+            </a:lightRig>
+          </a:scene3d>
+          <a:sp3d>
+            <a:bevelT w="63500" h="25400"/>
+          </a:sp3d>
+        </a:effectStyle>
+      </a:effectStyleLst>
+      <a:bgFillStyleLst>
+        <a:solidFill>
+          <a:schemeClr val="phClr"/>
+        </a:solidFill>
+        <a:gradFill rotWithShape="1">
+          <a:gsLst>
+            <a:gs pos="0">
+              <a:schemeClr val="phClr">
+                <a:tint val="40000"/>
+                <a:satMod val="350000"/>
+              </a:schemeClr>
+            </a:gs>
+            <a:gs pos="40000">
+              <a:schemeClr val="phClr">
+                <a:tint val="45000"/>
+                <a:shade val="99000"/>
+                <a:satMod val="350000"/>
+              </a:schemeClr>
+            </a:gs>
+            <a:gs pos="100000">
+              <a:schemeClr val="phClr">
+                <a:shade val="20000"/>
+                <a:satMod val="255000"/>
+              </a:schemeClr>
+            </a:gs>
+          </a:gsLst>
+          <a:path path="circle">
+            <a:fillToRect l="50000" t="-80000" r="50000" b="180000"/>
+          </a:path>
+        </a:gradFill>
+        <a:gradFill rotWithShape="1">
+          <a:gsLst>
+            <a:gs pos="0">
+              <a:schemeClr val="phClr">
+                <a:tint val="80000"/>
+                <a:satMod val="300000"/>
+              </a:schemeClr>
+            </a:gs>
+            <a:gs pos="100000">
+              <a:schemeClr val="phClr">
+                <a:shade val="30000"/>
+                <a:satMod val="200000"/>
+              </a:schemeClr>
+            </a:gs>
+          </a:gsLst>
+          <a:path path="circle">
+            <a:fillToRect l="50000" t="50000" r="50000" b="50000"/>
+          </a:path>
+        </a:gradFill>
+      </a:bgFillStyleLst>
+    </a:fmtScheme>
+  </a:themeElements>
+</a:theme>
+</file>
+
+<file path=ppt/theme/theme2.xml><?xml version="1.0" encoding="utf-8"?>
 <a:theme xmlns:a="http://schemas.openxmlformats.org/drawingml/2006/main" xmlns:r="http://schemas.openxmlformats.org/officeDocument/2006/relationships">
   <a:themeElements>
     <a:clrScheme name="Default">
@@ -12822,283 +13965,4 @@
     </a:fmtScheme>
   </a:themeElements>
 </a:theme>
-</file>
-
-<file path=ppt/theme/theme2.xml><?xml version="1.0" encoding="utf-8"?>
-<a:theme xmlns:a="http://schemas.openxmlformats.org/drawingml/2006/main" xmlns:r="http://schemas.openxmlformats.org/officeDocument/2006/relationships" name="Simple Dark">
-  <a:themeElements>
-    <a:clrScheme name="Simple Dark">
-      <a:dk1>
-        <a:srgbClr val="FFFFFF"/>
-      </a:dk1>
-      <a:lt1>
-        <a:srgbClr val="212121"/>
-      </a:lt1>
-      <a:dk2>
-        <a:srgbClr val="303030"/>
-      </a:dk2>
-      <a:lt2>
-        <a:srgbClr val="ADADAD"/>
-      </a:lt2>
-      <a:accent1>
-        <a:srgbClr val="009688"/>
-      </a:accent1>
-      <a:accent2>
-        <a:srgbClr val="EEEEEE"/>
-      </a:accent2>
-      <a:accent3>
-        <a:srgbClr val="78909C"/>
-      </a:accent3>
-      <a:accent4>
-        <a:srgbClr val="FFAB40"/>
-      </a:accent4>
-      <a:accent5>
-        <a:srgbClr val="4DD0E1"/>
-      </a:accent5>
-      <a:accent6>
-        <a:srgbClr val="EEFF41"/>
-      </a:accent6>
-      <a:hlink>
-        <a:srgbClr val="4DD0E1"/>
-      </a:hlink>
-      <a:folHlink>
-        <a:srgbClr val="4DD0E1"/>
-      </a:folHlink>
-    </a:clrScheme>
-    <a:fontScheme name="Office">
-      <a:majorFont>
-        <a:latin typeface="Arial"/>
-        <a:ea typeface=""/>
-        <a:cs typeface=""/>
-        <a:font script="Jpan" typeface="ＭＳ Ｐゴシック"/>
-        <a:font script="Hang" typeface="맑은 고딕"/>
-        <a:font script="Hans" typeface="宋体"/>
-        <a:font script="Hant" typeface="新細明體"/>
-        <a:font script="Arab" typeface="Times New Roman"/>
-        <a:font script="Hebr" typeface="Times New Roman"/>
-        <a:font script="Thai" typeface="Angsana New"/>
-        <a:font script="Ethi" typeface="Nyala"/>
-        <a:font script="Beng" typeface="Vrinda"/>
-        <a:font script="Gujr" typeface="Shruti"/>
-        <a:font script="Khmr" typeface="MoolBoran"/>
-        <a:font script="Knda" typeface="Tunga"/>
-        <a:font script="Guru" typeface="Raavi"/>
-        <a:font script="Cans" typeface="Euphemia"/>
-        <a:font script="Cher" typeface="Plantagenet Cherokee"/>
-        <a:font script="Yiii" typeface="Microsoft Yi Baiti"/>
-        <a:font script="Tibt" typeface="Microsoft Himalaya"/>
-        <a:font script="Thaa" typeface="MV Boli"/>
-        <a:font script="Deva" typeface="Mangal"/>
-        <a:font script="Telu" typeface="Gautami"/>
-        <a:font script="Taml" typeface="Latha"/>
-        <a:font script="Syrc" typeface="Estrangelo Edessa"/>
-        <a:font script="Orya" typeface="Kalinga"/>
-        <a:font script="Mlym" typeface="Kartika"/>
-        <a:font script="Laoo" typeface="DokChampa"/>
-        <a:font script="Sinh" typeface="Iskoola Pota"/>
-        <a:font script="Mong" typeface="Mongolian Baiti"/>
-        <a:font script="Viet" typeface="Times New Roman"/>
-        <a:font script="Uigh" typeface="Microsoft Uighur"/>
-        <a:font script="Geor" typeface="Sylfaen"/>
-      </a:majorFont>
-      <a:minorFont>
-        <a:latin typeface="Arial"/>
-        <a:ea typeface=""/>
-        <a:cs typeface=""/>
-        <a:font script="Jpan" typeface="ＭＳ Ｐゴシック"/>
-        <a:font script="Hang" typeface="맑은 고딕"/>
-        <a:font script="Hans" typeface="宋体"/>
-        <a:font script="Hant" typeface="新細明體"/>
-        <a:font script="Arab" typeface="Arial"/>
-        <a:font script="Hebr" typeface="Arial"/>
-        <a:font script="Thai" typeface="Cordia New"/>
-        <a:font script="Ethi" typeface="Nyala"/>
-        <a:font script="Beng" typeface="Vrinda"/>
-        <a:font script="Gujr" typeface="Shruti"/>
-        <a:font script="Khmr" typeface="DaunPenh"/>
-        <a:font script="Knda" typeface="Tunga"/>
-        <a:font script="Guru" typeface="Raavi"/>
-        <a:font script="Cans" typeface="Euphemia"/>
-        <a:font script="Cher" typeface="Plantagenet Cherokee"/>
-        <a:font script="Yiii" typeface="Microsoft Yi Baiti"/>
-        <a:font script="Tibt" typeface="Microsoft Himalaya"/>
-        <a:font script="Thaa" typeface="MV Boli"/>
-        <a:font script="Deva" typeface="Mangal"/>
-        <a:font script="Telu" typeface="Gautami"/>
-        <a:font script="Taml" typeface="Latha"/>
-        <a:font script="Syrc" typeface="Estrangelo Edessa"/>
-        <a:font script="Orya" typeface="Kalinga"/>
-        <a:font script="Mlym" typeface="Kartika"/>
-        <a:font script="Laoo" typeface="DokChampa"/>
-        <a:font script="Sinh" typeface="Iskoola Pota"/>
-        <a:font script="Mong" typeface="Mongolian Baiti"/>
-        <a:font script="Viet" typeface="Arial"/>
-        <a:font script="Uigh" typeface="Microsoft Uighur"/>
-        <a:font script="Geor" typeface="Sylfaen"/>
-      </a:minorFont>
-    </a:fontScheme>
-    <a:fmtScheme name="Office">
-      <a:fillStyleLst>
-        <a:solidFill>
-          <a:schemeClr val="phClr"/>
-        </a:solidFill>
-        <a:gradFill rotWithShape="1">
-          <a:gsLst>
-            <a:gs pos="0">
-              <a:schemeClr val="phClr">
-                <a:tint val="50000"/>
-                <a:satMod val="300000"/>
-              </a:schemeClr>
-            </a:gs>
-            <a:gs pos="35000">
-              <a:schemeClr val="phClr">
-                <a:tint val="37000"/>
-                <a:satMod val="300000"/>
-              </a:schemeClr>
-            </a:gs>
-            <a:gs pos="100000">
-              <a:schemeClr val="phClr">
-                <a:tint val="15000"/>
-                <a:satMod val="350000"/>
-              </a:schemeClr>
-            </a:gs>
-          </a:gsLst>
-          <a:lin ang="16200000" scaled="1"/>
-        </a:gradFill>
-        <a:gradFill rotWithShape="1">
-          <a:gsLst>
-            <a:gs pos="0">
-              <a:schemeClr val="phClr">
-                <a:tint val="100000"/>
-                <a:shade val="100000"/>
-                <a:satMod val="130000"/>
-              </a:schemeClr>
-            </a:gs>
-            <a:gs pos="100000">
-              <a:schemeClr val="phClr">
-                <a:tint val="50000"/>
-                <a:shade val="100000"/>
-                <a:satMod val="350000"/>
-              </a:schemeClr>
-            </a:gs>
-          </a:gsLst>
-          <a:lin ang="16200000" scaled="0"/>
-        </a:gradFill>
-      </a:fillStyleLst>
-      <a:lnStyleLst>
-        <a:ln w="9525" cap="flat" cmpd="sng" algn="ctr">
-          <a:solidFill>
-            <a:schemeClr val="phClr">
-              <a:shade val="95000"/>
-              <a:satMod val="105000"/>
-            </a:schemeClr>
-          </a:solidFill>
-          <a:prstDash val="solid"/>
-        </a:ln>
-        <a:ln w="25400" cap="flat" cmpd="sng" algn="ctr">
-          <a:solidFill>
-            <a:schemeClr val="phClr"/>
-          </a:solidFill>
-          <a:prstDash val="solid"/>
-        </a:ln>
-        <a:ln w="38100" cap="flat" cmpd="sng" algn="ctr">
-          <a:solidFill>
-            <a:schemeClr val="phClr"/>
-          </a:solidFill>
-          <a:prstDash val="solid"/>
-        </a:ln>
-      </a:lnStyleLst>
-      <a:effectStyleLst>
-        <a:effectStyle>
-          <a:effectLst>
-            <a:outerShdw blurRad="40000" dist="20000" dir="5400000" rotWithShape="0">
-              <a:srgbClr val="000000">
-                <a:alpha val="38000"/>
-              </a:srgbClr>
-            </a:outerShdw>
-          </a:effectLst>
-        </a:effectStyle>
-        <a:effectStyle>
-          <a:effectLst>
-            <a:outerShdw blurRad="40000" dist="23000" dir="5400000" rotWithShape="0">
-              <a:srgbClr val="000000">
-                <a:alpha val="35000"/>
-              </a:srgbClr>
-            </a:outerShdw>
-          </a:effectLst>
-        </a:effectStyle>
-        <a:effectStyle>
-          <a:effectLst>
-            <a:outerShdw blurRad="40000" dist="23000" dir="5400000" rotWithShape="0">
-              <a:srgbClr val="000000">
-                <a:alpha val="35000"/>
-              </a:srgbClr>
-            </a:outerShdw>
-          </a:effectLst>
-          <a:scene3d>
-            <a:camera prst="orthographicFront">
-              <a:rot lat="0" lon="0" rev="0"/>
-            </a:camera>
-            <a:lightRig rig="threePt" dir="t">
-              <a:rot lat="0" lon="0" rev="1200000"/>
-            </a:lightRig>
-          </a:scene3d>
-          <a:sp3d>
-            <a:bevelT w="63500" h="25400"/>
-          </a:sp3d>
-        </a:effectStyle>
-      </a:effectStyleLst>
-      <a:bgFillStyleLst>
-        <a:solidFill>
-          <a:schemeClr val="phClr"/>
-        </a:solidFill>
-        <a:gradFill rotWithShape="1">
-          <a:gsLst>
-            <a:gs pos="0">
-              <a:schemeClr val="phClr">
-                <a:tint val="40000"/>
-                <a:satMod val="350000"/>
-              </a:schemeClr>
-            </a:gs>
-            <a:gs pos="40000">
-              <a:schemeClr val="phClr">
-                <a:tint val="45000"/>
-                <a:shade val="99000"/>
-                <a:satMod val="350000"/>
-              </a:schemeClr>
-            </a:gs>
-            <a:gs pos="100000">
-              <a:schemeClr val="phClr">
-                <a:shade val="20000"/>
-                <a:satMod val="255000"/>
-              </a:schemeClr>
-            </a:gs>
-          </a:gsLst>
-          <a:path path="circle">
-            <a:fillToRect l="50000" t="-80000" r="50000" b="180000"/>
-          </a:path>
-        </a:gradFill>
-        <a:gradFill rotWithShape="1">
-          <a:gsLst>
-            <a:gs pos="0">
-              <a:schemeClr val="phClr">
-                <a:tint val="80000"/>
-                <a:satMod val="300000"/>
-              </a:schemeClr>
-            </a:gs>
-            <a:gs pos="100000">
-              <a:schemeClr val="phClr">
-                <a:shade val="30000"/>
-                <a:satMod val="200000"/>
-              </a:schemeClr>
-            </a:gs>
-          </a:gsLst>
-          <a:path path="circle">
-            <a:fillToRect l="50000" t="50000" r="50000" b="50000"/>
-          </a:path>
-        </a:gradFill>
-      </a:bgFillStyleLst>
-    </a:fmtScheme>
-  </a:themeElements>
-</a:theme>
 </file>
</xml_diff>

<commit_message>
Hint: 嘗試ShopApplication對接ProductSystemAPI的路由 ShopApplication 新增API連接 Program.cs - ProductSystemAPI.APItoLINK.AttachAPI ProductSystemAPI 新增控制器方法 ProductController - (GetMenu, GetProductInfo) ProductSystemAPI 修改控制器的路由基底 ProductController - [Controller] -> api/[Controller] ShopApplication 修改控制器建構式 ProductController ShopApplication 修改控制器方法 ProductController - (Menu, ProductInfo) ShopApplication 修改檢視 Product - (Menu.cshtml, ProductInfo.cshtml) C#_ASP.NET_常見錯誤.pptx 新增內容
</commit_message>
<xml_diff>
--- a/C#_ASP.NET_常見錯誤.pptx
+++ b/C#_ASP.NET_常見錯誤.pptx
@@ -26,6 +26,8 @@
     <p:sldId id="271" r:id="rId21"/>
     <p:sldId id="272" r:id="rId22"/>
     <p:sldId id="273" r:id="rId23"/>
+    <p:sldId id="274" r:id="rId24"/>
+    <p:sldId id="275" r:id="rId25"/>
   </p:sldIdLst>
   <p:sldSz cy="5143500" cx="9144000"/>
   <p:notesSz cx="6858000" cy="9144000"/>
@@ -1693,6 +1695,105 @@
 </p:notes>
 </file>
 
+<file path=ppt/notesSlides/notesSlide19.xml><?xml version="1.0" encoding="utf-8"?>
+<p:notes xmlns:a="http://schemas.openxmlformats.org/drawingml/2006/main" xmlns:r="http://schemas.openxmlformats.org/officeDocument/2006/relationships" xmlns:mc="http://schemas.openxmlformats.org/markup-compatibility/2006" xmlns:mv="urn:schemas-microsoft-com:mac:vml" xmlns:p="http://schemas.openxmlformats.org/presentationml/2006/main" xmlns:c="http://schemas.openxmlformats.org/drawingml/2006/chart" xmlns:dgm="http://schemas.openxmlformats.org/drawingml/2006/diagram" xmlns:o="urn:schemas-microsoft-com:office:office" xmlns:v="urn:schemas-microsoft-com:vml" xmlns:pvml="urn:schemas-microsoft-com:office:powerpoint" xmlns:com="http://schemas.openxmlformats.org/drawingml/2006/compatibility" xmlns:p14="http://schemas.microsoft.com/office/powerpoint/2010/main" xmlns:p15="http://schemas.microsoft.com/office/powerpoint/2012/main" xmlns:ahyp="http://schemas.microsoft.com/office/drawing/2018/hyperlinkcolor" showMasterPhAnim="0" showMasterSp="0">
+  <p:cSld>
+    <p:spTree>
+      <p:nvGrpSpPr>
+        <p:cNvPr id="198" name="Shape 198"/>
+        <p:cNvGrpSpPr/>
+        <p:nvPr/>
+      </p:nvGrpSpPr>
+      <p:grpSpPr>
+        <a:xfrm>
+          <a:off x="0" y="0"/>
+          <a:ext cx="0" cy="0"/>
+          <a:chOff x="0" y="0"/>
+          <a:chExt cx="0" cy="0"/>
+        </a:xfrm>
+      </p:grpSpPr>
+      <p:sp>
+        <p:nvSpPr>
+          <p:cNvPr id="199" name="Google Shape;199;g278446d6ab1_0_0:notes"/>
+          <p:cNvSpPr/>
+          <p:nvPr>
+            <p:ph idx="2" type="sldImg"/>
+          </p:nvPr>
+        </p:nvSpPr>
+        <p:spPr>
+          <a:xfrm>
+            <a:off x="381300" y="685800"/>
+            <a:ext cx="6096000" cy="3429000"/>
+          </a:xfrm>
+          <a:custGeom>
+            <a:rect b="b" l="l" r="r" t="t"/>
+            <a:pathLst>
+              <a:path extrusionOk="0" h="120000" w="120000">
+                <a:moveTo>
+                  <a:pt x="0" y="0"/>
+                </a:moveTo>
+                <a:lnTo>
+                  <a:pt x="120000" y="0"/>
+                </a:lnTo>
+                <a:lnTo>
+                  <a:pt x="120000" y="120000"/>
+                </a:lnTo>
+                <a:lnTo>
+                  <a:pt x="0" y="120000"/>
+                </a:lnTo>
+                <a:close/>
+              </a:path>
+            </a:pathLst>
+          </a:custGeom>
+        </p:spPr>
+      </p:sp>
+      <p:sp>
+        <p:nvSpPr>
+          <p:cNvPr id="200" name="Google Shape;200;g278446d6ab1_0_0:notes"/>
+          <p:cNvSpPr txBox="1"/>
+          <p:nvPr>
+            <p:ph idx="1" type="body"/>
+          </p:nvPr>
+        </p:nvSpPr>
+        <p:spPr>
+          <a:xfrm>
+            <a:off x="685800" y="4343400"/>
+            <a:ext cx="5486400" cy="4114800"/>
+          </a:xfrm>
+          <a:prstGeom prst="rect">
+            <a:avLst/>
+          </a:prstGeom>
+        </p:spPr>
+        <p:txBody>
+          <a:bodyPr anchorCtr="0" anchor="t" bIns="91425" lIns="91425" spcFirstLastPara="1" rIns="91425" wrap="square" tIns="91425">
+            <a:noAutofit/>
+          </a:bodyPr>
+          <a:lstStyle/>
+          <a:p>
+            <a:pPr indent="0" lvl="0" marL="0" rtl="0" algn="l">
+              <a:spcBef>
+                <a:spcPts val="0"/>
+              </a:spcBef>
+              <a:spcAft>
+                <a:spcPts val="0"/>
+              </a:spcAft>
+              <a:buNone/>
+            </a:pPr>
+            <a:r>
+              <a:t/>
+            </a:r>
+            <a:endParaRPr/>
+          </a:p>
+        </p:txBody>
+      </p:sp>
+    </p:spTree>
+  </p:cSld>
+  <p:clrMapOvr>
+    <a:masterClrMapping/>
+  </p:clrMapOvr>
+</p:notes>
+</file>
+
 <file path=ppt/notesSlides/notesSlide2.xml><?xml version="1.0" encoding="utf-8"?>
 <p:notes xmlns:a="http://schemas.openxmlformats.org/drawingml/2006/main" xmlns:r="http://schemas.openxmlformats.org/officeDocument/2006/relationships" xmlns:mc="http://schemas.openxmlformats.org/markup-compatibility/2006" xmlns:mv="urn:schemas-microsoft-com:mac:vml" xmlns:p="http://schemas.openxmlformats.org/presentationml/2006/main" xmlns:c="http://schemas.openxmlformats.org/drawingml/2006/chart" xmlns:dgm="http://schemas.openxmlformats.org/drawingml/2006/diagram" xmlns:o="urn:schemas-microsoft-com:office:office" xmlns:v="urn:schemas-microsoft-com:vml" xmlns:pvml="urn:schemas-microsoft-com:office:powerpoint" xmlns:com="http://schemas.openxmlformats.org/drawingml/2006/compatibility" xmlns:p14="http://schemas.microsoft.com/office/powerpoint/2010/main" xmlns:p15="http://schemas.microsoft.com/office/powerpoint/2012/main" xmlns:ahyp="http://schemas.microsoft.com/office/drawing/2018/hyperlinkcolor" showMasterPhAnim="0" showMasterSp="0">
   <p:cSld>
@@ -1748,6 +1849,105 @@
       <p:sp>
         <p:nvSpPr>
           <p:cNvPr id="58" name="Google Shape;58;g2739b1c7218_0_45:notes"/>
+          <p:cNvSpPr txBox="1"/>
+          <p:nvPr>
+            <p:ph idx="1" type="body"/>
+          </p:nvPr>
+        </p:nvSpPr>
+        <p:spPr>
+          <a:xfrm>
+            <a:off x="685800" y="4343400"/>
+            <a:ext cx="5486400" cy="4114800"/>
+          </a:xfrm>
+          <a:prstGeom prst="rect">
+            <a:avLst/>
+          </a:prstGeom>
+        </p:spPr>
+        <p:txBody>
+          <a:bodyPr anchorCtr="0" anchor="t" bIns="91425" lIns="91425" spcFirstLastPara="1" rIns="91425" wrap="square" tIns="91425">
+            <a:noAutofit/>
+          </a:bodyPr>
+          <a:lstStyle/>
+          <a:p>
+            <a:pPr indent="0" lvl="0" marL="0" rtl="0" algn="l">
+              <a:spcBef>
+                <a:spcPts val="0"/>
+              </a:spcBef>
+              <a:spcAft>
+                <a:spcPts val="0"/>
+              </a:spcAft>
+              <a:buNone/>
+            </a:pPr>
+            <a:r>
+              <a:t/>
+            </a:r>
+            <a:endParaRPr/>
+          </a:p>
+        </p:txBody>
+      </p:sp>
+    </p:spTree>
+  </p:cSld>
+  <p:clrMapOvr>
+    <a:masterClrMapping/>
+  </p:clrMapOvr>
+</p:notes>
+</file>
+
+<file path=ppt/notesSlides/notesSlide20.xml><?xml version="1.0" encoding="utf-8"?>
+<p:notes xmlns:a="http://schemas.openxmlformats.org/drawingml/2006/main" xmlns:r="http://schemas.openxmlformats.org/officeDocument/2006/relationships" xmlns:mc="http://schemas.openxmlformats.org/markup-compatibility/2006" xmlns:mv="urn:schemas-microsoft-com:mac:vml" xmlns:p="http://schemas.openxmlformats.org/presentationml/2006/main" xmlns:c="http://schemas.openxmlformats.org/drawingml/2006/chart" xmlns:dgm="http://schemas.openxmlformats.org/drawingml/2006/diagram" xmlns:o="urn:schemas-microsoft-com:office:office" xmlns:v="urn:schemas-microsoft-com:vml" xmlns:pvml="urn:schemas-microsoft-com:office:powerpoint" xmlns:com="http://schemas.openxmlformats.org/drawingml/2006/compatibility" xmlns:p14="http://schemas.microsoft.com/office/powerpoint/2010/main" xmlns:p15="http://schemas.microsoft.com/office/powerpoint/2012/main" xmlns:ahyp="http://schemas.microsoft.com/office/drawing/2018/hyperlinkcolor" showMasterPhAnim="0" showMasterSp="0">
+  <p:cSld>
+    <p:spTree>
+      <p:nvGrpSpPr>
+        <p:cNvPr id="205" name="Shape 205"/>
+        <p:cNvGrpSpPr/>
+        <p:nvPr/>
+      </p:nvGrpSpPr>
+      <p:grpSpPr>
+        <a:xfrm>
+          <a:off x="0" y="0"/>
+          <a:ext cx="0" cy="0"/>
+          <a:chOff x="0" y="0"/>
+          <a:chExt cx="0" cy="0"/>
+        </a:xfrm>
+      </p:grpSpPr>
+      <p:sp>
+        <p:nvSpPr>
+          <p:cNvPr id="206" name="Google Shape;206;g278446d6ab1_0_6:notes"/>
+          <p:cNvSpPr/>
+          <p:nvPr>
+            <p:ph idx="2" type="sldImg"/>
+          </p:nvPr>
+        </p:nvSpPr>
+        <p:spPr>
+          <a:xfrm>
+            <a:off x="381300" y="685800"/>
+            <a:ext cx="6096000" cy="3429000"/>
+          </a:xfrm>
+          <a:custGeom>
+            <a:rect b="b" l="l" r="r" t="t"/>
+            <a:pathLst>
+              <a:path extrusionOk="0" h="120000" w="120000">
+                <a:moveTo>
+                  <a:pt x="0" y="0"/>
+                </a:moveTo>
+                <a:lnTo>
+                  <a:pt x="120000" y="0"/>
+                </a:lnTo>
+                <a:lnTo>
+                  <a:pt x="120000" y="120000"/>
+                </a:lnTo>
+                <a:lnTo>
+                  <a:pt x="0" y="120000"/>
+                </a:lnTo>
+                <a:close/>
+              </a:path>
+            </a:pathLst>
+          </a:custGeom>
+        </p:spPr>
+      </p:sp>
+      <p:sp>
+        <p:nvSpPr>
+          <p:cNvPr id="207" name="Google Shape;207;g278446d6ab1_0_6:notes"/>
           <p:cNvSpPr txBox="1"/>
           <p:nvPr>
             <p:ph idx="1" type="body"/>
@@ -7391,7 +7591,7 @@
                 <a:cs typeface="Times New Roman"/>
                 <a:sym typeface="Times New Roman"/>
               </a:rPr>
-              <a:t>2024/07/16</a:t>
+              <a:t>2024/07/17</a:t>
             </a:r>
             <a:endParaRPr>
               <a:latin typeface="Times New Roman"/>
@@ -10810,6 +11010,376 @@
 </p:sld>
 </file>
 
+<file path=ppt/slides/slide19.xml><?xml version="1.0" encoding="utf-8"?>
+<p:sld xmlns:a="http://schemas.openxmlformats.org/drawingml/2006/main" xmlns:r="http://schemas.openxmlformats.org/officeDocument/2006/relationships" xmlns:mc="http://schemas.openxmlformats.org/markup-compatibility/2006" xmlns:mv="urn:schemas-microsoft-com:mac:vml" xmlns:p="http://schemas.openxmlformats.org/presentationml/2006/main" xmlns:c="http://schemas.openxmlformats.org/drawingml/2006/chart" xmlns:dgm="http://schemas.openxmlformats.org/drawingml/2006/diagram" xmlns:o="urn:schemas-microsoft-com:office:office" xmlns:v="urn:schemas-microsoft-com:vml" xmlns:pvml="urn:schemas-microsoft-com:office:powerpoint" xmlns:com="http://schemas.openxmlformats.org/drawingml/2006/compatibility" xmlns:p14="http://schemas.microsoft.com/office/powerpoint/2010/main" xmlns:p15="http://schemas.microsoft.com/office/powerpoint/2012/main" xmlns:ahyp="http://schemas.microsoft.com/office/drawing/2018/hyperlinkcolor">
+  <p:cSld>
+    <p:spTree>
+      <p:nvGrpSpPr>
+        <p:cNvPr id="201" name="Shape 201"/>
+        <p:cNvGrpSpPr/>
+        <p:nvPr/>
+      </p:nvGrpSpPr>
+      <p:grpSpPr>
+        <a:xfrm>
+          <a:off x="0" y="0"/>
+          <a:ext cx="0" cy="0"/>
+          <a:chOff x="0" y="0"/>
+          <a:chExt cx="0" cy="0"/>
+        </a:xfrm>
+      </p:grpSpPr>
+      <p:sp>
+        <p:nvSpPr>
+          <p:cNvPr id="202" name="Google Shape;202;p31"/>
+          <p:cNvSpPr txBox="1"/>
+          <p:nvPr>
+            <p:ph type="title"/>
+          </p:nvPr>
+        </p:nvSpPr>
+        <p:spPr>
+          <a:xfrm>
+            <a:off x="311700" y="445025"/>
+            <a:ext cx="8520600" cy="572700"/>
+          </a:xfrm>
+          <a:prstGeom prst="rect">
+            <a:avLst/>
+          </a:prstGeom>
+        </p:spPr>
+        <p:txBody>
+          <a:bodyPr anchorCtr="0" anchor="t" bIns="91425" lIns="91425" spcFirstLastPara="1" rIns="91425" wrap="square" tIns="91425">
+            <a:normAutofit fontScale="90000"/>
+          </a:bodyPr>
+          <a:lstStyle/>
+          <a:p>
+            <a:pPr indent="0" lvl="0" marL="0" rtl="0" algn="l">
+              <a:spcBef>
+                <a:spcPts val="0"/>
+              </a:spcBef>
+              <a:spcAft>
+                <a:spcPts val="0"/>
+              </a:spcAft>
+              <a:buNone/>
+            </a:pPr>
+            <a:r>
+              <a:rPr lang="zh-TW">
+                <a:latin typeface="DFKai-SB"/>
+                <a:ea typeface="DFKai-SB"/>
+                <a:cs typeface="DFKai-SB"/>
+                <a:sym typeface="DFKai-SB"/>
+              </a:rPr>
+              <a:t>錯誤</a:t>
+            </a:r>
+            <a:r>
+              <a:rPr lang="zh-TW"/>
+              <a:t> </a:t>
+            </a:r>
+            <a:r>
+              <a:rPr lang="zh-TW">
+                <a:latin typeface="Times New Roman"/>
+                <a:ea typeface="Times New Roman"/>
+                <a:cs typeface="Times New Roman"/>
+                <a:sym typeface="Times New Roman"/>
+              </a:rPr>
+              <a:t>9</a:t>
+            </a:r>
+            <a:endParaRPr>
+              <a:latin typeface="Times New Roman"/>
+              <a:ea typeface="Times New Roman"/>
+              <a:cs typeface="Times New Roman"/>
+              <a:sym typeface="Times New Roman"/>
+            </a:endParaRPr>
+          </a:p>
+        </p:txBody>
+      </p:sp>
+      <p:sp>
+        <p:nvSpPr>
+          <p:cNvPr id="203" name="Google Shape;203;p31"/>
+          <p:cNvSpPr txBox="1"/>
+          <p:nvPr>
+            <p:ph idx="1" type="body"/>
+          </p:nvPr>
+        </p:nvSpPr>
+        <p:spPr>
+          <a:xfrm>
+            <a:off x="311700" y="1152475"/>
+            <a:ext cx="8520600" cy="3896700"/>
+          </a:xfrm>
+          <a:prstGeom prst="rect">
+            <a:avLst/>
+          </a:prstGeom>
+        </p:spPr>
+        <p:txBody>
+          <a:bodyPr anchorCtr="0" anchor="t" bIns="91425" lIns="91425" spcFirstLastPara="1" rIns="91425" wrap="square" tIns="91425">
+            <a:normAutofit/>
+          </a:bodyPr>
+          <a:lstStyle/>
+          <a:p>
+            <a:pPr indent="-342900" lvl="0" marL="457200" rtl="0" algn="l">
+              <a:spcBef>
+                <a:spcPts val="0"/>
+              </a:spcBef>
+              <a:spcAft>
+                <a:spcPts val="0"/>
+              </a:spcAft>
+              <a:buSzPts val="1800"/>
+              <a:buFont typeface="DFKai-SB"/>
+              <a:buChar char="●"/>
+            </a:pPr>
+            <a:r>
+              <a:rPr lang="zh-TW">
+                <a:latin typeface="DFKai-SB"/>
+                <a:ea typeface="DFKai-SB"/>
+                <a:cs typeface="DFKai-SB"/>
+                <a:sym typeface="DFKai-SB"/>
+              </a:rPr>
+              <a:t>錯誤資訊：</a:t>
+            </a:r>
+            <a:endParaRPr>
+              <a:latin typeface="DFKai-SB"/>
+              <a:ea typeface="DFKai-SB"/>
+              <a:cs typeface="DFKai-SB"/>
+              <a:sym typeface="DFKai-SB"/>
+            </a:endParaRPr>
+          </a:p>
+          <a:p>
+            <a:pPr indent="0" lvl="0" marL="457200" rtl="0" algn="l">
+              <a:spcBef>
+                <a:spcPts val="1200"/>
+              </a:spcBef>
+              <a:spcAft>
+                <a:spcPts val="0"/>
+              </a:spcAft>
+              <a:buNone/>
+            </a:pPr>
+            <a:r>
+              <a:rPr lang="zh-TW" sz="1300">
+                <a:latin typeface="DFKai-SB"/>
+                <a:ea typeface="DFKai-SB"/>
+                <a:cs typeface="DFKai-SB"/>
+                <a:sym typeface="DFKai-SB"/>
+              </a:rPr>
+              <a:t>在</a:t>
+            </a:r>
+            <a:r>
+              <a:rPr lang="zh-TW" sz="1300">
+                <a:latin typeface="Times New Roman"/>
+                <a:ea typeface="Times New Roman"/>
+                <a:cs typeface="Times New Roman"/>
+                <a:sym typeface="Times New Roman"/>
+              </a:rPr>
+              <a:t>MVC</a:t>
+            </a:r>
+            <a:r>
+              <a:rPr lang="zh-TW" sz="1300">
+                <a:latin typeface="DFKai-SB"/>
+                <a:ea typeface="DFKai-SB"/>
+                <a:cs typeface="DFKai-SB"/>
+                <a:sym typeface="DFKai-SB"/>
+              </a:rPr>
+              <a:t>模型中使用路由屬性[Route()]而找不到目標網址，產生404錯誤。</a:t>
+            </a:r>
+            <a:endParaRPr sz="1300">
+              <a:latin typeface="DFKai-SB"/>
+              <a:ea typeface="DFKai-SB"/>
+              <a:cs typeface="DFKai-SB"/>
+              <a:sym typeface="DFKai-SB"/>
+            </a:endParaRPr>
+          </a:p>
+          <a:p>
+            <a:pPr indent="-342900" lvl="0" marL="457200" rtl="0" algn="l">
+              <a:spcBef>
+                <a:spcPts val="1200"/>
+              </a:spcBef>
+              <a:spcAft>
+                <a:spcPts val="0"/>
+              </a:spcAft>
+              <a:buSzPts val="1800"/>
+              <a:buFont typeface="DFKai-SB"/>
+              <a:buChar char="●"/>
+            </a:pPr>
+            <a:r>
+              <a:rPr lang="zh-TW">
+                <a:latin typeface="DFKai-SB"/>
+                <a:ea typeface="DFKai-SB"/>
+                <a:cs typeface="DFKai-SB"/>
+                <a:sym typeface="DFKai-SB"/>
+              </a:rPr>
+              <a:t>原因：</a:t>
+            </a:r>
+            <a:endParaRPr>
+              <a:latin typeface="DFKai-SB"/>
+              <a:ea typeface="DFKai-SB"/>
+              <a:cs typeface="DFKai-SB"/>
+              <a:sym typeface="DFKai-SB"/>
+            </a:endParaRPr>
+          </a:p>
+          <a:p>
+            <a:pPr indent="0" lvl="0" marL="457200" rtl="0" algn="l">
+              <a:lnSpc>
+                <a:spcPct val="100000"/>
+              </a:lnSpc>
+              <a:spcBef>
+                <a:spcPts val="1200"/>
+              </a:spcBef>
+              <a:spcAft>
+                <a:spcPts val="0"/>
+              </a:spcAft>
+              <a:buNone/>
+            </a:pPr>
+            <a:r>
+              <a:rPr lang="zh-TW" sz="1300">
+                <a:latin typeface="DFKai-SB"/>
+                <a:ea typeface="DFKai-SB"/>
+                <a:cs typeface="DFKai-SB"/>
+                <a:sym typeface="DFKai-SB"/>
+              </a:rPr>
+              <a:t>路由屬性的設置似乎是對應[ApiController]而使用的</a:t>
+            </a:r>
+            <a:r>
+              <a:rPr lang="zh-TW" sz="1300">
+                <a:latin typeface="DFKai-SB"/>
+                <a:ea typeface="DFKai-SB"/>
+                <a:cs typeface="DFKai-SB"/>
+                <a:sym typeface="DFKai-SB"/>
+              </a:rPr>
+              <a:t>。</a:t>
+            </a:r>
+            <a:endParaRPr sz="1200">
+              <a:latin typeface="DFKai-SB"/>
+              <a:ea typeface="DFKai-SB"/>
+              <a:cs typeface="DFKai-SB"/>
+              <a:sym typeface="DFKai-SB"/>
+            </a:endParaRPr>
+          </a:p>
+          <a:p>
+            <a:pPr indent="-342900" lvl="0" marL="457200" rtl="0" algn="l">
+              <a:spcBef>
+                <a:spcPts val="1200"/>
+              </a:spcBef>
+              <a:spcAft>
+                <a:spcPts val="0"/>
+              </a:spcAft>
+              <a:buSzPts val="1800"/>
+              <a:buFont typeface="DFKai-SB"/>
+              <a:buChar char="●"/>
+            </a:pPr>
+            <a:r>
+              <a:rPr lang="zh-TW">
+                <a:latin typeface="DFKai-SB"/>
+                <a:ea typeface="DFKai-SB"/>
+                <a:cs typeface="DFKai-SB"/>
+                <a:sym typeface="DFKai-SB"/>
+              </a:rPr>
+              <a:t>解決方法：</a:t>
+            </a:r>
+            <a:endParaRPr>
+              <a:latin typeface="DFKai-SB"/>
+              <a:ea typeface="DFKai-SB"/>
+              <a:cs typeface="DFKai-SB"/>
+              <a:sym typeface="DFKai-SB"/>
+            </a:endParaRPr>
+          </a:p>
+          <a:p>
+            <a:pPr indent="0" lvl="0" marL="0" rtl="0" algn="l">
+              <a:spcBef>
+                <a:spcPts val="1200"/>
+              </a:spcBef>
+              <a:spcAft>
+                <a:spcPts val="0"/>
+              </a:spcAft>
+              <a:buNone/>
+            </a:pPr>
+            <a:r>
+              <a:rPr lang="zh-TW" sz="1300">
+                <a:latin typeface="DFKai-SB"/>
+                <a:ea typeface="DFKai-SB"/>
+                <a:cs typeface="DFKai-SB"/>
+                <a:sym typeface="DFKai-SB"/>
+              </a:rPr>
+              <a:t>	</a:t>
+            </a:r>
+            <a:r>
+              <a:rPr lang="zh-TW" sz="1300">
+                <a:latin typeface="DFKai-SB"/>
+                <a:ea typeface="DFKai-SB"/>
+                <a:cs typeface="DFKai-SB"/>
+                <a:sym typeface="DFKai-SB"/>
+              </a:rPr>
+              <a:t>移除路由屬性即可，而網址的部分可以透過Action的參數(查詢字串)去處理</a:t>
+            </a:r>
+            <a:r>
+              <a:rPr lang="zh-TW" sz="1300">
+                <a:latin typeface="DFKai-SB"/>
+                <a:ea typeface="DFKai-SB"/>
+                <a:cs typeface="DFKai-SB"/>
+                <a:sym typeface="DFKai-SB"/>
+              </a:rPr>
+              <a:t>。</a:t>
+            </a:r>
+            <a:endParaRPr sz="1300">
+              <a:latin typeface="DFKai-SB"/>
+              <a:ea typeface="DFKai-SB"/>
+              <a:cs typeface="DFKai-SB"/>
+              <a:sym typeface="DFKai-SB"/>
+            </a:endParaRPr>
+          </a:p>
+          <a:p>
+            <a:pPr indent="0" lvl="0" marL="457200" rtl="0" algn="l">
+              <a:spcBef>
+                <a:spcPts val="1200"/>
+              </a:spcBef>
+              <a:spcAft>
+                <a:spcPts val="1200"/>
+              </a:spcAft>
+              <a:buNone/>
+            </a:pPr>
+            <a:r>
+              <a:t/>
+            </a:r>
+            <a:endParaRPr sz="1300">
+              <a:latin typeface="DFKai-SB"/>
+              <a:ea typeface="DFKai-SB"/>
+              <a:cs typeface="DFKai-SB"/>
+              <a:sym typeface="DFKai-SB"/>
+            </a:endParaRPr>
+          </a:p>
+        </p:txBody>
+      </p:sp>
+      <p:pic>
+        <p:nvPicPr>
+          <p:cNvPr id="204" name="Google Shape;204;p31"/>
+          <p:cNvPicPr preferRelativeResize="0"/>
+          <p:nvPr/>
+        </p:nvPicPr>
+        <p:blipFill>
+          <a:blip r:embed="rId3">
+            <a:alphaModFix/>
+          </a:blip>
+          <a:stretch>
+            <a:fillRect/>
+          </a:stretch>
+        </p:blipFill>
+        <p:spPr>
+          <a:xfrm>
+            <a:off x="6309250" y="1072575"/>
+            <a:ext cx="2523050" cy="1365475"/>
+          </a:xfrm>
+          <a:prstGeom prst="rect">
+            <a:avLst/>
+          </a:prstGeom>
+          <a:noFill/>
+          <a:ln>
+            <a:noFill/>
+          </a:ln>
+        </p:spPr>
+      </p:pic>
+    </p:spTree>
+  </p:cSld>
+  <p:clrMapOvr>
+    <a:masterClrMapping/>
+  </p:clrMapOvr>
+</p:sld>
+</file>
+
 <file path=ppt/slides/slide2.xml><?xml version="1.0" encoding="utf-8"?>
 <p:sld xmlns:a="http://schemas.openxmlformats.org/drawingml/2006/main" xmlns:r="http://schemas.openxmlformats.org/officeDocument/2006/relationships" xmlns:mc="http://schemas.openxmlformats.org/markup-compatibility/2006" xmlns:mv="urn:schemas-microsoft-com:mac:vml" xmlns:p="http://schemas.openxmlformats.org/presentationml/2006/main" xmlns:c="http://schemas.openxmlformats.org/drawingml/2006/chart" xmlns:dgm="http://schemas.openxmlformats.org/drawingml/2006/diagram" xmlns:o="urn:schemas-microsoft-com:office:office" xmlns:v="urn:schemas-microsoft-com:vml" xmlns:pvml="urn:schemas-microsoft-com:office:powerpoint" xmlns:com="http://schemas.openxmlformats.org/drawingml/2006/compatibility" xmlns:p14="http://schemas.microsoft.com/office/powerpoint/2010/main" xmlns:p15="http://schemas.microsoft.com/office/powerpoint/2012/main" xmlns:ahyp="http://schemas.microsoft.com/office/drawing/2018/hyperlinkcolor">
   <p:cSld>
@@ -11224,6 +11794,146 @@
           </a:ln>
         </p:spPr>
       </p:pic>
+    </p:spTree>
+  </p:cSld>
+  <p:clrMapOvr>
+    <a:masterClrMapping/>
+  </p:clrMapOvr>
+</p:sld>
+</file>
+
+<file path=ppt/slides/slide20.xml><?xml version="1.0" encoding="utf-8"?>
+<p:sld xmlns:a="http://schemas.openxmlformats.org/drawingml/2006/main" xmlns:r="http://schemas.openxmlformats.org/officeDocument/2006/relationships" xmlns:mc="http://schemas.openxmlformats.org/markup-compatibility/2006" xmlns:mv="urn:schemas-microsoft-com:mac:vml" xmlns:p="http://schemas.openxmlformats.org/presentationml/2006/main" xmlns:c="http://schemas.openxmlformats.org/drawingml/2006/chart" xmlns:dgm="http://schemas.openxmlformats.org/drawingml/2006/diagram" xmlns:o="urn:schemas-microsoft-com:office:office" xmlns:v="urn:schemas-microsoft-com:vml" xmlns:pvml="urn:schemas-microsoft-com:office:powerpoint" xmlns:com="http://schemas.openxmlformats.org/drawingml/2006/compatibility" xmlns:p14="http://schemas.microsoft.com/office/powerpoint/2010/main" xmlns:p15="http://schemas.microsoft.com/office/powerpoint/2012/main" xmlns:ahyp="http://schemas.microsoft.com/office/drawing/2018/hyperlinkcolor">
+  <p:cSld>
+    <p:bg>
+      <p:bgPr>
+        <a:solidFill>
+          <a:schemeClr val="dk1"/>
+        </a:solidFill>
+      </p:bgPr>
+    </p:bg>
+    <p:spTree>
+      <p:nvGrpSpPr>
+        <p:cNvPr id="208" name="Shape 208"/>
+        <p:cNvGrpSpPr/>
+        <p:nvPr/>
+      </p:nvGrpSpPr>
+      <p:grpSpPr>
+        <a:xfrm>
+          <a:off x="0" y="0"/>
+          <a:ext cx="0" cy="0"/>
+          <a:chOff x="0" y="0"/>
+          <a:chExt cx="0" cy="0"/>
+        </a:xfrm>
+      </p:grpSpPr>
+      <p:pic>
+        <p:nvPicPr>
+          <p:cNvPr id="209" name="Google Shape;209;p32"/>
+          <p:cNvPicPr preferRelativeResize="0"/>
+          <p:nvPr/>
+        </p:nvPicPr>
+        <p:blipFill>
+          <a:blip r:embed="rId3">
+            <a:alphaModFix/>
+          </a:blip>
+          <a:stretch>
+            <a:fillRect/>
+          </a:stretch>
+        </p:blipFill>
+        <p:spPr>
+          <a:xfrm>
+            <a:off x="1104371" y="376000"/>
+            <a:ext cx="6380907" cy="1391034"/>
+          </a:xfrm>
+          <a:prstGeom prst="rect">
+            <a:avLst/>
+          </a:prstGeom>
+          <a:noFill/>
+          <a:ln>
+            <a:noFill/>
+          </a:ln>
+        </p:spPr>
+      </p:pic>
+      <p:pic>
+        <p:nvPicPr>
+          <p:cNvPr id="210" name="Google Shape;210;p32"/>
+          <p:cNvPicPr preferRelativeResize="0"/>
+          <p:nvPr/>
+        </p:nvPicPr>
+        <p:blipFill>
+          <a:blip r:embed="rId4">
+            <a:alphaModFix/>
+          </a:blip>
+          <a:stretch>
+            <a:fillRect/>
+          </a:stretch>
+        </p:blipFill>
+        <p:spPr>
+          <a:xfrm>
+            <a:off x="1094606" y="2957635"/>
+            <a:ext cx="6400450" cy="896065"/>
+          </a:xfrm>
+          <a:prstGeom prst="rect">
+            <a:avLst/>
+          </a:prstGeom>
+          <a:noFill/>
+          <a:ln>
+            <a:noFill/>
+          </a:ln>
+        </p:spPr>
+      </p:pic>
+      <p:sp>
+        <p:nvSpPr>
+          <p:cNvPr id="211" name="Google Shape;211;p32"/>
+          <p:cNvSpPr/>
+          <p:nvPr/>
+        </p:nvSpPr>
+        <p:spPr>
+          <a:xfrm>
+            <a:off x="4106125" y="1767025"/>
+            <a:ext cx="377400" cy="1190700"/>
+          </a:xfrm>
+          <a:prstGeom prst="downArrow">
+            <a:avLst>
+              <a:gd fmla="val 50000" name="adj1"/>
+              <a:gd fmla="val 50000" name="adj2"/>
+            </a:avLst>
+          </a:prstGeom>
+          <a:solidFill>
+            <a:schemeClr val="lt2"/>
+          </a:solidFill>
+          <a:ln cap="flat" cmpd="sng" w="9525">
+            <a:solidFill>
+              <a:schemeClr val="dk2"/>
+            </a:solidFill>
+            <a:prstDash val="solid"/>
+            <a:round/>
+            <a:headEnd len="sm" w="sm" type="none"/>
+            <a:tailEnd len="sm" w="sm" type="none"/>
+          </a:ln>
+        </p:spPr>
+        <p:txBody>
+          <a:bodyPr anchorCtr="0" anchor="ctr" bIns="91425" lIns="91425" spcFirstLastPara="1" rIns="91425" wrap="square" tIns="91425">
+            <a:noAutofit/>
+          </a:bodyPr>
+          <a:lstStyle/>
+          <a:p>
+            <a:pPr indent="0" lvl="0" marL="0" rtl="0" algn="ctr">
+              <a:spcBef>
+                <a:spcPts val="0"/>
+              </a:spcBef>
+              <a:spcAft>
+                <a:spcPts val="0"/>
+              </a:spcAft>
+              <a:buNone/>
+            </a:pPr>
+            <a:r>
+              <a:t/>
+            </a:r>
+            <a:endParaRPr/>
+          </a:p>
+        </p:txBody>
+      </p:sp>
     </p:spTree>
   </p:cSld>
   <p:clrMapOvr>
@@ -13410,6 +14120,285 @@
 </file>
 
 <file path=ppt/theme/theme1.xml><?xml version="1.0" encoding="utf-8"?>
+<a:theme xmlns:a="http://schemas.openxmlformats.org/drawingml/2006/main" xmlns:r="http://schemas.openxmlformats.org/officeDocument/2006/relationships">
+  <a:themeElements>
+    <a:clrScheme name="Default">
+      <a:dk1>
+        <a:srgbClr val="000000"/>
+      </a:dk1>
+      <a:lt1>
+        <a:srgbClr val="FFFFFF"/>
+      </a:lt1>
+      <a:dk2>
+        <a:srgbClr val="158158"/>
+      </a:dk2>
+      <a:lt2>
+        <a:srgbClr val="F3F3F3"/>
+      </a:lt2>
+      <a:accent1>
+        <a:srgbClr val="058DC7"/>
+      </a:accent1>
+      <a:accent2>
+        <a:srgbClr val="50B432"/>
+      </a:accent2>
+      <a:accent3>
+        <a:srgbClr val="ED561B"/>
+      </a:accent3>
+      <a:accent4>
+        <a:srgbClr val="EDEF00"/>
+      </a:accent4>
+      <a:accent5>
+        <a:srgbClr val="24CBE5"/>
+      </a:accent5>
+      <a:accent6>
+        <a:srgbClr val="64E572"/>
+      </a:accent6>
+      <a:hlink>
+        <a:srgbClr val="2200CC"/>
+      </a:hlink>
+      <a:folHlink>
+        <a:srgbClr val="551A8B"/>
+      </a:folHlink>
+    </a:clrScheme>
+    <a:fontScheme name="Office">
+      <a:majorFont>
+        <a:latin typeface="Arial"/>
+        <a:ea typeface=""/>
+        <a:cs typeface=""/>
+        <a:font script="Jpan" typeface="ＭＳ Ｐゴシック"/>
+        <a:font script="Hang" typeface="맑은 고딕"/>
+        <a:font script="Hans" typeface="宋体"/>
+        <a:font script="Hant" typeface="新細明體"/>
+        <a:font script="Arab" typeface="Times New Roman"/>
+        <a:font script="Hebr" typeface="Times New Roman"/>
+        <a:font script="Thai" typeface="Angsana New"/>
+        <a:font script="Ethi" typeface="Nyala"/>
+        <a:font script="Beng" typeface="Vrinda"/>
+        <a:font script="Gujr" typeface="Shruti"/>
+        <a:font script="Khmr" typeface="MoolBoran"/>
+        <a:font script="Knda" typeface="Tunga"/>
+        <a:font script="Guru" typeface="Raavi"/>
+        <a:font script="Cans" typeface="Euphemia"/>
+        <a:font script="Cher" typeface="Plantagenet Cherokee"/>
+        <a:font script="Yiii" typeface="Microsoft Yi Baiti"/>
+        <a:font script="Tibt" typeface="Microsoft Himalaya"/>
+        <a:font script="Thaa" typeface="MV Boli"/>
+        <a:font script="Deva" typeface="Mangal"/>
+        <a:font script="Telu" typeface="Gautami"/>
+        <a:font script="Taml" typeface="Latha"/>
+        <a:font script="Syrc" typeface="Estrangelo Edessa"/>
+        <a:font script="Orya" typeface="Kalinga"/>
+        <a:font script="Mlym" typeface="Kartika"/>
+        <a:font script="Laoo" typeface="DokChampa"/>
+        <a:font script="Sinh" typeface="Iskoola Pota"/>
+        <a:font script="Mong" typeface="Mongolian Baiti"/>
+        <a:font script="Viet" typeface="Times New Roman"/>
+        <a:font script="Uigh" typeface="Microsoft Uighur"/>
+        <a:font script="Geor" typeface="Sylfaen"/>
+      </a:majorFont>
+      <a:minorFont>
+        <a:latin typeface="Arial"/>
+        <a:ea typeface=""/>
+        <a:cs typeface=""/>
+        <a:font script="Jpan" typeface="ＭＳ Ｐゴシック"/>
+        <a:font script="Hang" typeface="맑은 고딕"/>
+        <a:font script="Hans" typeface="宋体"/>
+        <a:font script="Hant" typeface="新細明體"/>
+        <a:font script="Arab" typeface="Arial"/>
+        <a:font script="Hebr" typeface="Arial"/>
+        <a:font script="Thai" typeface="Cordia New"/>
+        <a:font script="Ethi" typeface="Nyala"/>
+        <a:font script="Beng" typeface="Vrinda"/>
+        <a:font script="Gujr" typeface="Shruti"/>
+        <a:font script="Khmr" typeface="DaunPenh"/>
+        <a:font script="Knda" typeface="Tunga"/>
+        <a:font script="Guru" typeface="Raavi"/>
+        <a:font script="Cans" typeface="Euphemia"/>
+        <a:font script="Cher" typeface="Plantagenet Cherokee"/>
+        <a:font script="Yiii" typeface="Microsoft Yi Baiti"/>
+        <a:font script="Tibt" typeface="Microsoft Himalaya"/>
+        <a:font script="Thaa" typeface="MV Boli"/>
+        <a:font script="Deva" typeface="Mangal"/>
+        <a:font script="Telu" typeface="Gautami"/>
+        <a:font script="Taml" typeface="Latha"/>
+        <a:font script="Syrc" typeface="Estrangelo Edessa"/>
+        <a:font script="Orya" typeface="Kalinga"/>
+        <a:font script="Mlym" typeface="Kartika"/>
+        <a:font script="Laoo" typeface="DokChampa"/>
+        <a:font script="Sinh" typeface="Iskoola Pota"/>
+        <a:font script="Mong" typeface="Mongolian Baiti"/>
+        <a:font script="Viet" typeface="Arial"/>
+        <a:font script="Uigh" typeface="Microsoft Uighur"/>
+        <a:font script="Geor" typeface="Sylfaen"/>
+      </a:minorFont>
+    </a:fontScheme>
+    <a:fmtScheme name="Office">
+      <a:fillStyleLst>
+        <a:solidFill>
+          <a:schemeClr val="phClr"/>
+        </a:solidFill>
+        <a:gradFill rotWithShape="1">
+          <a:gsLst>
+            <a:gs pos="0">
+              <a:schemeClr val="phClr">
+                <a:tint val="50000"/>
+                <a:satMod val="300000"/>
+              </a:schemeClr>
+            </a:gs>
+            <a:gs pos="35000">
+              <a:schemeClr val="phClr">
+                <a:tint val="37000"/>
+                <a:satMod val="300000"/>
+              </a:schemeClr>
+            </a:gs>
+            <a:gs pos="100000">
+              <a:schemeClr val="phClr">
+                <a:tint val="15000"/>
+                <a:satMod val="350000"/>
+              </a:schemeClr>
+            </a:gs>
+          </a:gsLst>
+          <a:lin ang="16200000" scaled="1"/>
+        </a:gradFill>
+        <a:gradFill rotWithShape="1">
+          <a:gsLst>
+            <a:gs pos="0">
+              <a:schemeClr val="phClr">
+                <a:tint val="100000"/>
+                <a:shade val="100000"/>
+                <a:satMod val="130000"/>
+              </a:schemeClr>
+            </a:gs>
+            <a:gs pos="100000">
+              <a:schemeClr val="phClr">
+                <a:tint val="50000"/>
+                <a:shade val="100000"/>
+                <a:satMod val="350000"/>
+              </a:schemeClr>
+            </a:gs>
+          </a:gsLst>
+          <a:lin ang="16200000" scaled="0"/>
+        </a:gradFill>
+      </a:fillStyleLst>
+      <a:lnStyleLst>
+        <a:ln w="9525" cap="flat" cmpd="sng" algn="ctr">
+          <a:solidFill>
+            <a:schemeClr val="phClr">
+              <a:shade val="95000"/>
+              <a:satMod val="105000"/>
+            </a:schemeClr>
+          </a:solidFill>
+          <a:prstDash val="solid"/>
+        </a:ln>
+        <a:ln w="25400" cap="flat" cmpd="sng" algn="ctr">
+          <a:solidFill>
+            <a:schemeClr val="phClr"/>
+          </a:solidFill>
+          <a:prstDash val="solid"/>
+        </a:ln>
+        <a:ln w="38100" cap="flat" cmpd="sng" algn="ctr">
+          <a:solidFill>
+            <a:schemeClr val="phClr"/>
+          </a:solidFill>
+          <a:prstDash val="solid"/>
+        </a:ln>
+      </a:lnStyleLst>
+      <a:effectStyleLst>
+        <a:effectStyle>
+          <a:effectLst>
+            <a:outerShdw blurRad="40000" dist="20000" dir="5400000" rotWithShape="0">
+              <a:srgbClr val="000000">
+                <a:alpha val="38000"/>
+              </a:srgbClr>
+            </a:outerShdw>
+          </a:effectLst>
+        </a:effectStyle>
+        <a:effectStyle>
+          <a:effectLst>
+            <a:outerShdw blurRad="40000" dist="23000" dir="5400000" rotWithShape="0">
+              <a:srgbClr val="000000">
+                <a:alpha val="35000"/>
+              </a:srgbClr>
+            </a:outerShdw>
+          </a:effectLst>
+        </a:effectStyle>
+        <a:effectStyle>
+          <a:effectLst>
+            <a:outerShdw blurRad="40000" dist="23000" dir="5400000" rotWithShape="0">
+              <a:srgbClr val="000000">
+                <a:alpha val="35000"/>
+              </a:srgbClr>
+            </a:outerShdw>
+          </a:effectLst>
+          <a:scene3d>
+            <a:camera prst="orthographicFront">
+              <a:rot lat="0" lon="0" rev="0"/>
+            </a:camera>
+            <a:lightRig rig="threePt" dir="t">
+              <a:rot lat="0" lon="0" rev="1200000"/>
+            </a:lightRig>
+          </a:scene3d>
+          <a:sp3d>
+            <a:bevelT w="63500" h="25400"/>
+          </a:sp3d>
+        </a:effectStyle>
+      </a:effectStyleLst>
+      <a:bgFillStyleLst>
+        <a:solidFill>
+          <a:schemeClr val="phClr"/>
+        </a:solidFill>
+        <a:gradFill rotWithShape="1">
+          <a:gsLst>
+            <a:gs pos="0">
+              <a:schemeClr val="phClr">
+                <a:tint val="40000"/>
+                <a:satMod val="350000"/>
+              </a:schemeClr>
+            </a:gs>
+            <a:gs pos="40000">
+              <a:schemeClr val="phClr">
+                <a:tint val="45000"/>
+                <a:shade val="99000"/>
+                <a:satMod val="350000"/>
+              </a:schemeClr>
+            </a:gs>
+            <a:gs pos="100000">
+              <a:schemeClr val="phClr">
+                <a:shade val="20000"/>
+                <a:satMod val="255000"/>
+              </a:schemeClr>
+            </a:gs>
+          </a:gsLst>
+          <a:path path="circle">
+            <a:fillToRect l="50000" t="-80000" r="50000" b="180000"/>
+          </a:path>
+        </a:gradFill>
+        <a:gradFill rotWithShape="1">
+          <a:gsLst>
+            <a:gs pos="0">
+              <a:schemeClr val="phClr">
+                <a:tint val="80000"/>
+                <a:satMod val="300000"/>
+              </a:schemeClr>
+            </a:gs>
+            <a:gs pos="100000">
+              <a:schemeClr val="phClr">
+                <a:shade val="30000"/>
+                <a:satMod val="200000"/>
+              </a:schemeClr>
+            </a:gs>
+          </a:gsLst>
+          <a:path path="circle">
+            <a:fillToRect l="50000" t="50000" r="50000" b="50000"/>
+          </a:path>
+        </a:gradFill>
+      </a:bgFillStyleLst>
+    </a:fmtScheme>
+  </a:themeElements>
+</a:theme>
+</file>
+
+<file path=ppt/theme/theme2.xml><?xml version="1.0" encoding="utf-8"?>
 <a:theme xmlns:a="http://schemas.openxmlformats.org/drawingml/2006/main" xmlns:r="http://schemas.openxmlformats.org/officeDocument/2006/relationships" name="Simple Dark">
   <a:themeElements>
     <a:clrScheme name="Simple Dark">
@@ -13686,283 +14675,4 @@
     </a:fmtScheme>
   </a:themeElements>
 </a:theme>
-</file>
-
-<file path=ppt/theme/theme2.xml><?xml version="1.0" encoding="utf-8"?>
-<a:theme xmlns:a="http://schemas.openxmlformats.org/drawingml/2006/main" xmlns:r="http://schemas.openxmlformats.org/officeDocument/2006/relationships">
-  <a:themeElements>
-    <a:clrScheme name="Default">
-      <a:dk1>
-        <a:srgbClr val="000000"/>
-      </a:dk1>
-      <a:lt1>
-        <a:srgbClr val="FFFFFF"/>
-      </a:lt1>
-      <a:dk2>
-        <a:srgbClr val="158158"/>
-      </a:dk2>
-      <a:lt2>
-        <a:srgbClr val="F3F3F3"/>
-      </a:lt2>
-      <a:accent1>
-        <a:srgbClr val="058DC7"/>
-      </a:accent1>
-      <a:accent2>
-        <a:srgbClr val="50B432"/>
-      </a:accent2>
-      <a:accent3>
-        <a:srgbClr val="ED561B"/>
-      </a:accent3>
-      <a:accent4>
-        <a:srgbClr val="EDEF00"/>
-      </a:accent4>
-      <a:accent5>
-        <a:srgbClr val="24CBE5"/>
-      </a:accent5>
-      <a:accent6>
-        <a:srgbClr val="64E572"/>
-      </a:accent6>
-      <a:hlink>
-        <a:srgbClr val="2200CC"/>
-      </a:hlink>
-      <a:folHlink>
-        <a:srgbClr val="551A8B"/>
-      </a:folHlink>
-    </a:clrScheme>
-    <a:fontScheme name="Office">
-      <a:majorFont>
-        <a:latin typeface="Arial"/>
-        <a:ea typeface=""/>
-        <a:cs typeface=""/>
-        <a:font script="Jpan" typeface="ＭＳ Ｐゴシック"/>
-        <a:font script="Hang" typeface="맑은 고딕"/>
-        <a:font script="Hans" typeface="宋体"/>
-        <a:font script="Hant" typeface="新細明體"/>
-        <a:font script="Arab" typeface="Times New Roman"/>
-        <a:font script="Hebr" typeface="Times New Roman"/>
-        <a:font script="Thai" typeface="Angsana New"/>
-        <a:font script="Ethi" typeface="Nyala"/>
-        <a:font script="Beng" typeface="Vrinda"/>
-        <a:font script="Gujr" typeface="Shruti"/>
-        <a:font script="Khmr" typeface="MoolBoran"/>
-        <a:font script="Knda" typeface="Tunga"/>
-        <a:font script="Guru" typeface="Raavi"/>
-        <a:font script="Cans" typeface="Euphemia"/>
-        <a:font script="Cher" typeface="Plantagenet Cherokee"/>
-        <a:font script="Yiii" typeface="Microsoft Yi Baiti"/>
-        <a:font script="Tibt" typeface="Microsoft Himalaya"/>
-        <a:font script="Thaa" typeface="MV Boli"/>
-        <a:font script="Deva" typeface="Mangal"/>
-        <a:font script="Telu" typeface="Gautami"/>
-        <a:font script="Taml" typeface="Latha"/>
-        <a:font script="Syrc" typeface="Estrangelo Edessa"/>
-        <a:font script="Orya" typeface="Kalinga"/>
-        <a:font script="Mlym" typeface="Kartika"/>
-        <a:font script="Laoo" typeface="DokChampa"/>
-        <a:font script="Sinh" typeface="Iskoola Pota"/>
-        <a:font script="Mong" typeface="Mongolian Baiti"/>
-        <a:font script="Viet" typeface="Times New Roman"/>
-        <a:font script="Uigh" typeface="Microsoft Uighur"/>
-        <a:font script="Geor" typeface="Sylfaen"/>
-      </a:majorFont>
-      <a:minorFont>
-        <a:latin typeface="Arial"/>
-        <a:ea typeface=""/>
-        <a:cs typeface=""/>
-        <a:font script="Jpan" typeface="ＭＳ Ｐゴシック"/>
-        <a:font script="Hang" typeface="맑은 고딕"/>
-        <a:font script="Hans" typeface="宋体"/>
-        <a:font script="Hant" typeface="新細明體"/>
-        <a:font script="Arab" typeface="Arial"/>
-        <a:font script="Hebr" typeface="Arial"/>
-        <a:font script="Thai" typeface="Cordia New"/>
-        <a:font script="Ethi" typeface="Nyala"/>
-        <a:font script="Beng" typeface="Vrinda"/>
-        <a:font script="Gujr" typeface="Shruti"/>
-        <a:font script="Khmr" typeface="DaunPenh"/>
-        <a:font script="Knda" typeface="Tunga"/>
-        <a:font script="Guru" typeface="Raavi"/>
-        <a:font script="Cans" typeface="Euphemia"/>
-        <a:font script="Cher" typeface="Plantagenet Cherokee"/>
-        <a:font script="Yiii" typeface="Microsoft Yi Baiti"/>
-        <a:font script="Tibt" typeface="Microsoft Himalaya"/>
-        <a:font script="Thaa" typeface="MV Boli"/>
-        <a:font script="Deva" typeface="Mangal"/>
-        <a:font script="Telu" typeface="Gautami"/>
-        <a:font script="Taml" typeface="Latha"/>
-        <a:font script="Syrc" typeface="Estrangelo Edessa"/>
-        <a:font script="Orya" typeface="Kalinga"/>
-        <a:font script="Mlym" typeface="Kartika"/>
-        <a:font script="Laoo" typeface="DokChampa"/>
-        <a:font script="Sinh" typeface="Iskoola Pota"/>
-        <a:font script="Mong" typeface="Mongolian Baiti"/>
-        <a:font script="Viet" typeface="Arial"/>
-        <a:font script="Uigh" typeface="Microsoft Uighur"/>
-        <a:font script="Geor" typeface="Sylfaen"/>
-      </a:minorFont>
-    </a:fontScheme>
-    <a:fmtScheme name="Office">
-      <a:fillStyleLst>
-        <a:solidFill>
-          <a:schemeClr val="phClr"/>
-        </a:solidFill>
-        <a:gradFill rotWithShape="1">
-          <a:gsLst>
-            <a:gs pos="0">
-              <a:schemeClr val="phClr">
-                <a:tint val="50000"/>
-                <a:satMod val="300000"/>
-              </a:schemeClr>
-            </a:gs>
-            <a:gs pos="35000">
-              <a:schemeClr val="phClr">
-                <a:tint val="37000"/>
-                <a:satMod val="300000"/>
-              </a:schemeClr>
-            </a:gs>
-            <a:gs pos="100000">
-              <a:schemeClr val="phClr">
-                <a:tint val="15000"/>
-                <a:satMod val="350000"/>
-              </a:schemeClr>
-            </a:gs>
-          </a:gsLst>
-          <a:lin ang="16200000" scaled="1"/>
-        </a:gradFill>
-        <a:gradFill rotWithShape="1">
-          <a:gsLst>
-            <a:gs pos="0">
-              <a:schemeClr val="phClr">
-                <a:tint val="100000"/>
-                <a:shade val="100000"/>
-                <a:satMod val="130000"/>
-              </a:schemeClr>
-            </a:gs>
-            <a:gs pos="100000">
-              <a:schemeClr val="phClr">
-                <a:tint val="50000"/>
-                <a:shade val="100000"/>
-                <a:satMod val="350000"/>
-              </a:schemeClr>
-            </a:gs>
-          </a:gsLst>
-          <a:lin ang="16200000" scaled="0"/>
-        </a:gradFill>
-      </a:fillStyleLst>
-      <a:lnStyleLst>
-        <a:ln w="9525" cap="flat" cmpd="sng" algn="ctr">
-          <a:solidFill>
-            <a:schemeClr val="phClr">
-              <a:shade val="95000"/>
-              <a:satMod val="105000"/>
-            </a:schemeClr>
-          </a:solidFill>
-          <a:prstDash val="solid"/>
-        </a:ln>
-        <a:ln w="25400" cap="flat" cmpd="sng" algn="ctr">
-          <a:solidFill>
-            <a:schemeClr val="phClr"/>
-          </a:solidFill>
-          <a:prstDash val="solid"/>
-        </a:ln>
-        <a:ln w="38100" cap="flat" cmpd="sng" algn="ctr">
-          <a:solidFill>
-            <a:schemeClr val="phClr"/>
-          </a:solidFill>
-          <a:prstDash val="solid"/>
-        </a:ln>
-      </a:lnStyleLst>
-      <a:effectStyleLst>
-        <a:effectStyle>
-          <a:effectLst>
-            <a:outerShdw blurRad="40000" dist="20000" dir="5400000" rotWithShape="0">
-              <a:srgbClr val="000000">
-                <a:alpha val="38000"/>
-              </a:srgbClr>
-            </a:outerShdw>
-          </a:effectLst>
-        </a:effectStyle>
-        <a:effectStyle>
-          <a:effectLst>
-            <a:outerShdw blurRad="40000" dist="23000" dir="5400000" rotWithShape="0">
-              <a:srgbClr val="000000">
-                <a:alpha val="35000"/>
-              </a:srgbClr>
-            </a:outerShdw>
-          </a:effectLst>
-        </a:effectStyle>
-        <a:effectStyle>
-          <a:effectLst>
-            <a:outerShdw blurRad="40000" dist="23000" dir="5400000" rotWithShape="0">
-              <a:srgbClr val="000000">
-                <a:alpha val="35000"/>
-              </a:srgbClr>
-            </a:outerShdw>
-          </a:effectLst>
-          <a:scene3d>
-            <a:camera prst="orthographicFront">
-              <a:rot lat="0" lon="0" rev="0"/>
-            </a:camera>
-            <a:lightRig rig="threePt" dir="t">
-              <a:rot lat="0" lon="0" rev="1200000"/>
-            </a:lightRig>
-          </a:scene3d>
-          <a:sp3d>
-            <a:bevelT w="63500" h="25400"/>
-          </a:sp3d>
-        </a:effectStyle>
-      </a:effectStyleLst>
-      <a:bgFillStyleLst>
-        <a:solidFill>
-          <a:schemeClr val="phClr"/>
-        </a:solidFill>
-        <a:gradFill rotWithShape="1">
-          <a:gsLst>
-            <a:gs pos="0">
-              <a:schemeClr val="phClr">
-                <a:tint val="40000"/>
-                <a:satMod val="350000"/>
-              </a:schemeClr>
-            </a:gs>
-            <a:gs pos="40000">
-              <a:schemeClr val="phClr">
-                <a:tint val="45000"/>
-                <a:shade val="99000"/>
-                <a:satMod val="350000"/>
-              </a:schemeClr>
-            </a:gs>
-            <a:gs pos="100000">
-              <a:schemeClr val="phClr">
-                <a:shade val="20000"/>
-                <a:satMod val="255000"/>
-              </a:schemeClr>
-            </a:gs>
-          </a:gsLst>
-          <a:path path="circle">
-            <a:fillToRect l="50000" t="-80000" r="50000" b="180000"/>
-          </a:path>
-        </a:gradFill>
-        <a:gradFill rotWithShape="1">
-          <a:gsLst>
-            <a:gs pos="0">
-              <a:schemeClr val="phClr">
-                <a:tint val="80000"/>
-                <a:satMod val="300000"/>
-              </a:schemeClr>
-            </a:gs>
-            <a:gs pos="100000">
-              <a:schemeClr val="phClr">
-                <a:shade val="30000"/>
-                <a:satMod val="200000"/>
-              </a:schemeClr>
-            </a:gs>
-          </a:gsLst>
-          <a:path path="circle">
-            <a:fillToRect l="50000" t="50000" r="50000" b="50000"/>
-          </a:path>
-        </a:gradFill>
-      </a:bgFillStyleLst>
-    </a:fmtScheme>
-  </a:themeElements>
-</a:theme>
 </file>
</xml_diff>

<commit_message>
Hint: 刪除測試用的程式碼、匯集各WebAPI的Context、優化連接用的類別 ProductSystemAPI 連接用的類別的程式碼優化 APItoLINK - AttachAPI ProductSystemAPI 連接用的類別新增屬性 APItoLINK - _settingFile ProductSystemAPI 連接用的類別新增方法 APItoLINK  - (GetConnectString, GetContext) ShopApplication 移除測試用的方法 DataBaseCall - TestCall ShopApplication 新增連接Context的方法 DataBaseCall - (FromRegistrantContext, FromProductContext) C#_ASP.NET_常見錯誤.pptx 新增內容 移除Concept.png
</commit_message>
<xml_diff>
--- a/C#_ASP.NET_常見錯誤.pptx
+++ b/C#_ASP.NET_常見錯誤.pptx
@@ -28,6 +28,8 @@
     <p:sldId id="273" r:id="rId23"/>
     <p:sldId id="274" r:id="rId24"/>
     <p:sldId id="275" r:id="rId25"/>
+    <p:sldId id="276" r:id="rId26"/>
+    <p:sldId id="277" r:id="rId27"/>
   </p:sldIdLst>
   <p:sldSz cy="5143500" cx="9144000"/>
   <p:notesSz cx="6858000" cy="9144000"/>
@@ -1948,6 +1950,204 @@
       <p:sp>
         <p:nvSpPr>
           <p:cNvPr id="207" name="Google Shape;207;g278446d6ab1_0_6:notes"/>
+          <p:cNvSpPr txBox="1"/>
+          <p:nvPr>
+            <p:ph idx="1" type="body"/>
+          </p:nvPr>
+        </p:nvSpPr>
+        <p:spPr>
+          <a:xfrm>
+            <a:off x="685800" y="4343400"/>
+            <a:ext cx="5486400" cy="4114800"/>
+          </a:xfrm>
+          <a:prstGeom prst="rect">
+            <a:avLst/>
+          </a:prstGeom>
+        </p:spPr>
+        <p:txBody>
+          <a:bodyPr anchorCtr="0" anchor="t" bIns="91425" lIns="91425" spcFirstLastPara="1" rIns="91425" wrap="square" tIns="91425">
+            <a:noAutofit/>
+          </a:bodyPr>
+          <a:lstStyle/>
+          <a:p>
+            <a:pPr indent="0" lvl="0" marL="0" rtl="0" algn="l">
+              <a:spcBef>
+                <a:spcPts val="0"/>
+              </a:spcBef>
+              <a:spcAft>
+                <a:spcPts val="0"/>
+              </a:spcAft>
+              <a:buNone/>
+            </a:pPr>
+            <a:r>
+              <a:t/>
+            </a:r>
+            <a:endParaRPr/>
+          </a:p>
+        </p:txBody>
+      </p:sp>
+    </p:spTree>
+  </p:cSld>
+  <p:clrMapOvr>
+    <a:masterClrMapping/>
+  </p:clrMapOvr>
+</p:notes>
+</file>
+
+<file path=ppt/notesSlides/notesSlide21.xml><?xml version="1.0" encoding="utf-8"?>
+<p:notes xmlns:a="http://schemas.openxmlformats.org/drawingml/2006/main" xmlns:r="http://schemas.openxmlformats.org/officeDocument/2006/relationships" xmlns:mc="http://schemas.openxmlformats.org/markup-compatibility/2006" xmlns:mv="urn:schemas-microsoft-com:mac:vml" xmlns:p="http://schemas.openxmlformats.org/presentationml/2006/main" xmlns:c="http://schemas.openxmlformats.org/drawingml/2006/chart" xmlns:dgm="http://schemas.openxmlformats.org/drawingml/2006/diagram" xmlns:o="urn:schemas-microsoft-com:office:office" xmlns:v="urn:schemas-microsoft-com:vml" xmlns:pvml="urn:schemas-microsoft-com:office:powerpoint" xmlns:com="http://schemas.openxmlformats.org/drawingml/2006/compatibility" xmlns:p14="http://schemas.microsoft.com/office/powerpoint/2010/main" xmlns:p15="http://schemas.microsoft.com/office/powerpoint/2012/main" xmlns:ahyp="http://schemas.microsoft.com/office/drawing/2018/hyperlinkcolor" showMasterPhAnim="0" showMasterSp="0">
+  <p:cSld>
+    <p:spTree>
+      <p:nvGrpSpPr>
+        <p:cNvPr id="213" name="Shape 213"/>
+        <p:cNvGrpSpPr/>
+        <p:nvPr/>
+      </p:nvGrpSpPr>
+      <p:grpSpPr>
+        <a:xfrm>
+          <a:off x="0" y="0"/>
+          <a:ext cx="0" cy="0"/>
+          <a:chOff x="0" y="0"/>
+          <a:chExt cx="0" cy="0"/>
+        </a:xfrm>
+      </p:grpSpPr>
+      <p:sp>
+        <p:nvSpPr>
+          <p:cNvPr id="214" name="Google Shape;214;g2788b3e19ef_0_1:notes"/>
+          <p:cNvSpPr/>
+          <p:nvPr>
+            <p:ph idx="2" type="sldImg"/>
+          </p:nvPr>
+        </p:nvSpPr>
+        <p:spPr>
+          <a:xfrm>
+            <a:off x="381300" y="685800"/>
+            <a:ext cx="6096000" cy="3429000"/>
+          </a:xfrm>
+          <a:custGeom>
+            <a:rect b="b" l="l" r="r" t="t"/>
+            <a:pathLst>
+              <a:path extrusionOk="0" h="120000" w="120000">
+                <a:moveTo>
+                  <a:pt x="0" y="0"/>
+                </a:moveTo>
+                <a:lnTo>
+                  <a:pt x="120000" y="0"/>
+                </a:lnTo>
+                <a:lnTo>
+                  <a:pt x="120000" y="120000"/>
+                </a:lnTo>
+                <a:lnTo>
+                  <a:pt x="0" y="120000"/>
+                </a:lnTo>
+                <a:close/>
+              </a:path>
+            </a:pathLst>
+          </a:custGeom>
+        </p:spPr>
+      </p:sp>
+      <p:sp>
+        <p:nvSpPr>
+          <p:cNvPr id="215" name="Google Shape;215;g2788b3e19ef_0_1:notes"/>
+          <p:cNvSpPr txBox="1"/>
+          <p:nvPr>
+            <p:ph idx="1" type="body"/>
+          </p:nvPr>
+        </p:nvSpPr>
+        <p:spPr>
+          <a:xfrm>
+            <a:off x="685800" y="4343400"/>
+            <a:ext cx="5486400" cy="4114800"/>
+          </a:xfrm>
+          <a:prstGeom prst="rect">
+            <a:avLst/>
+          </a:prstGeom>
+        </p:spPr>
+        <p:txBody>
+          <a:bodyPr anchorCtr="0" anchor="t" bIns="91425" lIns="91425" spcFirstLastPara="1" rIns="91425" wrap="square" tIns="91425">
+            <a:noAutofit/>
+          </a:bodyPr>
+          <a:lstStyle/>
+          <a:p>
+            <a:pPr indent="0" lvl="0" marL="0" rtl="0" algn="l">
+              <a:spcBef>
+                <a:spcPts val="0"/>
+              </a:spcBef>
+              <a:spcAft>
+                <a:spcPts val="0"/>
+              </a:spcAft>
+              <a:buNone/>
+            </a:pPr>
+            <a:r>
+              <a:t/>
+            </a:r>
+            <a:endParaRPr/>
+          </a:p>
+        </p:txBody>
+      </p:sp>
+    </p:spTree>
+  </p:cSld>
+  <p:clrMapOvr>
+    <a:masterClrMapping/>
+  </p:clrMapOvr>
+</p:notes>
+</file>
+
+<file path=ppt/notesSlides/notesSlide22.xml><?xml version="1.0" encoding="utf-8"?>
+<p:notes xmlns:a="http://schemas.openxmlformats.org/drawingml/2006/main" xmlns:r="http://schemas.openxmlformats.org/officeDocument/2006/relationships" xmlns:mc="http://schemas.openxmlformats.org/markup-compatibility/2006" xmlns:mv="urn:schemas-microsoft-com:mac:vml" xmlns:p="http://schemas.openxmlformats.org/presentationml/2006/main" xmlns:c="http://schemas.openxmlformats.org/drawingml/2006/chart" xmlns:dgm="http://schemas.openxmlformats.org/drawingml/2006/diagram" xmlns:o="urn:schemas-microsoft-com:office:office" xmlns:v="urn:schemas-microsoft-com:vml" xmlns:pvml="urn:schemas-microsoft-com:office:powerpoint" xmlns:com="http://schemas.openxmlformats.org/drawingml/2006/compatibility" xmlns:p14="http://schemas.microsoft.com/office/powerpoint/2010/main" xmlns:p15="http://schemas.microsoft.com/office/powerpoint/2012/main" xmlns:ahyp="http://schemas.microsoft.com/office/drawing/2018/hyperlinkcolor" showMasterPhAnim="0" showMasterSp="0">
+  <p:cSld>
+    <p:spTree>
+      <p:nvGrpSpPr>
+        <p:cNvPr id="220" name="Shape 220"/>
+        <p:cNvGrpSpPr/>
+        <p:nvPr/>
+      </p:nvGrpSpPr>
+      <p:grpSpPr>
+        <a:xfrm>
+          <a:off x="0" y="0"/>
+          <a:ext cx="0" cy="0"/>
+          <a:chOff x="0" y="0"/>
+          <a:chExt cx="0" cy="0"/>
+        </a:xfrm>
+      </p:grpSpPr>
+      <p:sp>
+        <p:nvSpPr>
+          <p:cNvPr id="221" name="Google Shape;221;g2788b3e19ef_0_7:notes"/>
+          <p:cNvSpPr/>
+          <p:nvPr>
+            <p:ph idx="2" type="sldImg"/>
+          </p:nvPr>
+        </p:nvSpPr>
+        <p:spPr>
+          <a:xfrm>
+            <a:off x="381300" y="685800"/>
+            <a:ext cx="6096000" cy="3429000"/>
+          </a:xfrm>
+          <a:custGeom>
+            <a:rect b="b" l="l" r="r" t="t"/>
+            <a:pathLst>
+              <a:path extrusionOk="0" h="120000" w="120000">
+                <a:moveTo>
+                  <a:pt x="0" y="0"/>
+                </a:moveTo>
+                <a:lnTo>
+                  <a:pt x="120000" y="0"/>
+                </a:lnTo>
+                <a:lnTo>
+                  <a:pt x="120000" y="120000"/>
+                </a:lnTo>
+                <a:lnTo>
+                  <a:pt x="0" y="120000"/>
+                </a:lnTo>
+                <a:close/>
+              </a:path>
+            </a:pathLst>
+          </a:custGeom>
+        </p:spPr>
+      </p:sp>
+      <p:sp>
+        <p:nvSpPr>
+          <p:cNvPr id="222" name="Google Shape;222;g2788b3e19ef_0_7:notes"/>
           <p:cNvSpPr txBox="1"/>
           <p:nvPr>
             <p:ph idx="1" type="body"/>
@@ -7591,7 +7791,7 @@
                 <a:cs typeface="Times New Roman"/>
                 <a:sym typeface="Times New Roman"/>
               </a:rPr>
-              <a:t>2024/07/17</a:t>
+              <a:t>2024/07/22</a:t>
             </a:r>
             <a:endParaRPr>
               <a:latin typeface="Times New Roman"/>
@@ -11931,6 +12131,856 @@
               <a:t/>
             </a:r>
             <a:endParaRPr/>
+          </a:p>
+        </p:txBody>
+      </p:sp>
+      <p:sp>
+        <p:nvSpPr>
+          <p:cNvPr id="212" name="Google Shape;212;p32"/>
+          <p:cNvSpPr txBox="1"/>
+          <p:nvPr/>
+        </p:nvSpPr>
+        <p:spPr>
+          <a:xfrm>
+            <a:off x="4534225" y="2046700"/>
+            <a:ext cx="1558500" cy="461700"/>
+          </a:xfrm>
+          <a:prstGeom prst="rect">
+            <a:avLst/>
+          </a:prstGeom>
+          <a:noFill/>
+          <a:ln>
+            <a:noFill/>
+          </a:ln>
+        </p:spPr>
+        <p:txBody>
+          <a:bodyPr anchorCtr="0" anchor="t" bIns="91425" lIns="91425" spcFirstLastPara="1" rIns="91425" wrap="square" tIns="91425">
+            <a:spAutoFit/>
+          </a:bodyPr>
+          <a:lstStyle/>
+          <a:p>
+            <a:pPr indent="0" lvl="0" marL="0" rtl="0" algn="l">
+              <a:spcBef>
+                <a:spcPts val="0"/>
+              </a:spcBef>
+              <a:spcAft>
+                <a:spcPts val="0"/>
+              </a:spcAft>
+              <a:buNone/>
+            </a:pPr>
+            <a:r>
+              <a:rPr lang="zh-TW" sz="1800">
+                <a:solidFill>
+                  <a:schemeClr val="lt2"/>
+                </a:solidFill>
+              </a:rPr>
+              <a:t>移除路由屬性</a:t>
+            </a:r>
+            <a:endParaRPr sz="1800">
+              <a:solidFill>
+                <a:schemeClr val="lt2"/>
+              </a:solidFill>
+            </a:endParaRPr>
+          </a:p>
+        </p:txBody>
+      </p:sp>
+    </p:spTree>
+  </p:cSld>
+  <p:clrMapOvr>
+    <a:masterClrMapping/>
+  </p:clrMapOvr>
+</p:sld>
+</file>
+
+<file path=ppt/slides/slide21.xml><?xml version="1.0" encoding="utf-8"?>
+<p:sld xmlns:a="http://schemas.openxmlformats.org/drawingml/2006/main" xmlns:r="http://schemas.openxmlformats.org/officeDocument/2006/relationships" xmlns:mc="http://schemas.openxmlformats.org/markup-compatibility/2006" xmlns:mv="urn:schemas-microsoft-com:mac:vml" xmlns:p="http://schemas.openxmlformats.org/presentationml/2006/main" xmlns:c="http://schemas.openxmlformats.org/drawingml/2006/chart" xmlns:dgm="http://schemas.openxmlformats.org/drawingml/2006/diagram" xmlns:o="urn:schemas-microsoft-com:office:office" xmlns:v="urn:schemas-microsoft-com:vml" xmlns:pvml="urn:schemas-microsoft-com:office:powerpoint" xmlns:com="http://schemas.openxmlformats.org/drawingml/2006/compatibility" xmlns:p14="http://schemas.microsoft.com/office/powerpoint/2010/main" xmlns:p15="http://schemas.microsoft.com/office/powerpoint/2012/main" xmlns:ahyp="http://schemas.microsoft.com/office/drawing/2018/hyperlinkcolor">
+  <p:cSld>
+    <p:spTree>
+      <p:nvGrpSpPr>
+        <p:cNvPr id="216" name="Shape 216"/>
+        <p:cNvGrpSpPr/>
+        <p:nvPr/>
+      </p:nvGrpSpPr>
+      <p:grpSpPr>
+        <a:xfrm>
+          <a:off x="0" y="0"/>
+          <a:ext cx="0" cy="0"/>
+          <a:chOff x="0" y="0"/>
+          <a:chExt cx="0" cy="0"/>
+        </a:xfrm>
+      </p:grpSpPr>
+      <p:sp>
+        <p:nvSpPr>
+          <p:cNvPr id="217" name="Google Shape;217;p33"/>
+          <p:cNvSpPr txBox="1"/>
+          <p:nvPr>
+            <p:ph type="title"/>
+          </p:nvPr>
+        </p:nvSpPr>
+        <p:spPr>
+          <a:xfrm>
+            <a:off x="311700" y="445025"/>
+            <a:ext cx="8520600" cy="572700"/>
+          </a:xfrm>
+          <a:prstGeom prst="rect">
+            <a:avLst/>
+          </a:prstGeom>
+        </p:spPr>
+        <p:txBody>
+          <a:bodyPr anchorCtr="0" anchor="t" bIns="91425" lIns="91425" spcFirstLastPara="1" rIns="91425" wrap="square" tIns="91425">
+            <a:normAutofit fontScale="90000"/>
+          </a:bodyPr>
+          <a:lstStyle/>
+          <a:p>
+            <a:pPr indent="0" lvl="0" marL="0" rtl="0" algn="l">
+              <a:spcBef>
+                <a:spcPts val="0"/>
+              </a:spcBef>
+              <a:spcAft>
+                <a:spcPts val="0"/>
+              </a:spcAft>
+              <a:buNone/>
+            </a:pPr>
+            <a:r>
+              <a:rPr lang="zh-TW">
+                <a:latin typeface="DFKai-SB"/>
+                <a:ea typeface="DFKai-SB"/>
+                <a:cs typeface="DFKai-SB"/>
+                <a:sym typeface="DFKai-SB"/>
+              </a:rPr>
+              <a:t>錯誤</a:t>
+            </a:r>
+            <a:r>
+              <a:rPr lang="zh-TW"/>
+              <a:t> </a:t>
+            </a:r>
+            <a:r>
+              <a:rPr lang="zh-TW">
+                <a:latin typeface="Times New Roman"/>
+                <a:ea typeface="Times New Roman"/>
+                <a:cs typeface="Times New Roman"/>
+                <a:sym typeface="Times New Roman"/>
+              </a:rPr>
+              <a:t>10</a:t>
+            </a:r>
+            <a:endParaRPr>
+              <a:latin typeface="Times New Roman"/>
+              <a:ea typeface="Times New Roman"/>
+              <a:cs typeface="Times New Roman"/>
+              <a:sym typeface="Times New Roman"/>
+            </a:endParaRPr>
+          </a:p>
+        </p:txBody>
+      </p:sp>
+      <p:sp>
+        <p:nvSpPr>
+          <p:cNvPr id="218" name="Google Shape;218;p33"/>
+          <p:cNvSpPr txBox="1"/>
+          <p:nvPr>
+            <p:ph idx="1" type="body"/>
+          </p:nvPr>
+        </p:nvSpPr>
+        <p:spPr>
+          <a:xfrm>
+            <a:off x="311700" y="1152475"/>
+            <a:ext cx="8520600" cy="3990900"/>
+          </a:xfrm>
+          <a:prstGeom prst="rect">
+            <a:avLst/>
+          </a:prstGeom>
+        </p:spPr>
+        <p:txBody>
+          <a:bodyPr anchorCtr="0" anchor="t" bIns="91425" lIns="91425" spcFirstLastPara="1" rIns="91425" wrap="square" tIns="91425">
+            <a:normAutofit/>
+          </a:bodyPr>
+          <a:lstStyle/>
+          <a:p>
+            <a:pPr indent="-342900" lvl="0" marL="457200" rtl="0" algn="l">
+              <a:spcBef>
+                <a:spcPts val="0"/>
+              </a:spcBef>
+              <a:spcAft>
+                <a:spcPts val="0"/>
+              </a:spcAft>
+              <a:buSzPts val="1800"/>
+              <a:buFont typeface="DFKai-SB"/>
+              <a:buChar char="●"/>
+            </a:pPr>
+            <a:r>
+              <a:rPr lang="zh-TW">
+                <a:latin typeface="DFKai-SB"/>
+                <a:ea typeface="DFKai-SB"/>
+                <a:cs typeface="DFKai-SB"/>
+                <a:sym typeface="DFKai-SB"/>
+              </a:rPr>
+              <a:t>錯誤資訊：</a:t>
+            </a:r>
+            <a:endParaRPr>
+              <a:latin typeface="DFKai-SB"/>
+              <a:ea typeface="DFKai-SB"/>
+              <a:cs typeface="DFKai-SB"/>
+              <a:sym typeface="DFKai-SB"/>
+            </a:endParaRPr>
+          </a:p>
+          <a:p>
+            <a:pPr indent="0" lvl="0" marL="457200" rtl="0" algn="l">
+              <a:spcBef>
+                <a:spcPts val="1200"/>
+              </a:spcBef>
+              <a:spcAft>
+                <a:spcPts val="0"/>
+              </a:spcAft>
+              <a:buNone/>
+            </a:pPr>
+            <a:r>
+              <a:t/>
+            </a:r>
+            <a:endParaRPr sz="1300">
+              <a:latin typeface="DFKai-SB"/>
+              <a:ea typeface="DFKai-SB"/>
+              <a:cs typeface="DFKai-SB"/>
+              <a:sym typeface="DFKai-SB"/>
+            </a:endParaRPr>
+          </a:p>
+          <a:p>
+            <a:pPr indent="-342900" lvl="0" marL="457200" rtl="0" algn="l">
+              <a:spcBef>
+                <a:spcPts val="1200"/>
+              </a:spcBef>
+              <a:spcAft>
+                <a:spcPts val="0"/>
+              </a:spcAft>
+              <a:buSzPts val="1800"/>
+              <a:buFont typeface="DFKai-SB"/>
+              <a:buChar char="●"/>
+            </a:pPr>
+            <a:r>
+              <a:rPr lang="zh-TW">
+                <a:latin typeface="DFKai-SB"/>
+                <a:ea typeface="DFKai-SB"/>
+                <a:cs typeface="DFKai-SB"/>
+                <a:sym typeface="DFKai-SB"/>
+              </a:rPr>
+              <a:t>原因：</a:t>
+            </a:r>
+            <a:endParaRPr>
+              <a:latin typeface="DFKai-SB"/>
+              <a:ea typeface="DFKai-SB"/>
+              <a:cs typeface="DFKai-SB"/>
+              <a:sym typeface="DFKai-SB"/>
+            </a:endParaRPr>
+          </a:p>
+          <a:p>
+            <a:pPr indent="0" lvl="0" marL="457200" rtl="0" algn="l">
+              <a:lnSpc>
+                <a:spcPct val="100000"/>
+              </a:lnSpc>
+              <a:spcBef>
+                <a:spcPts val="1200"/>
+              </a:spcBef>
+              <a:spcAft>
+                <a:spcPts val="0"/>
+              </a:spcAft>
+              <a:buNone/>
+            </a:pPr>
+            <a:r>
+              <a:rPr lang="zh-TW" sz="1300">
+                <a:latin typeface="DFKai-SB"/>
+                <a:ea typeface="DFKai-SB"/>
+                <a:cs typeface="DFKai-SB"/>
+                <a:sym typeface="DFKai-SB"/>
+              </a:rPr>
+              <a:t>由於RegistrantController的建構式中，需要傳入RegistrantContext物件，但是沒有傳入導致錯誤</a:t>
+            </a:r>
+            <a:r>
+              <a:rPr lang="zh-TW" sz="1300">
+                <a:latin typeface="DFKai-SB"/>
+                <a:ea typeface="DFKai-SB"/>
+                <a:cs typeface="DFKai-SB"/>
+                <a:sym typeface="DFKai-SB"/>
+              </a:rPr>
+              <a:t>。</a:t>
+            </a:r>
+            <a:endParaRPr sz="1200">
+              <a:latin typeface="DFKai-SB"/>
+              <a:ea typeface="DFKai-SB"/>
+              <a:cs typeface="DFKai-SB"/>
+              <a:sym typeface="DFKai-SB"/>
+            </a:endParaRPr>
+          </a:p>
+          <a:p>
+            <a:pPr indent="-342900" lvl="0" marL="457200" rtl="0" algn="l">
+              <a:spcBef>
+                <a:spcPts val="1200"/>
+              </a:spcBef>
+              <a:spcAft>
+                <a:spcPts val="0"/>
+              </a:spcAft>
+              <a:buSzPts val="1800"/>
+              <a:buFont typeface="DFKai-SB"/>
+              <a:buChar char="●"/>
+            </a:pPr>
+            <a:r>
+              <a:rPr lang="zh-TW">
+                <a:latin typeface="DFKai-SB"/>
+                <a:ea typeface="DFKai-SB"/>
+                <a:cs typeface="DFKai-SB"/>
+                <a:sym typeface="DFKai-SB"/>
+              </a:rPr>
+              <a:t>解決方法：</a:t>
+            </a:r>
+            <a:endParaRPr>
+              <a:latin typeface="DFKai-SB"/>
+              <a:ea typeface="DFKai-SB"/>
+              <a:cs typeface="DFKai-SB"/>
+              <a:sym typeface="DFKai-SB"/>
+            </a:endParaRPr>
+          </a:p>
+          <a:p>
+            <a:pPr indent="0" lvl="0" marL="0" rtl="0" algn="l">
+              <a:spcBef>
+                <a:spcPts val="1200"/>
+              </a:spcBef>
+              <a:spcAft>
+                <a:spcPts val="0"/>
+              </a:spcAft>
+              <a:buNone/>
+            </a:pPr>
+            <a:r>
+              <a:rPr lang="zh-TW" sz="1300">
+                <a:latin typeface="DFKai-SB"/>
+                <a:ea typeface="DFKai-SB"/>
+                <a:cs typeface="DFKai-SB"/>
+                <a:sym typeface="DFKai-SB"/>
+              </a:rPr>
+              <a:t>	</a:t>
+            </a:r>
+            <a:r>
+              <a:rPr lang="zh-TW" sz="1300">
+                <a:latin typeface="DFKai-SB"/>
+                <a:ea typeface="DFKai-SB"/>
+                <a:cs typeface="DFKai-SB"/>
+                <a:sym typeface="DFKai-SB"/>
+              </a:rPr>
+              <a:t>註冊AddDbContext&lt;RegistrantContext&gt;服務到builder即可</a:t>
+            </a:r>
+            <a:r>
+              <a:rPr lang="zh-TW" sz="1300">
+                <a:latin typeface="DFKai-SB"/>
+                <a:ea typeface="DFKai-SB"/>
+                <a:cs typeface="DFKai-SB"/>
+                <a:sym typeface="DFKai-SB"/>
+              </a:rPr>
+              <a:t>。</a:t>
+            </a:r>
+            <a:endParaRPr sz="1300">
+              <a:latin typeface="DFKai-SB"/>
+              <a:ea typeface="DFKai-SB"/>
+              <a:cs typeface="DFKai-SB"/>
+              <a:sym typeface="DFKai-SB"/>
+            </a:endParaRPr>
+          </a:p>
+          <a:p>
+            <a:pPr indent="-342900" lvl="0" marL="457200" rtl="0" algn="l">
+              <a:spcBef>
+                <a:spcPts val="1200"/>
+              </a:spcBef>
+              <a:spcAft>
+                <a:spcPts val="0"/>
+              </a:spcAft>
+              <a:buSzPts val="1800"/>
+              <a:buFont typeface="DFKai-SB"/>
+              <a:buChar char="●"/>
+            </a:pPr>
+            <a:r>
+              <a:rPr lang="zh-TW">
+                <a:latin typeface="DFKai-SB"/>
+                <a:ea typeface="DFKai-SB"/>
+                <a:cs typeface="DFKai-SB"/>
+                <a:sym typeface="DFKai-SB"/>
+              </a:rPr>
+              <a:t>備註：</a:t>
+            </a:r>
+            <a:endParaRPr sz="1300">
+              <a:latin typeface="DFKai-SB"/>
+              <a:ea typeface="DFKai-SB"/>
+              <a:cs typeface="DFKai-SB"/>
+              <a:sym typeface="DFKai-SB"/>
+            </a:endParaRPr>
+          </a:p>
+          <a:p>
+            <a:pPr indent="0" lvl="0" marL="457200" rtl="0" algn="l">
+              <a:spcBef>
+                <a:spcPts val="1200"/>
+              </a:spcBef>
+              <a:spcAft>
+                <a:spcPts val="1200"/>
+              </a:spcAft>
+              <a:buNone/>
+            </a:pPr>
+            <a:r>
+              <a:rPr lang="zh-TW" sz="1300">
+                <a:latin typeface="DFKai-SB"/>
+                <a:ea typeface="DFKai-SB"/>
+                <a:cs typeface="DFKai-SB"/>
+                <a:sym typeface="DFKai-SB"/>
+              </a:rPr>
+              <a:t>目前的推測，如果有註冊AddDbContext&lt;RegistrantContext&gt;服務到builder的話，ASP.NET似乎會自動將RegistrantContext物件傳入需要此物件的控制器的</a:t>
+            </a:r>
+            <a:r>
+              <a:rPr lang="zh-TW" sz="1300">
+                <a:solidFill>
+                  <a:srgbClr val="FF0000"/>
+                </a:solidFill>
+                <a:latin typeface="DFKai-SB"/>
+                <a:ea typeface="DFKai-SB"/>
+                <a:cs typeface="DFKai-SB"/>
+                <a:sym typeface="DFKai-SB"/>
+              </a:rPr>
+              <a:t>對應的建構式</a:t>
+            </a:r>
+            <a:r>
+              <a:rPr lang="zh-TW" sz="1300">
+                <a:latin typeface="DFKai-SB"/>
+                <a:ea typeface="DFKai-SB"/>
+                <a:cs typeface="DFKai-SB"/>
+                <a:sym typeface="DFKai-SB"/>
+              </a:rPr>
+              <a:t>。</a:t>
+            </a:r>
+            <a:endParaRPr sz="1300">
+              <a:latin typeface="DFKai-SB"/>
+              <a:ea typeface="DFKai-SB"/>
+              <a:cs typeface="DFKai-SB"/>
+              <a:sym typeface="DFKai-SB"/>
+            </a:endParaRPr>
+          </a:p>
+        </p:txBody>
+      </p:sp>
+      <p:pic>
+        <p:nvPicPr>
+          <p:cNvPr id="219" name="Google Shape;219;p33"/>
+          <p:cNvPicPr preferRelativeResize="0"/>
+          <p:nvPr/>
+        </p:nvPicPr>
+        <p:blipFill>
+          <a:blip r:embed="rId3">
+            <a:alphaModFix/>
+          </a:blip>
+          <a:stretch>
+            <a:fillRect/>
+          </a:stretch>
+        </p:blipFill>
+        <p:spPr>
+          <a:xfrm>
+            <a:off x="990700" y="1546525"/>
+            <a:ext cx="7612999" cy="512925"/>
+          </a:xfrm>
+          <a:prstGeom prst="rect">
+            <a:avLst/>
+          </a:prstGeom>
+          <a:noFill/>
+          <a:ln>
+            <a:noFill/>
+          </a:ln>
+        </p:spPr>
+      </p:pic>
+    </p:spTree>
+  </p:cSld>
+  <p:clrMapOvr>
+    <a:masterClrMapping/>
+  </p:clrMapOvr>
+</p:sld>
+</file>
+
+<file path=ppt/slides/slide22.xml><?xml version="1.0" encoding="utf-8"?>
+<p:sld xmlns:a="http://schemas.openxmlformats.org/drawingml/2006/main" xmlns:r="http://schemas.openxmlformats.org/officeDocument/2006/relationships" xmlns:mc="http://schemas.openxmlformats.org/markup-compatibility/2006" xmlns:mv="urn:schemas-microsoft-com:mac:vml" xmlns:p="http://schemas.openxmlformats.org/presentationml/2006/main" xmlns:c="http://schemas.openxmlformats.org/drawingml/2006/chart" xmlns:dgm="http://schemas.openxmlformats.org/drawingml/2006/diagram" xmlns:o="urn:schemas-microsoft-com:office:office" xmlns:v="urn:schemas-microsoft-com:vml" xmlns:pvml="urn:schemas-microsoft-com:office:powerpoint" xmlns:com="http://schemas.openxmlformats.org/drawingml/2006/compatibility" xmlns:p14="http://schemas.microsoft.com/office/powerpoint/2010/main" xmlns:p15="http://schemas.microsoft.com/office/powerpoint/2012/main" xmlns:ahyp="http://schemas.microsoft.com/office/drawing/2018/hyperlinkcolor">
+  <p:cSld>
+    <p:bg>
+      <p:bgPr>
+        <a:solidFill>
+          <a:schemeClr val="dk1"/>
+        </a:solidFill>
+      </p:bgPr>
+    </p:bg>
+    <p:spTree>
+      <p:nvGrpSpPr>
+        <p:cNvPr id="223" name="Shape 223"/>
+        <p:cNvGrpSpPr/>
+        <p:nvPr/>
+      </p:nvGrpSpPr>
+      <p:grpSpPr>
+        <a:xfrm>
+          <a:off x="0" y="0"/>
+          <a:ext cx="0" cy="0"/>
+          <a:chOff x="0" y="0"/>
+          <a:chExt cx="0" cy="0"/>
+        </a:xfrm>
+      </p:grpSpPr>
+      <p:pic>
+        <p:nvPicPr>
+          <p:cNvPr id="224" name="Google Shape;224;p34"/>
+          <p:cNvPicPr preferRelativeResize="0"/>
+          <p:nvPr/>
+        </p:nvPicPr>
+        <p:blipFill>
+          <a:blip r:embed="rId3">
+            <a:alphaModFix/>
+          </a:blip>
+          <a:stretch>
+            <a:fillRect/>
+          </a:stretch>
+        </p:blipFill>
+        <p:spPr>
+          <a:xfrm>
+            <a:off x="0" y="2623751"/>
+            <a:ext cx="4197050" cy="223512"/>
+          </a:xfrm>
+          <a:prstGeom prst="rect">
+            <a:avLst/>
+          </a:prstGeom>
+          <a:noFill/>
+          <a:ln>
+            <a:noFill/>
+          </a:ln>
+        </p:spPr>
+      </p:pic>
+      <p:pic>
+        <p:nvPicPr>
+          <p:cNvPr id="225" name="Google Shape;225;p34"/>
+          <p:cNvPicPr preferRelativeResize="0"/>
+          <p:nvPr/>
+        </p:nvPicPr>
+        <p:blipFill>
+          <a:blip r:embed="rId4">
+            <a:alphaModFix/>
+          </a:blip>
+          <a:stretch>
+            <a:fillRect/>
+          </a:stretch>
+        </p:blipFill>
+        <p:spPr>
+          <a:xfrm>
+            <a:off x="-12" y="0"/>
+            <a:ext cx="4197050" cy="1923875"/>
+          </a:xfrm>
+          <a:prstGeom prst="rect">
+            <a:avLst/>
+          </a:prstGeom>
+          <a:noFill/>
+          <a:ln>
+            <a:noFill/>
+          </a:ln>
+        </p:spPr>
+      </p:pic>
+      <p:sp>
+        <p:nvSpPr>
+          <p:cNvPr id="226" name="Google Shape;226;p34"/>
+          <p:cNvSpPr/>
+          <p:nvPr/>
+        </p:nvSpPr>
+        <p:spPr>
+          <a:xfrm>
+            <a:off x="347450" y="934425"/>
+            <a:ext cx="3864000" cy="1017000"/>
+          </a:xfrm>
+          <a:prstGeom prst="frame">
+            <a:avLst>
+              <a:gd fmla="val 4092" name="adj1"/>
+            </a:avLst>
+          </a:prstGeom>
+          <a:solidFill>
+            <a:schemeClr val="lt2"/>
+          </a:solidFill>
+          <a:ln cap="flat" cmpd="sng" w="9525">
+            <a:solidFill>
+              <a:schemeClr val="dk2"/>
+            </a:solidFill>
+            <a:prstDash val="solid"/>
+            <a:round/>
+            <a:headEnd len="sm" w="sm" type="none"/>
+            <a:tailEnd len="sm" w="sm" type="none"/>
+          </a:ln>
+        </p:spPr>
+        <p:txBody>
+          <a:bodyPr anchorCtr="0" anchor="ctr" bIns="91425" lIns="91425" spcFirstLastPara="1" rIns="91425" wrap="square" tIns="91425">
+            <a:noAutofit/>
+          </a:bodyPr>
+          <a:lstStyle/>
+          <a:p>
+            <a:pPr indent="0" lvl="0" marL="0" rtl="0" algn="ctr">
+              <a:spcBef>
+                <a:spcPts val="0"/>
+              </a:spcBef>
+              <a:spcAft>
+                <a:spcPts val="0"/>
+              </a:spcAft>
+              <a:buNone/>
+            </a:pPr>
+            <a:r>
+              <a:t/>
+            </a:r>
+            <a:endParaRPr/>
+          </a:p>
+        </p:txBody>
+      </p:sp>
+      <p:sp>
+        <p:nvSpPr>
+          <p:cNvPr id="227" name="Google Shape;227;p34"/>
+          <p:cNvSpPr/>
+          <p:nvPr/>
+        </p:nvSpPr>
+        <p:spPr>
+          <a:xfrm>
+            <a:off x="1374400" y="1937663"/>
+            <a:ext cx="377400" cy="672300"/>
+          </a:xfrm>
+          <a:prstGeom prst="upArrow">
+            <a:avLst>
+              <a:gd fmla="val 50000" name="adj1"/>
+              <a:gd fmla="val 50000" name="adj2"/>
+            </a:avLst>
+          </a:prstGeom>
+          <a:solidFill>
+            <a:schemeClr val="lt2"/>
+          </a:solidFill>
+          <a:ln cap="flat" cmpd="sng" w="9525">
+            <a:solidFill>
+              <a:schemeClr val="dk2"/>
+            </a:solidFill>
+            <a:prstDash val="solid"/>
+            <a:round/>
+            <a:headEnd len="sm" w="sm" type="none"/>
+            <a:tailEnd len="sm" w="sm" type="none"/>
+          </a:ln>
+        </p:spPr>
+        <p:txBody>
+          <a:bodyPr anchorCtr="0" anchor="ctr" bIns="91425" lIns="91425" spcFirstLastPara="1" rIns="91425" wrap="square" tIns="91425">
+            <a:noAutofit/>
+          </a:bodyPr>
+          <a:lstStyle/>
+          <a:p>
+            <a:pPr indent="0" lvl="0" marL="0" rtl="0" algn="ctr">
+              <a:spcBef>
+                <a:spcPts val="0"/>
+              </a:spcBef>
+              <a:spcAft>
+                <a:spcPts val="0"/>
+              </a:spcAft>
+              <a:buNone/>
+            </a:pPr>
+            <a:r>
+              <a:t/>
+            </a:r>
+            <a:endParaRPr/>
+          </a:p>
+        </p:txBody>
+      </p:sp>
+      <p:sp>
+        <p:nvSpPr>
+          <p:cNvPr id="228" name="Google Shape;228;p34"/>
+          <p:cNvSpPr txBox="1"/>
+          <p:nvPr/>
+        </p:nvSpPr>
+        <p:spPr>
+          <a:xfrm>
+            <a:off x="1751800" y="2042975"/>
+            <a:ext cx="2113200" cy="461700"/>
+          </a:xfrm>
+          <a:prstGeom prst="rect">
+            <a:avLst/>
+          </a:prstGeom>
+          <a:noFill/>
+          <a:ln>
+            <a:noFill/>
+          </a:ln>
+        </p:spPr>
+        <p:txBody>
+          <a:bodyPr anchorCtr="0" anchor="t" bIns="91425" lIns="91425" spcFirstLastPara="1" rIns="91425" wrap="square" tIns="91425">
+            <a:spAutoFit/>
+          </a:bodyPr>
+          <a:lstStyle/>
+          <a:p>
+            <a:pPr indent="0" lvl="0" marL="0" rtl="0" algn="l">
+              <a:spcBef>
+                <a:spcPts val="0"/>
+              </a:spcBef>
+              <a:spcAft>
+                <a:spcPts val="0"/>
+              </a:spcAft>
+              <a:buNone/>
+            </a:pPr>
+            <a:r>
+              <a:rPr lang="zh-TW" sz="1800">
+                <a:solidFill>
+                  <a:schemeClr val="lt2"/>
+                </a:solidFill>
+              </a:rPr>
+              <a:t>服務使用此建構式</a:t>
+            </a:r>
+            <a:endParaRPr sz="1800">
+              <a:solidFill>
+                <a:schemeClr val="lt2"/>
+              </a:solidFill>
+            </a:endParaRPr>
+          </a:p>
+        </p:txBody>
+      </p:sp>
+      <p:pic>
+        <p:nvPicPr>
+          <p:cNvPr id="229" name="Google Shape;229;p34"/>
+          <p:cNvPicPr preferRelativeResize="0"/>
+          <p:nvPr/>
+        </p:nvPicPr>
+        <p:blipFill>
+          <a:blip r:embed="rId5">
+            <a:alphaModFix/>
+          </a:blip>
+          <a:stretch>
+            <a:fillRect/>
+          </a:stretch>
+        </p:blipFill>
+        <p:spPr>
+          <a:xfrm>
+            <a:off x="2046700" y="3088325"/>
+            <a:ext cx="4627750" cy="197307"/>
+          </a:xfrm>
+          <a:prstGeom prst="rect">
+            <a:avLst/>
+          </a:prstGeom>
+          <a:noFill/>
+          <a:ln>
+            <a:noFill/>
+          </a:ln>
+        </p:spPr>
+      </p:pic>
+      <p:pic>
+        <p:nvPicPr>
+          <p:cNvPr id="230" name="Google Shape;230;p34"/>
+          <p:cNvPicPr preferRelativeResize="0"/>
+          <p:nvPr/>
+        </p:nvPicPr>
+        <p:blipFill>
+          <a:blip r:embed="rId6">
+            <a:alphaModFix/>
+          </a:blip>
+          <a:stretch>
+            <a:fillRect/>
+          </a:stretch>
+        </p:blipFill>
+        <p:spPr>
+          <a:xfrm>
+            <a:off x="152400" y="3869282"/>
+            <a:ext cx="8839200" cy="973040"/>
+          </a:xfrm>
+          <a:prstGeom prst="rect">
+            <a:avLst/>
+          </a:prstGeom>
+          <a:noFill/>
+          <a:ln>
+            <a:noFill/>
+          </a:ln>
+        </p:spPr>
+      </p:pic>
+      <p:sp>
+        <p:nvSpPr>
+          <p:cNvPr id="231" name="Google Shape;231;p34"/>
+          <p:cNvSpPr/>
+          <p:nvPr/>
+        </p:nvSpPr>
+        <p:spPr>
+          <a:xfrm>
+            <a:off x="4164225" y="3285625"/>
+            <a:ext cx="290700" cy="583800"/>
+          </a:xfrm>
+          <a:prstGeom prst="downArrow">
+            <a:avLst>
+              <a:gd fmla="val 50000" name="adj1"/>
+              <a:gd fmla="val 50000" name="adj2"/>
+            </a:avLst>
+          </a:prstGeom>
+          <a:solidFill>
+            <a:schemeClr val="lt2"/>
+          </a:solidFill>
+          <a:ln cap="flat" cmpd="sng" w="9525">
+            <a:solidFill>
+              <a:schemeClr val="dk2"/>
+            </a:solidFill>
+            <a:prstDash val="solid"/>
+            <a:round/>
+            <a:headEnd len="sm" w="sm" type="none"/>
+            <a:tailEnd len="sm" w="sm" type="none"/>
+          </a:ln>
+        </p:spPr>
+        <p:txBody>
+          <a:bodyPr anchorCtr="0" anchor="ctr" bIns="91425" lIns="91425" spcFirstLastPara="1" rIns="91425" wrap="square" tIns="91425">
+            <a:noAutofit/>
+          </a:bodyPr>
+          <a:lstStyle/>
+          <a:p>
+            <a:pPr indent="0" lvl="0" marL="0" rtl="0" algn="ctr">
+              <a:spcBef>
+                <a:spcPts val="0"/>
+              </a:spcBef>
+              <a:spcAft>
+                <a:spcPts val="0"/>
+              </a:spcAft>
+              <a:buNone/>
+            </a:pPr>
+            <a:r>
+              <a:t/>
+            </a:r>
+            <a:endParaRPr/>
+          </a:p>
+        </p:txBody>
+      </p:sp>
+      <p:sp>
+        <p:nvSpPr>
+          <p:cNvPr id="232" name="Google Shape;232;p34"/>
+          <p:cNvSpPr txBox="1"/>
+          <p:nvPr/>
+        </p:nvSpPr>
+        <p:spPr>
+          <a:xfrm>
+            <a:off x="4605075" y="3346600"/>
+            <a:ext cx="1377600" cy="461700"/>
+          </a:xfrm>
+          <a:prstGeom prst="rect">
+            <a:avLst/>
+          </a:prstGeom>
+          <a:noFill/>
+          <a:ln>
+            <a:noFill/>
+          </a:ln>
+        </p:spPr>
+        <p:txBody>
+          <a:bodyPr anchorCtr="0" anchor="t" bIns="91425" lIns="91425" spcFirstLastPara="1" rIns="91425" wrap="square" tIns="91425">
+            <a:spAutoFit/>
+          </a:bodyPr>
+          <a:lstStyle/>
+          <a:p>
+            <a:pPr indent="0" lvl="0" marL="0" rtl="0" algn="l">
+              <a:spcBef>
+                <a:spcPts val="0"/>
+              </a:spcBef>
+              <a:spcAft>
+                <a:spcPts val="0"/>
+              </a:spcAft>
+              <a:buNone/>
+            </a:pPr>
+            <a:r>
+              <a:rPr lang="zh-TW" sz="1800">
+                <a:solidFill>
+                  <a:schemeClr val="lt2"/>
+                </a:solidFill>
+              </a:rPr>
+              <a:t>修改成這樣</a:t>
+            </a:r>
+            <a:endParaRPr sz="1800">
+              <a:solidFill>
+                <a:schemeClr val="lt2"/>
+              </a:solidFill>
+            </a:endParaRPr>
           </a:p>
         </p:txBody>
       </p:sp>

</xml_diff>